<commit_message>
merge the design document file.
</commit_message>
<xml_diff>
--- a/doc/designDoc.pptx
+++ b/doc/designDoc.pptx
@@ -104,6 +104,11 @@
       </a:defRPr>
     </a:lvl9pPr>
   </p:defaultTextStyle>
+  <p:extLst>
+    <p:ext uri="{EFAFB233-063F-42B5-8137-9DF3F51BA10A}">
+      <p15:sldGuideLst xmlns:p15="http://schemas.microsoft.com/office/powerpoint/2012/main"/>
+    </p:ext>
+  </p:extLst>
 </p:presentation>
 </file>
 
@@ -256,7 +261,7 @@
           <a:p>
             <a:fld id="{F953FF10-B1B6-4147-A9BC-BC236B7E3AD4}" type="datetimeFigureOut">
               <a:rPr lang="en-SG" smtClean="0"/>
-              <a:t>27/3/2024</a:t>
+              <a:t>3/4/2024</a:t>
             </a:fld>
             <a:endParaRPr lang="en-SG"/>
           </a:p>
@@ -456,7 +461,7 @@
           <a:p>
             <a:fld id="{F953FF10-B1B6-4147-A9BC-BC236B7E3AD4}" type="datetimeFigureOut">
               <a:rPr lang="en-SG" smtClean="0"/>
-              <a:t>27/3/2024</a:t>
+              <a:t>3/4/2024</a:t>
             </a:fld>
             <a:endParaRPr lang="en-SG"/>
           </a:p>
@@ -666,7 +671,7 @@
           <a:p>
             <a:fld id="{F953FF10-B1B6-4147-A9BC-BC236B7E3AD4}" type="datetimeFigureOut">
               <a:rPr lang="en-SG" smtClean="0"/>
-              <a:t>27/3/2024</a:t>
+              <a:t>3/4/2024</a:t>
             </a:fld>
             <a:endParaRPr lang="en-SG"/>
           </a:p>
@@ -866,7 +871,7 @@
           <a:p>
             <a:fld id="{F953FF10-B1B6-4147-A9BC-BC236B7E3AD4}" type="datetimeFigureOut">
               <a:rPr lang="en-SG" smtClean="0"/>
-              <a:t>27/3/2024</a:t>
+              <a:t>3/4/2024</a:t>
             </a:fld>
             <a:endParaRPr lang="en-SG"/>
           </a:p>
@@ -1142,7 +1147,7 @@
           <a:p>
             <a:fld id="{F953FF10-B1B6-4147-A9BC-BC236B7E3AD4}" type="datetimeFigureOut">
               <a:rPr lang="en-SG" smtClean="0"/>
-              <a:t>27/3/2024</a:t>
+              <a:t>3/4/2024</a:t>
             </a:fld>
             <a:endParaRPr lang="en-SG"/>
           </a:p>
@@ -1410,7 +1415,7 @@
           <a:p>
             <a:fld id="{F953FF10-B1B6-4147-A9BC-BC236B7E3AD4}" type="datetimeFigureOut">
               <a:rPr lang="en-SG" smtClean="0"/>
-              <a:t>27/3/2024</a:t>
+              <a:t>3/4/2024</a:t>
             </a:fld>
             <a:endParaRPr lang="en-SG"/>
           </a:p>
@@ -1825,7 +1830,7 @@
           <a:p>
             <a:fld id="{F953FF10-B1B6-4147-A9BC-BC236B7E3AD4}" type="datetimeFigureOut">
               <a:rPr lang="en-SG" smtClean="0"/>
-              <a:t>27/3/2024</a:t>
+              <a:t>3/4/2024</a:t>
             </a:fld>
             <a:endParaRPr lang="en-SG"/>
           </a:p>
@@ -1967,7 +1972,7 @@
           <a:p>
             <a:fld id="{F953FF10-B1B6-4147-A9BC-BC236B7E3AD4}" type="datetimeFigureOut">
               <a:rPr lang="en-SG" smtClean="0"/>
-              <a:t>27/3/2024</a:t>
+              <a:t>3/4/2024</a:t>
             </a:fld>
             <a:endParaRPr lang="en-SG"/>
           </a:p>
@@ -2080,7 +2085,7 @@
           <a:p>
             <a:fld id="{F953FF10-B1B6-4147-A9BC-BC236B7E3AD4}" type="datetimeFigureOut">
               <a:rPr lang="en-SG" smtClean="0"/>
-              <a:t>27/3/2024</a:t>
+              <a:t>3/4/2024</a:t>
             </a:fld>
             <a:endParaRPr lang="en-SG"/>
           </a:p>
@@ -2393,7 +2398,7 @@
           <a:p>
             <a:fld id="{F953FF10-B1B6-4147-A9BC-BC236B7E3AD4}" type="datetimeFigureOut">
               <a:rPr lang="en-SG" smtClean="0"/>
-              <a:t>27/3/2024</a:t>
+              <a:t>3/4/2024</a:t>
             </a:fld>
             <a:endParaRPr lang="en-SG"/>
           </a:p>
@@ -2682,7 +2687,7 @@
           <a:p>
             <a:fld id="{F953FF10-B1B6-4147-A9BC-BC236B7E3AD4}" type="datetimeFigureOut">
               <a:rPr lang="en-SG" smtClean="0"/>
-              <a:t>27/3/2024</a:t>
+              <a:t>3/4/2024</a:t>
             </a:fld>
             <a:endParaRPr lang="en-SG"/>
           </a:p>
@@ -2925,7 +2930,7 @@
           <a:p>
             <a:fld id="{F953FF10-B1B6-4147-A9BC-BC236B7E3AD4}" type="datetimeFigureOut">
               <a:rPr lang="en-SG" smtClean="0"/>
-              <a:t>27/3/2024</a:t>
+              <a:t>3/4/2024</a:t>
             </a:fld>
             <a:endParaRPr lang="en-SG"/>
           </a:p>
@@ -3476,7 +3481,7 @@
         </p:nvSpPr>
         <p:spPr>
           <a:xfrm>
-            <a:off x="560455" y="5546807"/>
+            <a:off x="811521" y="3273009"/>
             <a:ext cx="2318109" cy="523220"/>
           </a:xfrm>
           <a:prstGeom prst="rect">
@@ -3492,7 +3497,7 @@
           <a:p>
             <a:r>
               <a:rPr lang="en-US" sz="1400" b="1" dirty="0"/>
-              <a:t>2D Power Grid System Emulator</a:t>
+              <a:t>2D Power Grid System Real-world Emulator</a:t>
             </a:r>
             <a:endParaRPr lang="en-SG" sz="1400" b="1" dirty="0"/>
           </a:p>
@@ -3512,8 +3517,8 @@
         </p:nvSpPr>
         <p:spPr>
           <a:xfrm>
-            <a:off x="4906961" y="4111406"/>
-            <a:ext cx="1257619" cy="1004757"/>
+            <a:off x="4778046" y="2571052"/>
+            <a:ext cx="978956" cy="769069"/>
           </a:xfrm>
           <a:prstGeom prst="rect">
             <a:avLst/>
@@ -3521,8 +3526,9 @@
           <a:noFill/>
           <a:ln>
             <a:solidFill>
-              <a:schemeClr val="accent2">
+              <a:schemeClr val="tx2">
                 <a:lumMod val="75000"/>
+                <a:lumOff val="25000"/>
               </a:schemeClr>
             </a:solidFill>
             <a:prstDash val="sysDash"/>
@@ -3575,7 +3581,7 @@
         </p:blipFill>
         <p:spPr>
           <a:xfrm>
-            <a:off x="4975131" y="4180528"/>
+            <a:off x="4870741" y="2681652"/>
             <a:ext cx="770439" cy="547868"/>
           </a:xfrm>
           <a:prstGeom prst="rect">
@@ -3605,7 +3611,7 @@
         </p:blipFill>
         <p:spPr>
           <a:xfrm>
-            <a:off x="4975131" y="2865630"/>
+            <a:off x="4824392" y="3953355"/>
             <a:ext cx="867590" cy="563370"/>
           </a:xfrm>
           <a:prstGeom prst="rect">
@@ -3613,6 +3619,2259 @@
           </a:prstGeom>
         </p:spPr>
       </p:pic>
+      <p:sp>
+        <p:nvSpPr>
+          <p:cNvPr id="2" name="Rectangle 1">
+            <a:extLst>
+              <a:ext uri="{FF2B5EF4-FFF2-40B4-BE49-F238E27FC236}">
+                <a16:creationId xmlns:a16="http://schemas.microsoft.com/office/drawing/2014/main" id="{DB56C15E-5D66-34E8-0EE9-3839C3BFD020}"/>
+              </a:ext>
+            </a:extLst>
+          </p:cNvPr>
+          <p:cNvSpPr/>
+          <p:nvPr/>
+        </p:nvSpPr>
+        <p:spPr>
+          <a:xfrm>
+            <a:off x="4778045" y="1257300"/>
+            <a:ext cx="978956" cy="871157"/>
+          </a:xfrm>
+          <a:prstGeom prst="rect">
+            <a:avLst/>
+          </a:prstGeom>
+          <a:noFill/>
+          <a:ln>
+            <a:solidFill>
+              <a:schemeClr val="accent6">
+                <a:lumMod val="75000"/>
+              </a:schemeClr>
+            </a:solidFill>
+            <a:prstDash val="sysDash"/>
+          </a:ln>
+        </p:spPr>
+        <p:style>
+          <a:lnRef idx="2">
+            <a:schemeClr val="accent1">
+              <a:shade val="15000"/>
+            </a:schemeClr>
+          </a:lnRef>
+          <a:fillRef idx="1">
+            <a:schemeClr val="accent1"/>
+          </a:fillRef>
+          <a:effectRef idx="0">
+            <a:schemeClr val="accent1"/>
+          </a:effectRef>
+          <a:fontRef idx="minor">
+            <a:schemeClr val="lt1"/>
+          </a:fontRef>
+        </p:style>
+        <p:txBody>
+          <a:bodyPr rtlCol="0" anchor="ctr"/>
+          <a:lstStyle/>
+          <a:p>
+            <a:pPr algn="ctr"/>
+            <a:endParaRPr lang="en-SG" dirty="0"/>
+          </a:p>
+        </p:txBody>
+      </p:sp>
+      <p:pic>
+        <p:nvPicPr>
+          <p:cNvPr id="3" name="Picture 2" descr="TM221CE16R Schneider Electric Modicon M221 PLC CPU Mini USB Interface –  Ralakde Automation">
+            <a:extLst>
+              <a:ext uri="{FF2B5EF4-FFF2-40B4-BE49-F238E27FC236}">
+                <a16:creationId xmlns:a16="http://schemas.microsoft.com/office/drawing/2014/main" id="{A502D6EF-C886-F547-7CF4-AA62FB56DEF4}"/>
+              </a:ext>
+            </a:extLst>
+          </p:cNvPr>
+          <p:cNvPicPr>
+            <a:picLocks noChangeAspect="1" noChangeArrowheads="1"/>
+          </p:cNvPicPr>
+          <p:nvPr/>
+        </p:nvPicPr>
+        <p:blipFill>
+          <a:blip r:embed="rId6">
+            <a:extLst>
+              <a:ext uri="{28A0092B-C50C-407E-A947-70E740481C1C}">
+                <a14:useLocalDpi xmlns:a14="http://schemas.microsoft.com/office/drawing/2010/main" val="0"/>
+              </a:ext>
+            </a:extLst>
+          </a:blip>
+          <a:srcRect/>
+          <a:stretch>
+            <a:fillRect/>
+          </a:stretch>
+        </p:blipFill>
+        <p:spPr bwMode="auto">
+          <a:xfrm>
+            <a:off x="4926032" y="1358125"/>
+            <a:ext cx="659858" cy="723400"/>
+          </a:xfrm>
+          <a:prstGeom prst="rect">
+            <a:avLst/>
+          </a:prstGeom>
+          <a:noFill/>
+          <a:extLst>
+            <a:ext uri="{909E8E84-426E-40DD-AFC4-6F175D3DCCD1}">
+              <a14:hiddenFill xmlns:a14="http://schemas.microsoft.com/office/drawing/2010/main">
+                <a:solidFill>
+                  <a:srgbClr val="FFFFFF"/>
+                </a:solidFill>
+              </a14:hiddenFill>
+            </a:ext>
+          </a:extLst>
+        </p:spPr>
+      </p:pic>
+      <p:sp>
+        <p:nvSpPr>
+          <p:cNvPr id="9" name="TextBox 8">
+            <a:extLst>
+              <a:ext uri="{FF2B5EF4-FFF2-40B4-BE49-F238E27FC236}">
+                <a16:creationId xmlns:a16="http://schemas.microsoft.com/office/drawing/2014/main" id="{5E68980F-2CEB-4E92-E1CB-D4626FE58D64}"/>
+              </a:ext>
+            </a:extLst>
+          </p:cNvPr>
+          <p:cNvSpPr txBox="1"/>
+          <p:nvPr/>
+        </p:nvSpPr>
+        <p:spPr>
+          <a:xfrm>
+            <a:off x="4677182" y="818750"/>
+            <a:ext cx="1389197" cy="461665"/>
+          </a:xfrm>
+          <a:prstGeom prst="rect">
+            <a:avLst/>
+          </a:prstGeom>
+          <a:noFill/>
+        </p:spPr>
+        <p:txBody>
+          <a:bodyPr wrap="square" rtlCol="0">
+            <a:spAutoFit/>
+          </a:bodyPr>
+          <a:lstStyle/>
+          <a:p>
+            <a:r>
+              <a:rPr lang="en-US" sz="1200" b="1" dirty="0"/>
+              <a:t>PLC simulator [Modbus-TCP]</a:t>
+            </a:r>
+            <a:endParaRPr lang="en-SG" sz="1200" b="1" dirty="0"/>
+          </a:p>
+        </p:txBody>
+      </p:sp>
+      <p:sp>
+        <p:nvSpPr>
+          <p:cNvPr id="11" name="TextBox 10">
+            <a:extLst>
+              <a:ext uri="{FF2B5EF4-FFF2-40B4-BE49-F238E27FC236}">
+                <a16:creationId xmlns:a16="http://schemas.microsoft.com/office/drawing/2014/main" id="{3CFAF408-EBC6-A07A-99CF-9EF61C62D1E1}"/>
+              </a:ext>
+            </a:extLst>
+          </p:cNvPr>
+          <p:cNvSpPr txBox="1"/>
+          <p:nvPr/>
+        </p:nvSpPr>
+        <p:spPr>
+          <a:xfrm>
+            <a:off x="4677182" y="2128457"/>
+            <a:ext cx="1389197" cy="461665"/>
+          </a:xfrm>
+          <a:prstGeom prst="rect">
+            <a:avLst/>
+          </a:prstGeom>
+          <a:noFill/>
+        </p:spPr>
+        <p:txBody>
+          <a:bodyPr wrap="square" rtlCol="0">
+            <a:spAutoFit/>
+          </a:bodyPr>
+          <a:lstStyle/>
+          <a:p>
+            <a:r>
+              <a:rPr lang="en-US" sz="1200" b="1" dirty="0"/>
+              <a:t>RTU simulator [S7Comm]</a:t>
+            </a:r>
+            <a:endParaRPr lang="en-SG" sz="1200" b="1" dirty="0"/>
+          </a:p>
+        </p:txBody>
+      </p:sp>
+      <p:cxnSp>
+        <p:nvCxnSpPr>
+          <p:cNvPr id="14" name="Straight Connector 13">
+            <a:extLst>
+              <a:ext uri="{FF2B5EF4-FFF2-40B4-BE49-F238E27FC236}">
+                <a16:creationId xmlns:a16="http://schemas.microsoft.com/office/drawing/2014/main" id="{26629695-A375-25D2-6157-2EA28A3D795F}"/>
+              </a:ext>
+            </a:extLst>
+          </p:cNvPr>
+          <p:cNvCxnSpPr>
+            <a:cxnSpLocks/>
+          </p:cNvCxnSpPr>
+          <p:nvPr/>
+        </p:nvCxnSpPr>
+        <p:spPr>
+          <a:xfrm flipV="1">
+            <a:off x="3489566" y="1875759"/>
+            <a:ext cx="1288479" cy="0"/>
+          </a:xfrm>
+          <a:prstGeom prst="line">
+            <a:avLst/>
+          </a:prstGeom>
+          <a:ln>
+            <a:solidFill>
+              <a:schemeClr val="tx1"/>
+            </a:solidFill>
+          </a:ln>
+        </p:spPr>
+        <p:style>
+          <a:lnRef idx="2">
+            <a:schemeClr val="accent1"/>
+          </a:lnRef>
+          <a:fillRef idx="0">
+            <a:schemeClr val="accent1"/>
+          </a:fillRef>
+          <a:effectRef idx="1">
+            <a:schemeClr val="accent1"/>
+          </a:effectRef>
+          <a:fontRef idx="minor">
+            <a:schemeClr val="tx1"/>
+          </a:fontRef>
+        </p:style>
+      </p:cxnSp>
+      <p:cxnSp>
+        <p:nvCxnSpPr>
+          <p:cNvPr id="15" name="Straight Connector 14">
+            <a:extLst>
+              <a:ext uri="{FF2B5EF4-FFF2-40B4-BE49-F238E27FC236}">
+                <a16:creationId xmlns:a16="http://schemas.microsoft.com/office/drawing/2014/main" id="{A4B6316F-7719-E585-2B9F-47B7BC748909}"/>
+              </a:ext>
+            </a:extLst>
+          </p:cNvPr>
+          <p:cNvCxnSpPr>
+            <a:cxnSpLocks/>
+          </p:cNvCxnSpPr>
+          <p:nvPr/>
+        </p:nvCxnSpPr>
+        <p:spPr>
+          <a:xfrm flipV="1">
+            <a:off x="3489565" y="2771109"/>
+            <a:ext cx="1288479" cy="0"/>
+          </a:xfrm>
+          <a:prstGeom prst="line">
+            <a:avLst/>
+          </a:prstGeom>
+          <a:ln>
+            <a:solidFill>
+              <a:schemeClr val="tx1"/>
+            </a:solidFill>
+          </a:ln>
+        </p:spPr>
+        <p:style>
+          <a:lnRef idx="2">
+            <a:schemeClr val="accent1"/>
+          </a:lnRef>
+          <a:fillRef idx="0">
+            <a:schemeClr val="accent1"/>
+          </a:fillRef>
+          <a:effectRef idx="1">
+            <a:schemeClr val="accent1"/>
+          </a:effectRef>
+          <a:fontRef idx="minor">
+            <a:schemeClr val="tx1"/>
+          </a:fontRef>
+        </p:style>
+      </p:cxnSp>
+      <p:sp>
+        <p:nvSpPr>
+          <p:cNvPr id="16" name="Rectangle 15">
+            <a:extLst>
+              <a:ext uri="{FF2B5EF4-FFF2-40B4-BE49-F238E27FC236}">
+                <a16:creationId xmlns:a16="http://schemas.microsoft.com/office/drawing/2014/main" id="{B067CA3F-2A68-85E5-838B-47C0B96D7BF0}"/>
+              </a:ext>
+            </a:extLst>
+          </p:cNvPr>
+          <p:cNvSpPr/>
+          <p:nvPr/>
+        </p:nvSpPr>
+        <p:spPr>
+          <a:xfrm>
+            <a:off x="4703347" y="1816164"/>
+            <a:ext cx="123987" cy="119190"/>
+          </a:xfrm>
+          <a:prstGeom prst="rect">
+            <a:avLst/>
+          </a:prstGeom>
+          <a:solidFill>
+            <a:schemeClr val="bg1">
+              <a:lumMod val="75000"/>
+            </a:schemeClr>
+          </a:solidFill>
+        </p:spPr>
+        <p:style>
+          <a:lnRef idx="2">
+            <a:schemeClr val="dk1">
+              <a:shade val="15000"/>
+            </a:schemeClr>
+          </a:lnRef>
+          <a:fillRef idx="1">
+            <a:schemeClr val="dk1"/>
+          </a:fillRef>
+          <a:effectRef idx="0">
+            <a:schemeClr val="dk1"/>
+          </a:effectRef>
+          <a:fontRef idx="minor">
+            <a:schemeClr val="lt1"/>
+          </a:fontRef>
+        </p:style>
+        <p:txBody>
+          <a:bodyPr rtlCol="0" anchor="ctr"/>
+          <a:lstStyle/>
+          <a:p>
+            <a:pPr algn="ctr"/>
+            <a:endParaRPr lang="en-SG"/>
+          </a:p>
+        </p:txBody>
+      </p:sp>
+      <p:sp>
+        <p:nvSpPr>
+          <p:cNvPr id="17" name="Rectangle 16">
+            <a:extLst>
+              <a:ext uri="{FF2B5EF4-FFF2-40B4-BE49-F238E27FC236}">
+                <a16:creationId xmlns:a16="http://schemas.microsoft.com/office/drawing/2014/main" id="{E98DED24-B179-B7E8-E3BF-B42E3C2CA16B}"/>
+              </a:ext>
+            </a:extLst>
+          </p:cNvPr>
+          <p:cNvSpPr/>
+          <p:nvPr/>
+        </p:nvSpPr>
+        <p:spPr>
+          <a:xfrm>
+            <a:off x="4700406" y="2711514"/>
+            <a:ext cx="123987" cy="119190"/>
+          </a:xfrm>
+          <a:prstGeom prst="rect">
+            <a:avLst/>
+          </a:prstGeom>
+          <a:solidFill>
+            <a:schemeClr val="bg1">
+              <a:lumMod val="75000"/>
+            </a:schemeClr>
+          </a:solidFill>
+        </p:spPr>
+        <p:style>
+          <a:lnRef idx="2">
+            <a:schemeClr val="dk1">
+              <a:shade val="15000"/>
+            </a:schemeClr>
+          </a:lnRef>
+          <a:fillRef idx="1">
+            <a:schemeClr val="dk1"/>
+          </a:fillRef>
+          <a:effectRef idx="0">
+            <a:schemeClr val="dk1"/>
+          </a:effectRef>
+          <a:fontRef idx="minor">
+            <a:schemeClr val="lt1"/>
+          </a:fontRef>
+        </p:style>
+        <p:txBody>
+          <a:bodyPr rtlCol="0" anchor="ctr"/>
+          <a:lstStyle/>
+          <a:p>
+            <a:pPr algn="ctr"/>
+            <a:endParaRPr lang="en-SG"/>
+          </a:p>
+        </p:txBody>
+      </p:sp>
+      <p:sp>
+        <p:nvSpPr>
+          <p:cNvPr id="18" name="Rectangle 17">
+            <a:extLst>
+              <a:ext uri="{FF2B5EF4-FFF2-40B4-BE49-F238E27FC236}">
+                <a16:creationId xmlns:a16="http://schemas.microsoft.com/office/drawing/2014/main" id="{F952A7DD-CF0F-B16A-78D8-0B44CEA18840}"/>
+              </a:ext>
+            </a:extLst>
+          </p:cNvPr>
+          <p:cNvSpPr/>
+          <p:nvPr/>
+        </p:nvSpPr>
+        <p:spPr>
+          <a:xfrm>
+            <a:off x="3440277" y="1816164"/>
+            <a:ext cx="123987" cy="119190"/>
+          </a:xfrm>
+          <a:prstGeom prst="rect">
+            <a:avLst/>
+          </a:prstGeom>
+          <a:solidFill>
+            <a:schemeClr val="bg1">
+              <a:lumMod val="75000"/>
+            </a:schemeClr>
+          </a:solidFill>
+        </p:spPr>
+        <p:style>
+          <a:lnRef idx="2">
+            <a:schemeClr val="dk1">
+              <a:shade val="15000"/>
+            </a:schemeClr>
+          </a:lnRef>
+          <a:fillRef idx="1">
+            <a:schemeClr val="dk1"/>
+          </a:fillRef>
+          <a:effectRef idx="0">
+            <a:schemeClr val="dk1"/>
+          </a:effectRef>
+          <a:fontRef idx="minor">
+            <a:schemeClr val="lt1"/>
+          </a:fontRef>
+        </p:style>
+        <p:txBody>
+          <a:bodyPr rtlCol="0" anchor="ctr"/>
+          <a:lstStyle/>
+          <a:p>
+            <a:pPr algn="ctr"/>
+            <a:endParaRPr lang="en-SG"/>
+          </a:p>
+        </p:txBody>
+      </p:sp>
+      <p:sp>
+        <p:nvSpPr>
+          <p:cNvPr id="19" name="Rectangle 18">
+            <a:extLst>
+              <a:ext uri="{FF2B5EF4-FFF2-40B4-BE49-F238E27FC236}">
+                <a16:creationId xmlns:a16="http://schemas.microsoft.com/office/drawing/2014/main" id="{0E028699-9681-5E77-51CC-CFE009537F42}"/>
+              </a:ext>
+            </a:extLst>
+          </p:cNvPr>
+          <p:cNvSpPr/>
+          <p:nvPr/>
+        </p:nvSpPr>
+        <p:spPr>
+          <a:xfrm>
+            <a:off x="3421991" y="2700593"/>
+            <a:ext cx="123987" cy="119190"/>
+          </a:xfrm>
+          <a:prstGeom prst="rect">
+            <a:avLst/>
+          </a:prstGeom>
+          <a:solidFill>
+            <a:schemeClr val="bg1">
+              <a:lumMod val="75000"/>
+            </a:schemeClr>
+          </a:solidFill>
+        </p:spPr>
+        <p:style>
+          <a:lnRef idx="2">
+            <a:schemeClr val="dk1">
+              <a:shade val="15000"/>
+            </a:schemeClr>
+          </a:lnRef>
+          <a:fillRef idx="1">
+            <a:schemeClr val="dk1"/>
+          </a:fillRef>
+          <a:effectRef idx="0">
+            <a:schemeClr val="dk1"/>
+          </a:effectRef>
+          <a:fontRef idx="minor">
+            <a:schemeClr val="lt1"/>
+          </a:fontRef>
+        </p:style>
+        <p:txBody>
+          <a:bodyPr rtlCol="0" anchor="ctr"/>
+          <a:lstStyle/>
+          <a:p>
+            <a:pPr algn="ctr"/>
+            <a:endParaRPr lang="en-SG"/>
+          </a:p>
+        </p:txBody>
+      </p:sp>
+      <p:sp>
+        <p:nvSpPr>
+          <p:cNvPr id="20" name="TextBox 19">
+            <a:extLst>
+              <a:ext uri="{FF2B5EF4-FFF2-40B4-BE49-F238E27FC236}">
+                <a16:creationId xmlns:a16="http://schemas.microsoft.com/office/drawing/2014/main" id="{979F144D-7E95-133D-B631-1D692B07E542}"/>
+              </a:ext>
+            </a:extLst>
+          </p:cNvPr>
+          <p:cNvSpPr txBox="1"/>
+          <p:nvPr/>
+        </p:nvSpPr>
+        <p:spPr>
+          <a:xfrm>
+            <a:off x="3502270" y="1394117"/>
+            <a:ext cx="1389197" cy="461665"/>
+          </a:xfrm>
+          <a:prstGeom prst="rect">
+            <a:avLst/>
+          </a:prstGeom>
+          <a:noFill/>
+        </p:spPr>
+        <p:txBody>
+          <a:bodyPr wrap="square" rtlCol="0">
+            <a:spAutoFit/>
+          </a:bodyPr>
+          <a:lstStyle/>
+          <a:p>
+            <a:r>
+              <a:rPr lang="en-US" sz="1200" dirty="0">
+                <a:solidFill>
+                  <a:schemeClr val="tx1">
+                    <a:lumMod val="50000"/>
+                    <a:lumOff val="50000"/>
+                  </a:schemeClr>
+                </a:solidFill>
+              </a:rPr>
+              <a:t>Electrical signal simulation </a:t>
+            </a:r>
+            <a:endParaRPr lang="en-SG" sz="1200" dirty="0">
+              <a:solidFill>
+                <a:schemeClr val="tx1">
+                  <a:lumMod val="50000"/>
+                  <a:lumOff val="50000"/>
+                </a:schemeClr>
+              </a:solidFill>
+            </a:endParaRPr>
+          </a:p>
+        </p:txBody>
+      </p:sp>
+      <p:sp>
+        <p:nvSpPr>
+          <p:cNvPr id="22" name="TextBox 21">
+            <a:extLst>
+              <a:ext uri="{FF2B5EF4-FFF2-40B4-BE49-F238E27FC236}">
+                <a16:creationId xmlns:a16="http://schemas.microsoft.com/office/drawing/2014/main" id="{46F7AE8B-17F1-C723-797C-4588C9B78E1A}"/>
+              </a:ext>
+            </a:extLst>
+          </p:cNvPr>
+          <p:cNvSpPr txBox="1"/>
+          <p:nvPr/>
+        </p:nvSpPr>
+        <p:spPr>
+          <a:xfrm>
+            <a:off x="3536835" y="2237086"/>
+            <a:ext cx="1389197" cy="461665"/>
+          </a:xfrm>
+          <a:prstGeom prst="rect">
+            <a:avLst/>
+          </a:prstGeom>
+          <a:noFill/>
+        </p:spPr>
+        <p:txBody>
+          <a:bodyPr wrap="square" rtlCol="0">
+            <a:spAutoFit/>
+          </a:bodyPr>
+          <a:lstStyle/>
+          <a:p>
+            <a:r>
+              <a:rPr lang="en-US" sz="1200" dirty="0">
+                <a:solidFill>
+                  <a:schemeClr val="tx1">
+                    <a:lumMod val="50000"/>
+                    <a:lumOff val="50000"/>
+                  </a:schemeClr>
+                </a:solidFill>
+              </a:rPr>
+              <a:t>Electrical signal simulation </a:t>
+            </a:r>
+            <a:endParaRPr lang="en-SG" sz="1200" dirty="0">
+              <a:solidFill>
+                <a:schemeClr val="tx1">
+                  <a:lumMod val="50000"/>
+                  <a:lumOff val="50000"/>
+                </a:schemeClr>
+              </a:solidFill>
+            </a:endParaRPr>
+          </a:p>
+        </p:txBody>
+      </p:sp>
+      <p:sp>
+        <p:nvSpPr>
+          <p:cNvPr id="23" name="Rectangle 22">
+            <a:extLst>
+              <a:ext uri="{FF2B5EF4-FFF2-40B4-BE49-F238E27FC236}">
+                <a16:creationId xmlns:a16="http://schemas.microsoft.com/office/drawing/2014/main" id="{454D6D45-1A3C-B29E-4857-5543D506680F}"/>
+              </a:ext>
+            </a:extLst>
+          </p:cNvPr>
+          <p:cNvSpPr/>
+          <p:nvPr/>
+        </p:nvSpPr>
+        <p:spPr>
+          <a:xfrm>
+            <a:off x="4778044" y="3850789"/>
+            <a:ext cx="978956" cy="769069"/>
+          </a:xfrm>
+          <a:prstGeom prst="rect">
+            <a:avLst/>
+          </a:prstGeom>
+          <a:noFill/>
+          <a:ln>
+            <a:solidFill>
+              <a:schemeClr val="tx2">
+                <a:lumMod val="75000"/>
+                <a:lumOff val="25000"/>
+              </a:schemeClr>
+            </a:solidFill>
+            <a:prstDash val="sysDash"/>
+          </a:ln>
+        </p:spPr>
+        <p:style>
+          <a:lnRef idx="2">
+            <a:schemeClr val="accent1">
+              <a:shade val="15000"/>
+            </a:schemeClr>
+          </a:lnRef>
+          <a:fillRef idx="1">
+            <a:schemeClr val="accent1"/>
+          </a:fillRef>
+          <a:effectRef idx="0">
+            <a:schemeClr val="accent1"/>
+          </a:effectRef>
+          <a:fontRef idx="minor">
+            <a:schemeClr val="lt1"/>
+          </a:fontRef>
+        </p:style>
+        <p:txBody>
+          <a:bodyPr rtlCol="0" anchor="ctr"/>
+          <a:lstStyle/>
+          <a:p>
+            <a:pPr algn="ctr"/>
+            <a:endParaRPr lang="en-SG" dirty="0"/>
+          </a:p>
+        </p:txBody>
+      </p:sp>
+      <p:sp>
+        <p:nvSpPr>
+          <p:cNvPr id="24" name="TextBox 23">
+            <a:extLst>
+              <a:ext uri="{FF2B5EF4-FFF2-40B4-BE49-F238E27FC236}">
+                <a16:creationId xmlns:a16="http://schemas.microsoft.com/office/drawing/2014/main" id="{F2E444B3-7B30-3C49-7949-5F6BAF3D0A09}"/>
+              </a:ext>
+            </a:extLst>
+          </p:cNvPr>
+          <p:cNvSpPr txBox="1"/>
+          <p:nvPr/>
+        </p:nvSpPr>
+        <p:spPr>
+          <a:xfrm>
+            <a:off x="4386391" y="3545648"/>
+            <a:ext cx="2021331" cy="276999"/>
+          </a:xfrm>
+          <a:prstGeom prst="rect">
+            <a:avLst/>
+          </a:prstGeom>
+          <a:noFill/>
+        </p:spPr>
+        <p:txBody>
+          <a:bodyPr wrap="square" rtlCol="0">
+            <a:spAutoFit/>
+          </a:bodyPr>
+          <a:lstStyle/>
+          <a:p>
+            <a:r>
+              <a:rPr lang="en-US" sz="1200" b="1" dirty="0"/>
+              <a:t>PLC simulator [S7Comm]</a:t>
+            </a:r>
+            <a:endParaRPr lang="en-SG" sz="1200" b="1" dirty="0"/>
+          </a:p>
+        </p:txBody>
+      </p:sp>
+      <p:cxnSp>
+        <p:nvCxnSpPr>
+          <p:cNvPr id="27" name="Straight Connector 26">
+            <a:extLst>
+              <a:ext uri="{FF2B5EF4-FFF2-40B4-BE49-F238E27FC236}">
+                <a16:creationId xmlns:a16="http://schemas.microsoft.com/office/drawing/2014/main" id="{A5FE26C3-A34E-86E0-5F47-17359AACE305}"/>
+              </a:ext>
+            </a:extLst>
+          </p:cNvPr>
+          <p:cNvCxnSpPr>
+            <a:cxnSpLocks/>
+          </p:cNvCxnSpPr>
+          <p:nvPr/>
+        </p:nvCxnSpPr>
+        <p:spPr>
+          <a:xfrm flipV="1">
+            <a:off x="3518470" y="4038218"/>
+            <a:ext cx="1288479" cy="0"/>
+          </a:xfrm>
+          <a:prstGeom prst="line">
+            <a:avLst/>
+          </a:prstGeom>
+          <a:ln>
+            <a:solidFill>
+              <a:schemeClr val="tx1"/>
+            </a:solidFill>
+          </a:ln>
+        </p:spPr>
+        <p:style>
+          <a:lnRef idx="2">
+            <a:schemeClr val="accent1"/>
+          </a:lnRef>
+          <a:fillRef idx="0">
+            <a:schemeClr val="accent1"/>
+          </a:fillRef>
+          <a:effectRef idx="1">
+            <a:schemeClr val="accent1"/>
+          </a:effectRef>
+          <a:fontRef idx="minor">
+            <a:schemeClr val="tx1"/>
+          </a:fontRef>
+        </p:style>
+      </p:cxnSp>
+      <p:sp>
+        <p:nvSpPr>
+          <p:cNvPr id="28" name="Rectangle 27">
+            <a:extLst>
+              <a:ext uri="{FF2B5EF4-FFF2-40B4-BE49-F238E27FC236}">
+                <a16:creationId xmlns:a16="http://schemas.microsoft.com/office/drawing/2014/main" id="{CC755E0B-AB8E-BF68-4110-5EBDCC1F209E}"/>
+              </a:ext>
+            </a:extLst>
+          </p:cNvPr>
+          <p:cNvSpPr/>
+          <p:nvPr/>
+        </p:nvSpPr>
+        <p:spPr>
+          <a:xfrm>
+            <a:off x="3450896" y="3967702"/>
+            <a:ext cx="123987" cy="119190"/>
+          </a:xfrm>
+          <a:prstGeom prst="rect">
+            <a:avLst/>
+          </a:prstGeom>
+          <a:solidFill>
+            <a:schemeClr val="bg1">
+              <a:lumMod val="75000"/>
+            </a:schemeClr>
+          </a:solidFill>
+        </p:spPr>
+        <p:style>
+          <a:lnRef idx="2">
+            <a:schemeClr val="dk1">
+              <a:shade val="15000"/>
+            </a:schemeClr>
+          </a:lnRef>
+          <a:fillRef idx="1">
+            <a:schemeClr val="dk1"/>
+          </a:fillRef>
+          <a:effectRef idx="0">
+            <a:schemeClr val="dk1"/>
+          </a:effectRef>
+          <a:fontRef idx="minor">
+            <a:schemeClr val="lt1"/>
+          </a:fontRef>
+        </p:style>
+        <p:txBody>
+          <a:bodyPr rtlCol="0" anchor="ctr"/>
+          <a:lstStyle/>
+          <a:p>
+            <a:pPr algn="ctr"/>
+            <a:endParaRPr lang="en-SG"/>
+          </a:p>
+        </p:txBody>
+      </p:sp>
+      <p:sp>
+        <p:nvSpPr>
+          <p:cNvPr id="29" name="Rectangle 28">
+            <a:extLst>
+              <a:ext uri="{FF2B5EF4-FFF2-40B4-BE49-F238E27FC236}">
+                <a16:creationId xmlns:a16="http://schemas.microsoft.com/office/drawing/2014/main" id="{83245DE0-68B4-D92F-14AA-824AF7FEE4EA}"/>
+              </a:ext>
+            </a:extLst>
+          </p:cNvPr>
+          <p:cNvSpPr/>
+          <p:nvPr/>
+        </p:nvSpPr>
+        <p:spPr>
+          <a:xfrm>
+            <a:off x="4688029" y="3967702"/>
+            <a:ext cx="123987" cy="119190"/>
+          </a:xfrm>
+          <a:prstGeom prst="rect">
+            <a:avLst/>
+          </a:prstGeom>
+          <a:solidFill>
+            <a:schemeClr val="bg1">
+              <a:lumMod val="75000"/>
+            </a:schemeClr>
+          </a:solidFill>
+        </p:spPr>
+        <p:style>
+          <a:lnRef idx="2">
+            <a:schemeClr val="dk1">
+              <a:shade val="15000"/>
+            </a:schemeClr>
+          </a:lnRef>
+          <a:fillRef idx="1">
+            <a:schemeClr val="dk1"/>
+          </a:fillRef>
+          <a:effectRef idx="0">
+            <a:schemeClr val="dk1"/>
+          </a:effectRef>
+          <a:fontRef idx="minor">
+            <a:schemeClr val="lt1"/>
+          </a:fontRef>
+        </p:style>
+        <p:txBody>
+          <a:bodyPr rtlCol="0" anchor="ctr"/>
+          <a:lstStyle/>
+          <a:p>
+            <a:pPr algn="ctr"/>
+            <a:endParaRPr lang="en-SG"/>
+          </a:p>
+        </p:txBody>
+      </p:sp>
+      <p:sp>
+        <p:nvSpPr>
+          <p:cNvPr id="30" name="Rectangle 29">
+            <a:extLst>
+              <a:ext uri="{FF2B5EF4-FFF2-40B4-BE49-F238E27FC236}">
+                <a16:creationId xmlns:a16="http://schemas.microsoft.com/office/drawing/2014/main" id="{E9B8B1C9-DD82-D18B-415B-9382F9222C51}"/>
+              </a:ext>
+            </a:extLst>
+          </p:cNvPr>
+          <p:cNvSpPr/>
+          <p:nvPr/>
+        </p:nvSpPr>
+        <p:spPr>
+          <a:xfrm>
+            <a:off x="4766480" y="4933380"/>
+            <a:ext cx="978956" cy="769069"/>
+          </a:xfrm>
+          <a:prstGeom prst="rect">
+            <a:avLst/>
+          </a:prstGeom>
+          <a:noFill/>
+          <a:ln>
+            <a:solidFill>
+              <a:schemeClr val="tx2">
+                <a:lumMod val="75000"/>
+                <a:lumOff val="25000"/>
+              </a:schemeClr>
+            </a:solidFill>
+            <a:prstDash val="sysDash"/>
+          </a:ln>
+        </p:spPr>
+        <p:style>
+          <a:lnRef idx="2">
+            <a:schemeClr val="accent1">
+              <a:shade val="15000"/>
+            </a:schemeClr>
+          </a:lnRef>
+          <a:fillRef idx="1">
+            <a:schemeClr val="accent1"/>
+          </a:fillRef>
+          <a:effectRef idx="0">
+            <a:schemeClr val="accent1"/>
+          </a:effectRef>
+          <a:fontRef idx="minor">
+            <a:schemeClr val="lt1"/>
+          </a:fontRef>
+        </p:style>
+        <p:txBody>
+          <a:bodyPr rtlCol="0" anchor="ctr"/>
+          <a:lstStyle/>
+          <a:p>
+            <a:pPr algn="ctr"/>
+            <a:endParaRPr lang="en-SG" dirty="0"/>
+          </a:p>
+        </p:txBody>
+      </p:sp>
+      <p:pic>
+        <p:nvPicPr>
+          <p:cNvPr id="31" name="Picture 30">
+            <a:extLst>
+              <a:ext uri="{FF2B5EF4-FFF2-40B4-BE49-F238E27FC236}">
+                <a16:creationId xmlns:a16="http://schemas.microsoft.com/office/drawing/2014/main" id="{8D6539A9-D715-9B93-1711-332EAC91DB5F}"/>
+              </a:ext>
+            </a:extLst>
+          </p:cNvPr>
+          <p:cNvPicPr>
+            <a:picLocks noChangeAspect="1"/>
+          </p:cNvPicPr>
+          <p:nvPr/>
+        </p:nvPicPr>
+        <p:blipFill>
+          <a:blip r:embed="rId4"/>
+          <a:stretch>
+            <a:fillRect/>
+          </a:stretch>
+        </p:blipFill>
+        <p:spPr>
+          <a:xfrm>
+            <a:off x="4882302" y="5030227"/>
+            <a:ext cx="770439" cy="547868"/>
+          </a:xfrm>
+          <a:prstGeom prst="rect">
+            <a:avLst/>
+          </a:prstGeom>
+        </p:spPr>
+      </p:pic>
+      <p:sp>
+        <p:nvSpPr>
+          <p:cNvPr id="32" name="TextBox 31">
+            <a:extLst>
+              <a:ext uri="{FF2B5EF4-FFF2-40B4-BE49-F238E27FC236}">
+                <a16:creationId xmlns:a16="http://schemas.microsoft.com/office/drawing/2014/main" id="{1B29F5FD-8404-993C-2840-96925FC9C08A}"/>
+              </a:ext>
+            </a:extLst>
+          </p:cNvPr>
+          <p:cNvSpPr txBox="1"/>
+          <p:nvPr/>
+        </p:nvSpPr>
+        <p:spPr>
+          <a:xfrm>
+            <a:off x="4474366" y="4689910"/>
+            <a:ext cx="2223047" cy="276999"/>
+          </a:xfrm>
+          <a:prstGeom prst="rect">
+            <a:avLst/>
+          </a:prstGeom>
+          <a:noFill/>
+        </p:spPr>
+        <p:txBody>
+          <a:bodyPr wrap="square" rtlCol="0">
+            <a:spAutoFit/>
+          </a:bodyPr>
+          <a:lstStyle/>
+          <a:p>
+            <a:r>
+              <a:rPr lang="en-US" sz="1200" b="1" dirty="0"/>
+              <a:t>RTU simulator [S7Comm]</a:t>
+            </a:r>
+            <a:endParaRPr lang="en-SG" sz="1200" b="1" dirty="0"/>
+          </a:p>
+        </p:txBody>
+      </p:sp>
+      <p:sp>
+        <p:nvSpPr>
+          <p:cNvPr id="33" name="Rectangle 32">
+            <a:extLst>
+              <a:ext uri="{FF2B5EF4-FFF2-40B4-BE49-F238E27FC236}">
+                <a16:creationId xmlns:a16="http://schemas.microsoft.com/office/drawing/2014/main" id="{E92727F0-E907-9307-86B8-069F25A9903C}"/>
+              </a:ext>
+            </a:extLst>
+          </p:cNvPr>
+          <p:cNvSpPr/>
+          <p:nvPr/>
+        </p:nvSpPr>
+        <p:spPr>
+          <a:xfrm>
+            <a:off x="4700404" y="5195424"/>
+            <a:ext cx="123987" cy="119190"/>
+          </a:xfrm>
+          <a:prstGeom prst="rect">
+            <a:avLst/>
+          </a:prstGeom>
+          <a:solidFill>
+            <a:schemeClr val="bg1">
+              <a:lumMod val="75000"/>
+            </a:schemeClr>
+          </a:solidFill>
+        </p:spPr>
+        <p:style>
+          <a:lnRef idx="2">
+            <a:schemeClr val="dk1">
+              <a:shade val="15000"/>
+            </a:schemeClr>
+          </a:lnRef>
+          <a:fillRef idx="1">
+            <a:schemeClr val="dk1"/>
+          </a:fillRef>
+          <a:effectRef idx="0">
+            <a:schemeClr val="dk1"/>
+          </a:effectRef>
+          <a:fontRef idx="minor">
+            <a:schemeClr val="lt1"/>
+          </a:fontRef>
+        </p:style>
+        <p:txBody>
+          <a:bodyPr rtlCol="0" anchor="ctr"/>
+          <a:lstStyle/>
+          <a:p>
+            <a:pPr algn="ctr"/>
+            <a:endParaRPr lang="en-SG"/>
+          </a:p>
+        </p:txBody>
+      </p:sp>
+      <p:cxnSp>
+        <p:nvCxnSpPr>
+          <p:cNvPr id="34" name="Straight Connector 33">
+            <a:extLst>
+              <a:ext uri="{FF2B5EF4-FFF2-40B4-BE49-F238E27FC236}">
+                <a16:creationId xmlns:a16="http://schemas.microsoft.com/office/drawing/2014/main" id="{EAC0656F-B493-B8A2-B732-056803BA2D55}"/>
+              </a:ext>
+            </a:extLst>
+          </p:cNvPr>
+          <p:cNvCxnSpPr>
+            <a:cxnSpLocks/>
+            <a:stCxn id="35" idx="3"/>
+            <a:endCxn id="33" idx="1"/>
+          </p:cNvCxnSpPr>
+          <p:nvPr/>
+        </p:nvCxnSpPr>
+        <p:spPr>
+          <a:xfrm flipV="1">
+            <a:off x="3570211" y="5255019"/>
+            <a:ext cx="1130193" cy="3300"/>
+          </a:xfrm>
+          <a:prstGeom prst="line">
+            <a:avLst/>
+          </a:prstGeom>
+          <a:ln>
+            <a:solidFill>
+              <a:schemeClr val="tx1"/>
+            </a:solidFill>
+          </a:ln>
+        </p:spPr>
+        <p:style>
+          <a:lnRef idx="2">
+            <a:schemeClr val="accent1"/>
+          </a:lnRef>
+          <a:fillRef idx="0">
+            <a:schemeClr val="accent1"/>
+          </a:fillRef>
+          <a:effectRef idx="1">
+            <a:schemeClr val="accent1"/>
+          </a:effectRef>
+          <a:fontRef idx="minor">
+            <a:schemeClr val="tx1"/>
+          </a:fontRef>
+        </p:style>
+      </p:cxnSp>
+      <p:sp>
+        <p:nvSpPr>
+          <p:cNvPr id="35" name="Rectangle 34">
+            <a:extLst>
+              <a:ext uri="{FF2B5EF4-FFF2-40B4-BE49-F238E27FC236}">
+                <a16:creationId xmlns:a16="http://schemas.microsoft.com/office/drawing/2014/main" id="{284EC95E-95DB-6C4E-4846-D41500C4D8C1}"/>
+              </a:ext>
+            </a:extLst>
+          </p:cNvPr>
+          <p:cNvSpPr/>
+          <p:nvPr/>
+        </p:nvSpPr>
+        <p:spPr>
+          <a:xfrm>
+            <a:off x="3446224" y="5198724"/>
+            <a:ext cx="123987" cy="119190"/>
+          </a:xfrm>
+          <a:prstGeom prst="rect">
+            <a:avLst/>
+          </a:prstGeom>
+          <a:solidFill>
+            <a:schemeClr val="bg1">
+              <a:lumMod val="75000"/>
+            </a:schemeClr>
+          </a:solidFill>
+        </p:spPr>
+        <p:style>
+          <a:lnRef idx="2">
+            <a:schemeClr val="dk1">
+              <a:shade val="15000"/>
+            </a:schemeClr>
+          </a:lnRef>
+          <a:fillRef idx="1">
+            <a:schemeClr val="dk1"/>
+          </a:fillRef>
+          <a:effectRef idx="0">
+            <a:schemeClr val="dk1"/>
+          </a:effectRef>
+          <a:fontRef idx="minor">
+            <a:schemeClr val="lt1"/>
+          </a:fontRef>
+        </p:style>
+        <p:txBody>
+          <a:bodyPr rtlCol="0" anchor="ctr"/>
+          <a:lstStyle/>
+          <a:p>
+            <a:pPr algn="ctr"/>
+            <a:endParaRPr lang="en-SG"/>
+          </a:p>
+        </p:txBody>
+      </p:sp>
+      <p:sp>
+        <p:nvSpPr>
+          <p:cNvPr id="42" name="Rectangle 41">
+            <a:extLst>
+              <a:ext uri="{FF2B5EF4-FFF2-40B4-BE49-F238E27FC236}">
+                <a16:creationId xmlns:a16="http://schemas.microsoft.com/office/drawing/2014/main" id="{8D009844-604F-0CC7-F860-71BD758D93A7}"/>
+              </a:ext>
+            </a:extLst>
+          </p:cNvPr>
+          <p:cNvSpPr/>
+          <p:nvPr/>
+        </p:nvSpPr>
+        <p:spPr>
+          <a:xfrm>
+            <a:off x="4682962" y="4342205"/>
+            <a:ext cx="123987" cy="119190"/>
+          </a:xfrm>
+          <a:prstGeom prst="rect">
+            <a:avLst/>
+          </a:prstGeom>
+          <a:solidFill>
+            <a:schemeClr val="bg1">
+              <a:lumMod val="75000"/>
+            </a:schemeClr>
+          </a:solidFill>
+        </p:spPr>
+        <p:style>
+          <a:lnRef idx="2">
+            <a:schemeClr val="dk1">
+              <a:shade val="15000"/>
+            </a:schemeClr>
+          </a:lnRef>
+          <a:fillRef idx="1">
+            <a:schemeClr val="dk1"/>
+          </a:fillRef>
+          <a:effectRef idx="0">
+            <a:schemeClr val="dk1"/>
+          </a:effectRef>
+          <a:fontRef idx="minor">
+            <a:schemeClr val="lt1"/>
+          </a:fontRef>
+        </p:style>
+        <p:txBody>
+          <a:bodyPr rtlCol="0" anchor="ctr"/>
+          <a:lstStyle/>
+          <a:p>
+            <a:pPr algn="ctr"/>
+            <a:endParaRPr lang="en-SG"/>
+          </a:p>
+        </p:txBody>
+      </p:sp>
+      <p:sp>
+        <p:nvSpPr>
+          <p:cNvPr id="43" name="Rectangle 42">
+            <a:extLst>
+              <a:ext uri="{FF2B5EF4-FFF2-40B4-BE49-F238E27FC236}">
+                <a16:creationId xmlns:a16="http://schemas.microsoft.com/office/drawing/2014/main" id="{759BB7C2-81A2-2A8E-148F-1B322BBF168F}"/>
+              </a:ext>
+            </a:extLst>
+          </p:cNvPr>
+          <p:cNvSpPr/>
+          <p:nvPr/>
+        </p:nvSpPr>
+        <p:spPr>
+          <a:xfrm>
+            <a:off x="4700404" y="4960319"/>
+            <a:ext cx="123987" cy="119190"/>
+          </a:xfrm>
+          <a:prstGeom prst="rect">
+            <a:avLst/>
+          </a:prstGeom>
+          <a:solidFill>
+            <a:schemeClr val="bg1">
+              <a:lumMod val="75000"/>
+            </a:schemeClr>
+          </a:solidFill>
+        </p:spPr>
+        <p:style>
+          <a:lnRef idx="2">
+            <a:schemeClr val="dk1">
+              <a:shade val="15000"/>
+            </a:schemeClr>
+          </a:lnRef>
+          <a:fillRef idx="1">
+            <a:schemeClr val="dk1"/>
+          </a:fillRef>
+          <a:effectRef idx="0">
+            <a:schemeClr val="dk1"/>
+          </a:effectRef>
+          <a:fontRef idx="minor">
+            <a:schemeClr val="lt1"/>
+          </a:fontRef>
+        </p:style>
+        <p:txBody>
+          <a:bodyPr rtlCol="0" anchor="ctr"/>
+          <a:lstStyle/>
+          <a:p>
+            <a:pPr algn="ctr"/>
+            <a:endParaRPr lang="en-SG"/>
+          </a:p>
+        </p:txBody>
+      </p:sp>
+      <p:cxnSp>
+        <p:nvCxnSpPr>
+          <p:cNvPr id="47" name="Connector: Elbow 46">
+            <a:extLst>
+              <a:ext uri="{FF2B5EF4-FFF2-40B4-BE49-F238E27FC236}">
+                <a16:creationId xmlns:a16="http://schemas.microsoft.com/office/drawing/2014/main" id="{73B74CC0-7780-2BBD-CBBA-1C500EBC3199}"/>
+              </a:ext>
+            </a:extLst>
+          </p:cNvPr>
+          <p:cNvCxnSpPr>
+            <a:cxnSpLocks/>
+            <a:stCxn id="42" idx="1"/>
+            <a:endCxn id="43" idx="1"/>
+          </p:cNvCxnSpPr>
+          <p:nvPr/>
+        </p:nvCxnSpPr>
+        <p:spPr>
+          <a:xfrm rot="10800000" flipH="1" flipV="1">
+            <a:off x="4682962" y="4401800"/>
+            <a:ext cx="17442" cy="618114"/>
+          </a:xfrm>
+          <a:prstGeom prst="bentConnector3">
+            <a:avLst>
+              <a:gd name="adj1" fmla="val -1310630"/>
+            </a:avLst>
+          </a:prstGeom>
+          <a:ln>
+            <a:solidFill>
+              <a:schemeClr val="tx1"/>
+            </a:solidFill>
+          </a:ln>
+        </p:spPr>
+        <p:style>
+          <a:lnRef idx="2">
+            <a:schemeClr val="accent1"/>
+          </a:lnRef>
+          <a:fillRef idx="0">
+            <a:schemeClr val="accent1"/>
+          </a:fillRef>
+          <a:effectRef idx="1">
+            <a:schemeClr val="accent1"/>
+          </a:effectRef>
+          <a:fontRef idx="minor">
+            <a:schemeClr val="tx1"/>
+          </a:fontRef>
+        </p:style>
+      </p:cxnSp>
+      <p:sp>
+        <p:nvSpPr>
+          <p:cNvPr id="50" name="Rectangle 49">
+            <a:extLst>
+              <a:ext uri="{FF2B5EF4-FFF2-40B4-BE49-F238E27FC236}">
+                <a16:creationId xmlns:a16="http://schemas.microsoft.com/office/drawing/2014/main" id="{B4852F93-4023-D38B-6806-7B893FD39C3A}"/>
+              </a:ext>
+            </a:extLst>
+          </p:cNvPr>
+          <p:cNvSpPr/>
+          <p:nvPr/>
+        </p:nvSpPr>
+        <p:spPr>
+          <a:xfrm>
+            <a:off x="2974888" y="3000754"/>
+            <a:ext cx="123987" cy="119190"/>
+          </a:xfrm>
+          <a:prstGeom prst="rect">
+            <a:avLst/>
+          </a:prstGeom>
+          <a:solidFill>
+            <a:schemeClr val="bg1">
+              <a:lumMod val="75000"/>
+            </a:schemeClr>
+          </a:solidFill>
+        </p:spPr>
+        <p:style>
+          <a:lnRef idx="2">
+            <a:schemeClr val="dk1">
+              <a:shade val="15000"/>
+            </a:schemeClr>
+          </a:lnRef>
+          <a:fillRef idx="1">
+            <a:schemeClr val="dk1"/>
+          </a:fillRef>
+          <a:effectRef idx="0">
+            <a:schemeClr val="dk1"/>
+          </a:effectRef>
+          <a:fontRef idx="minor">
+            <a:schemeClr val="lt1"/>
+          </a:fontRef>
+        </p:style>
+        <p:txBody>
+          <a:bodyPr rtlCol="0" anchor="ctr"/>
+          <a:lstStyle/>
+          <a:p>
+            <a:pPr algn="ctr"/>
+            <a:endParaRPr lang="en-SG"/>
+          </a:p>
+        </p:txBody>
+      </p:sp>
+      <p:sp>
+        <p:nvSpPr>
+          <p:cNvPr id="51" name="Rectangle 50">
+            <a:extLst>
+              <a:ext uri="{FF2B5EF4-FFF2-40B4-BE49-F238E27FC236}">
+                <a16:creationId xmlns:a16="http://schemas.microsoft.com/office/drawing/2014/main" id="{CF2B858D-28ED-33B0-A1BE-DA19733002B0}"/>
+              </a:ext>
+            </a:extLst>
+          </p:cNvPr>
+          <p:cNvSpPr/>
+          <p:nvPr/>
+        </p:nvSpPr>
+        <p:spPr>
+          <a:xfrm>
+            <a:off x="2984168" y="3743340"/>
+            <a:ext cx="123987" cy="119190"/>
+          </a:xfrm>
+          <a:prstGeom prst="rect">
+            <a:avLst/>
+          </a:prstGeom>
+          <a:solidFill>
+            <a:schemeClr val="bg1">
+              <a:lumMod val="75000"/>
+            </a:schemeClr>
+          </a:solidFill>
+        </p:spPr>
+        <p:style>
+          <a:lnRef idx="2">
+            <a:schemeClr val="dk1">
+              <a:shade val="15000"/>
+            </a:schemeClr>
+          </a:lnRef>
+          <a:fillRef idx="1">
+            <a:schemeClr val="dk1"/>
+          </a:fillRef>
+          <a:effectRef idx="0">
+            <a:schemeClr val="dk1"/>
+          </a:effectRef>
+          <a:fontRef idx="minor">
+            <a:schemeClr val="lt1"/>
+          </a:fontRef>
+        </p:style>
+        <p:txBody>
+          <a:bodyPr rtlCol="0" anchor="ctr"/>
+          <a:lstStyle/>
+          <a:p>
+            <a:pPr algn="ctr"/>
+            <a:endParaRPr lang="en-SG"/>
+          </a:p>
+        </p:txBody>
+      </p:sp>
+      <p:cxnSp>
+        <p:nvCxnSpPr>
+          <p:cNvPr id="52" name="Straight Connector 51">
+            <a:extLst>
+              <a:ext uri="{FF2B5EF4-FFF2-40B4-BE49-F238E27FC236}">
+                <a16:creationId xmlns:a16="http://schemas.microsoft.com/office/drawing/2014/main" id="{681031AD-2D61-FB4F-54FE-BA9C4E3DFDF7}"/>
+              </a:ext>
+            </a:extLst>
+          </p:cNvPr>
+          <p:cNvCxnSpPr>
+            <a:cxnSpLocks/>
+            <a:stCxn id="50" idx="2"/>
+            <a:endCxn id="51" idx="0"/>
+          </p:cNvCxnSpPr>
+          <p:nvPr/>
+        </p:nvCxnSpPr>
+        <p:spPr>
+          <a:xfrm>
+            <a:off x="3036882" y="3119944"/>
+            <a:ext cx="0" cy="623396"/>
+          </a:xfrm>
+          <a:prstGeom prst="line">
+            <a:avLst/>
+          </a:prstGeom>
+          <a:ln>
+            <a:solidFill>
+              <a:schemeClr val="tx1"/>
+            </a:solidFill>
+          </a:ln>
+        </p:spPr>
+        <p:style>
+          <a:lnRef idx="2">
+            <a:schemeClr val="accent1"/>
+          </a:lnRef>
+          <a:fillRef idx="0">
+            <a:schemeClr val="accent1"/>
+          </a:fillRef>
+          <a:effectRef idx="1">
+            <a:schemeClr val="accent1"/>
+          </a:effectRef>
+          <a:fontRef idx="minor">
+            <a:schemeClr val="tx1"/>
+          </a:fontRef>
+        </p:style>
+      </p:cxnSp>
+      <p:sp>
+        <p:nvSpPr>
+          <p:cNvPr id="55" name="TextBox 54">
+            <a:extLst>
+              <a:ext uri="{FF2B5EF4-FFF2-40B4-BE49-F238E27FC236}">
+                <a16:creationId xmlns:a16="http://schemas.microsoft.com/office/drawing/2014/main" id="{AE38319A-45BF-B4D0-FACE-5165C9FC830F}"/>
+              </a:ext>
+            </a:extLst>
+          </p:cNvPr>
+          <p:cNvSpPr txBox="1"/>
+          <p:nvPr/>
+        </p:nvSpPr>
+        <p:spPr>
+          <a:xfrm>
+            <a:off x="3506295" y="4101246"/>
+            <a:ext cx="1389197" cy="461665"/>
+          </a:xfrm>
+          <a:prstGeom prst="rect">
+            <a:avLst/>
+          </a:prstGeom>
+          <a:noFill/>
+        </p:spPr>
+        <p:txBody>
+          <a:bodyPr wrap="square" rtlCol="0">
+            <a:spAutoFit/>
+          </a:bodyPr>
+          <a:lstStyle/>
+          <a:p>
+            <a:r>
+              <a:rPr lang="en-US" sz="1200" dirty="0">
+                <a:solidFill>
+                  <a:schemeClr val="tx1">
+                    <a:lumMod val="50000"/>
+                    <a:lumOff val="50000"/>
+                  </a:schemeClr>
+                </a:solidFill>
+              </a:rPr>
+              <a:t>Electrical signal simulation </a:t>
+            </a:r>
+            <a:endParaRPr lang="en-SG" sz="1200" dirty="0">
+              <a:solidFill>
+                <a:schemeClr val="tx1">
+                  <a:lumMod val="50000"/>
+                  <a:lumOff val="50000"/>
+                </a:schemeClr>
+              </a:solidFill>
+            </a:endParaRPr>
+          </a:p>
+        </p:txBody>
+      </p:sp>
+      <p:sp>
+        <p:nvSpPr>
+          <p:cNvPr id="56" name="TextBox 55">
+            <a:extLst>
+              <a:ext uri="{FF2B5EF4-FFF2-40B4-BE49-F238E27FC236}">
+                <a16:creationId xmlns:a16="http://schemas.microsoft.com/office/drawing/2014/main" id="{6169127C-B340-8097-8C55-0D98B1A5A443}"/>
+              </a:ext>
+            </a:extLst>
+          </p:cNvPr>
+          <p:cNvSpPr txBox="1"/>
+          <p:nvPr/>
+        </p:nvSpPr>
+        <p:spPr>
+          <a:xfrm>
+            <a:off x="3046161" y="3206731"/>
+            <a:ext cx="1389197" cy="461665"/>
+          </a:xfrm>
+          <a:prstGeom prst="rect">
+            <a:avLst/>
+          </a:prstGeom>
+          <a:noFill/>
+        </p:spPr>
+        <p:txBody>
+          <a:bodyPr wrap="square" rtlCol="0">
+            <a:spAutoFit/>
+          </a:bodyPr>
+          <a:lstStyle/>
+          <a:p>
+            <a:r>
+              <a:rPr lang="en-US" sz="1200" dirty="0">
+                <a:solidFill>
+                  <a:schemeClr val="tx1">
+                    <a:lumMod val="50000"/>
+                    <a:lumOff val="50000"/>
+                  </a:schemeClr>
+                </a:solidFill>
+              </a:rPr>
+              <a:t>Power supply simulation </a:t>
+            </a:r>
+            <a:endParaRPr lang="en-SG" sz="1200" dirty="0">
+              <a:solidFill>
+                <a:schemeClr val="tx1">
+                  <a:lumMod val="50000"/>
+                  <a:lumOff val="50000"/>
+                </a:schemeClr>
+              </a:solidFill>
+            </a:endParaRPr>
+          </a:p>
+        </p:txBody>
+      </p:sp>
+      <p:pic>
+        <p:nvPicPr>
+          <p:cNvPr id="57" name="Picture 56" descr="A screenshot of a computer&#10;&#10;Description automatically generated">
+            <a:extLst>
+              <a:ext uri="{FF2B5EF4-FFF2-40B4-BE49-F238E27FC236}">
+                <a16:creationId xmlns:a16="http://schemas.microsoft.com/office/drawing/2014/main" id="{553E21F1-F2C3-E2D8-5144-878CBBAD8BBA}"/>
+              </a:ext>
+            </a:extLst>
+          </p:cNvPr>
+          <p:cNvPicPr>
+            <a:picLocks noChangeAspect="1"/>
+          </p:cNvPicPr>
+          <p:nvPr/>
+        </p:nvPicPr>
+        <p:blipFill>
+          <a:blip r:embed="rId7">
+            <a:extLst>
+              <a:ext uri="{28A0092B-C50C-407E-A947-70E740481C1C}">
+                <a14:useLocalDpi xmlns:a14="http://schemas.microsoft.com/office/drawing/2010/main" val="0"/>
+              </a:ext>
+            </a:extLst>
+          </a:blip>
+          <a:stretch>
+            <a:fillRect/>
+          </a:stretch>
+        </p:blipFill>
+        <p:spPr>
+          <a:xfrm>
+            <a:off x="7500272" y="1139794"/>
+            <a:ext cx="1900047" cy="1088325"/>
+          </a:xfrm>
+          <a:prstGeom prst="rect">
+            <a:avLst/>
+          </a:prstGeom>
+          <a:ln w="9525">
+            <a:solidFill>
+              <a:schemeClr val="tx1"/>
+            </a:solidFill>
+          </a:ln>
+        </p:spPr>
+      </p:pic>
+      <p:pic>
+        <p:nvPicPr>
+          <p:cNvPr id="58" name="Picture 57" descr="A screenshot of a computer&#10;&#10;Description automatically generated">
+            <a:extLst>
+              <a:ext uri="{FF2B5EF4-FFF2-40B4-BE49-F238E27FC236}">
+                <a16:creationId xmlns:a16="http://schemas.microsoft.com/office/drawing/2014/main" id="{890A21EA-803E-CC5A-AD90-CC8557235644}"/>
+              </a:ext>
+            </a:extLst>
+          </p:cNvPr>
+          <p:cNvPicPr>
+            <a:picLocks noChangeAspect="1"/>
+          </p:cNvPicPr>
+          <p:nvPr/>
+        </p:nvPicPr>
+        <p:blipFill>
+          <a:blip r:embed="rId8">
+            <a:extLst>
+              <a:ext uri="{28A0092B-C50C-407E-A947-70E740481C1C}">
+                <a14:useLocalDpi xmlns:a14="http://schemas.microsoft.com/office/drawing/2010/main" val="0"/>
+              </a:ext>
+            </a:extLst>
+          </a:blip>
+          <a:stretch>
+            <a:fillRect/>
+          </a:stretch>
+        </p:blipFill>
+        <p:spPr>
+          <a:xfrm>
+            <a:off x="7529581" y="2654527"/>
+            <a:ext cx="1900047" cy="1011117"/>
+          </a:xfrm>
+          <a:prstGeom prst="rect">
+            <a:avLst/>
+          </a:prstGeom>
+          <a:ln w="12700">
+            <a:solidFill>
+              <a:schemeClr val="tx1"/>
+            </a:solidFill>
+          </a:ln>
+        </p:spPr>
+      </p:pic>
+      <p:pic>
+        <p:nvPicPr>
+          <p:cNvPr id="59" name="Picture 58" descr="Graphical user interface, application&#10;&#10;Description automatically generated">
+            <a:extLst>
+              <a:ext uri="{FF2B5EF4-FFF2-40B4-BE49-F238E27FC236}">
+                <a16:creationId xmlns:a16="http://schemas.microsoft.com/office/drawing/2014/main" id="{2326BE70-F5D2-21C7-DCFE-7FF9A5605BDE}"/>
+              </a:ext>
+            </a:extLst>
+          </p:cNvPr>
+          <p:cNvPicPr>
+            <a:picLocks noChangeAspect="1"/>
+          </p:cNvPicPr>
+          <p:nvPr/>
+        </p:nvPicPr>
+        <p:blipFill>
+          <a:blip r:embed="rId9">
+            <a:extLst>
+              <a:ext uri="{28A0092B-C50C-407E-A947-70E740481C1C}">
+                <a14:useLocalDpi xmlns:a14="http://schemas.microsoft.com/office/drawing/2010/main" val="0"/>
+              </a:ext>
+            </a:extLst>
+          </a:blip>
+          <a:stretch>
+            <a:fillRect/>
+          </a:stretch>
+        </p:blipFill>
+        <p:spPr>
+          <a:xfrm>
+            <a:off x="7436392" y="4235040"/>
+            <a:ext cx="2650427" cy="1111141"/>
+          </a:xfrm>
+          <a:prstGeom prst="rect">
+            <a:avLst/>
+          </a:prstGeom>
+        </p:spPr>
+      </p:pic>
+      <p:cxnSp>
+        <p:nvCxnSpPr>
+          <p:cNvPr id="61" name="Straight Connector 60">
+            <a:extLst>
+              <a:ext uri="{FF2B5EF4-FFF2-40B4-BE49-F238E27FC236}">
+                <a16:creationId xmlns:a16="http://schemas.microsoft.com/office/drawing/2014/main" id="{7AA372C2-7590-B0F3-5BD1-C99004ED1CA9}"/>
+              </a:ext>
+            </a:extLst>
+          </p:cNvPr>
+          <p:cNvCxnSpPr>
+            <a:cxnSpLocks/>
+          </p:cNvCxnSpPr>
+          <p:nvPr/>
+        </p:nvCxnSpPr>
+        <p:spPr>
+          <a:xfrm>
+            <a:off x="6580455" y="1068567"/>
+            <a:ext cx="0" cy="4362775"/>
+          </a:xfrm>
+          <a:prstGeom prst="line">
+            <a:avLst/>
+          </a:prstGeom>
+          <a:ln>
+            <a:solidFill>
+              <a:schemeClr val="accent6">
+                <a:lumMod val="75000"/>
+              </a:schemeClr>
+            </a:solidFill>
+          </a:ln>
+        </p:spPr>
+        <p:style>
+          <a:lnRef idx="2">
+            <a:schemeClr val="accent1"/>
+          </a:lnRef>
+          <a:fillRef idx="0">
+            <a:schemeClr val="accent1"/>
+          </a:fillRef>
+          <a:effectRef idx="1">
+            <a:schemeClr val="accent1"/>
+          </a:effectRef>
+          <a:fontRef idx="minor">
+            <a:schemeClr val="tx1"/>
+          </a:fontRef>
+        </p:style>
+      </p:cxnSp>
+      <p:sp>
+        <p:nvSpPr>
+          <p:cNvPr id="63" name="TextBox 62">
+            <a:extLst>
+              <a:ext uri="{FF2B5EF4-FFF2-40B4-BE49-F238E27FC236}">
+                <a16:creationId xmlns:a16="http://schemas.microsoft.com/office/drawing/2014/main" id="{D176CAB0-40F4-2763-D1D3-F68A3BD3615E}"/>
+              </a:ext>
+            </a:extLst>
+          </p:cNvPr>
+          <p:cNvSpPr txBox="1"/>
+          <p:nvPr/>
+        </p:nvSpPr>
+        <p:spPr>
+          <a:xfrm>
+            <a:off x="6140384" y="809789"/>
+            <a:ext cx="833305" cy="276999"/>
+          </a:xfrm>
+          <a:prstGeom prst="rect">
+            <a:avLst/>
+          </a:prstGeom>
+          <a:noFill/>
+        </p:spPr>
+        <p:txBody>
+          <a:bodyPr wrap="square" rtlCol="0">
+            <a:spAutoFit/>
+          </a:bodyPr>
+          <a:lstStyle/>
+          <a:p>
+            <a:r>
+              <a:rPr lang="en-US" sz="1200" b="1" dirty="0">
+                <a:solidFill>
+                  <a:schemeClr val="accent3">
+                    <a:lumMod val="75000"/>
+                  </a:schemeClr>
+                </a:solidFill>
+              </a:rPr>
+              <a:t>Modbus</a:t>
+            </a:r>
+            <a:r>
+              <a:rPr lang="en-US" sz="1200" b="1" dirty="0"/>
+              <a:t> </a:t>
+            </a:r>
+            <a:endParaRPr lang="en-SG" sz="1200" b="1" dirty="0"/>
+          </a:p>
+        </p:txBody>
+      </p:sp>
+      <p:cxnSp>
+        <p:nvCxnSpPr>
+          <p:cNvPr id="64" name="Straight Connector 63">
+            <a:extLst>
+              <a:ext uri="{FF2B5EF4-FFF2-40B4-BE49-F238E27FC236}">
+                <a16:creationId xmlns:a16="http://schemas.microsoft.com/office/drawing/2014/main" id="{88977953-C680-B275-03E2-2B3B04BB8163}"/>
+              </a:ext>
+            </a:extLst>
+          </p:cNvPr>
+          <p:cNvCxnSpPr>
+            <a:cxnSpLocks/>
+          </p:cNvCxnSpPr>
+          <p:nvPr/>
+        </p:nvCxnSpPr>
+        <p:spPr>
+          <a:xfrm flipV="1">
+            <a:off x="5757000" y="1651243"/>
+            <a:ext cx="833304" cy="0"/>
+          </a:xfrm>
+          <a:prstGeom prst="line">
+            <a:avLst/>
+          </a:prstGeom>
+          <a:ln>
+            <a:solidFill>
+              <a:schemeClr val="accent6">
+                <a:lumMod val="75000"/>
+              </a:schemeClr>
+            </a:solidFill>
+          </a:ln>
+        </p:spPr>
+        <p:style>
+          <a:lnRef idx="2">
+            <a:schemeClr val="accent1"/>
+          </a:lnRef>
+          <a:fillRef idx="0">
+            <a:schemeClr val="accent1"/>
+          </a:fillRef>
+          <a:effectRef idx="1">
+            <a:schemeClr val="accent1"/>
+          </a:effectRef>
+          <a:fontRef idx="minor">
+            <a:schemeClr val="tx1"/>
+          </a:fontRef>
+        </p:style>
+      </p:cxnSp>
+      <p:cxnSp>
+        <p:nvCxnSpPr>
+          <p:cNvPr id="67" name="Straight Connector 66">
+            <a:extLst>
+              <a:ext uri="{FF2B5EF4-FFF2-40B4-BE49-F238E27FC236}">
+                <a16:creationId xmlns:a16="http://schemas.microsoft.com/office/drawing/2014/main" id="{9AAE9E0A-A19E-42C5-FAB7-6B79C634C3EA}"/>
+              </a:ext>
+            </a:extLst>
+          </p:cNvPr>
+          <p:cNvCxnSpPr>
+            <a:cxnSpLocks/>
+          </p:cNvCxnSpPr>
+          <p:nvPr/>
+        </p:nvCxnSpPr>
+        <p:spPr>
+          <a:xfrm>
+            <a:off x="6590304" y="1816164"/>
+            <a:ext cx="909968" cy="0"/>
+          </a:xfrm>
+          <a:prstGeom prst="line">
+            <a:avLst/>
+          </a:prstGeom>
+          <a:ln>
+            <a:solidFill>
+              <a:schemeClr val="accent6">
+                <a:lumMod val="75000"/>
+              </a:schemeClr>
+            </a:solidFill>
+          </a:ln>
+        </p:spPr>
+        <p:style>
+          <a:lnRef idx="2">
+            <a:schemeClr val="accent1"/>
+          </a:lnRef>
+          <a:fillRef idx="0">
+            <a:schemeClr val="accent1"/>
+          </a:fillRef>
+          <a:effectRef idx="1">
+            <a:schemeClr val="accent1"/>
+          </a:effectRef>
+          <a:fontRef idx="minor">
+            <a:schemeClr val="tx1"/>
+          </a:fontRef>
+        </p:style>
+      </p:cxnSp>
+      <p:cxnSp>
+        <p:nvCxnSpPr>
+          <p:cNvPr id="70" name="Straight Connector 69">
+            <a:extLst>
+              <a:ext uri="{FF2B5EF4-FFF2-40B4-BE49-F238E27FC236}">
+                <a16:creationId xmlns:a16="http://schemas.microsoft.com/office/drawing/2014/main" id="{50A82333-3F68-4009-2C0B-4A925B7ADC89}"/>
+              </a:ext>
+            </a:extLst>
+          </p:cNvPr>
+          <p:cNvCxnSpPr>
+            <a:cxnSpLocks/>
+          </p:cNvCxnSpPr>
+          <p:nvPr/>
+        </p:nvCxnSpPr>
+        <p:spPr>
+          <a:xfrm>
+            <a:off x="6580455" y="3206466"/>
+            <a:ext cx="919817" cy="0"/>
+          </a:xfrm>
+          <a:prstGeom prst="line">
+            <a:avLst/>
+          </a:prstGeom>
+          <a:ln>
+            <a:solidFill>
+              <a:schemeClr val="accent6">
+                <a:lumMod val="75000"/>
+              </a:schemeClr>
+            </a:solidFill>
+          </a:ln>
+        </p:spPr>
+        <p:style>
+          <a:lnRef idx="2">
+            <a:schemeClr val="accent1"/>
+          </a:lnRef>
+          <a:fillRef idx="0">
+            <a:schemeClr val="accent1"/>
+          </a:fillRef>
+          <a:effectRef idx="1">
+            <a:schemeClr val="accent1"/>
+          </a:effectRef>
+          <a:fontRef idx="minor">
+            <a:schemeClr val="tx1"/>
+          </a:fontRef>
+        </p:style>
+      </p:cxnSp>
+      <p:cxnSp>
+        <p:nvCxnSpPr>
+          <p:cNvPr id="72" name="Straight Connector 71">
+            <a:extLst>
+              <a:ext uri="{FF2B5EF4-FFF2-40B4-BE49-F238E27FC236}">
+                <a16:creationId xmlns:a16="http://schemas.microsoft.com/office/drawing/2014/main" id="{B099A1AB-B36F-CBFD-F7BF-7464C8B3B562}"/>
+              </a:ext>
+            </a:extLst>
+          </p:cNvPr>
+          <p:cNvCxnSpPr>
+            <a:cxnSpLocks/>
+          </p:cNvCxnSpPr>
+          <p:nvPr/>
+        </p:nvCxnSpPr>
+        <p:spPr>
+          <a:xfrm>
+            <a:off x="7001888" y="1191909"/>
+            <a:ext cx="0" cy="4386186"/>
+          </a:xfrm>
+          <a:prstGeom prst="line">
+            <a:avLst/>
+          </a:prstGeom>
+          <a:ln>
+            <a:solidFill>
+              <a:schemeClr val="tx2">
+                <a:lumMod val="75000"/>
+                <a:lumOff val="25000"/>
+              </a:schemeClr>
+            </a:solidFill>
+            <a:prstDash val="sysDash"/>
+          </a:ln>
+        </p:spPr>
+        <p:style>
+          <a:lnRef idx="2">
+            <a:schemeClr val="accent1"/>
+          </a:lnRef>
+          <a:fillRef idx="0">
+            <a:schemeClr val="accent1"/>
+          </a:fillRef>
+          <a:effectRef idx="1">
+            <a:schemeClr val="accent1"/>
+          </a:effectRef>
+          <a:fontRef idx="minor">
+            <a:schemeClr val="tx1"/>
+          </a:fontRef>
+        </p:style>
+      </p:cxnSp>
+      <p:sp>
+        <p:nvSpPr>
+          <p:cNvPr id="75" name="TextBox 74">
+            <a:extLst>
+              <a:ext uri="{FF2B5EF4-FFF2-40B4-BE49-F238E27FC236}">
+                <a16:creationId xmlns:a16="http://schemas.microsoft.com/office/drawing/2014/main" id="{B7C8BD0A-27D2-C696-DF5F-177EF5A43436}"/>
+              </a:ext>
+            </a:extLst>
+          </p:cNvPr>
+          <p:cNvSpPr txBox="1"/>
+          <p:nvPr/>
+        </p:nvSpPr>
+        <p:spPr>
+          <a:xfrm>
+            <a:off x="6557036" y="5604515"/>
+            <a:ext cx="1534799" cy="276999"/>
+          </a:xfrm>
+          <a:prstGeom prst="rect">
+            <a:avLst/>
+          </a:prstGeom>
+          <a:noFill/>
+        </p:spPr>
+        <p:txBody>
+          <a:bodyPr wrap="square" rtlCol="0">
+            <a:spAutoFit/>
+          </a:bodyPr>
+          <a:lstStyle/>
+          <a:p>
+            <a:r>
+              <a:rPr lang="en-US" sz="1200" b="1" dirty="0">
+                <a:solidFill>
+                  <a:schemeClr val="tx2">
+                    <a:lumMod val="75000"/>
+                    <a:lumOff val="25000"/>
+                  </a:schemeClr>
+                </a:solidFill>
+              </a:rPr>
+              <a:t>S7Comm bus </a:t>
+            </a:r>
+            <a:endParaRPr lang="en-SG" sz="1200" b="1" dirty="0">
+              <a:solidFill>
+                <a:schemeClr val="tx2">
+                  <a:lumMod val="75000"/>
+                  <a:lumOff val="25000"/>
+                </a:schemeClr>
+              </a:solidFill>
+            </a:endParaRPr>
+          </a:p>
+        </p:txBody>
+      </p:sp>
+      <p:cxnSp>
+        <p:nvCxnSpPr>
+          <p:cNvPr id="76" name="Straight Connector 75">
+            <a:extLst>
+              <a:ext uri="{FF2B5EF4-FFF2-40B4-BE49-F238E27FC236}">
+                <a16:creationId xmlns:a16="http://schemas.microsoft.com/office/drawing/2014/main" id="{1BB4164E-5A8B-7C34-633D-8D53E27F92BA}"/>
+              </a:ext>
+            </a:extLst>
+          </p:cNvPr>
+          <p:cNvCxnSpPr>
+            <a:cxnSpLocks/>
+            <a:stCxn id="8" idx="3"/>
+          </p:cNvCxnSpPr>
+          <p:nvPr/>
+        </p:nvCxnSpPr>
+        <p:spPr>
+          <a:xfrm>
+            <a:off x="5757002" y="2955587"/>
+            <a:ext cx="1241211" cy="0"/>
+          </a:xfrm>
+          <a:prstGeom prst="line">
+            <a:avLst/>
+          </a:prstGeom>
+          <a:ln>
+            <a:solidFill>
+              <a:schemeClr val="tx2">
+                <a:lumMod val="75000"/>
+                <a:lumOff val="25000"/>
+              </a:schemeClr>
+            </a:solidFill>
+            <a:prstDash val="sysDash"/>
+          </a:ln>
+        </p:spPr>
+        <p:style>
+          <a:lnRef idx="2">
+            <a:schemeClr val="accent1"/>
+          </a:lnRef>
+          <a:fillRef idx="0">
+            <a:schemeClr val="accent1"/>
+          </a:fillRef>
+          <a:effectRef idx="1">
+            <a:schemeClr val="accent1"/>
+          </a:effectRef>
+          <a:fontRef idx="minor">
+            <a:schemeClr val="tx1"/>
+          </a:fontRef>
+        </p:style>
+      </p:cxnSp>
+      <p:cxnSp>
+        <p:nvCxnSpPr>
+          <p:cNvPr id="82" name="Straight Connector 81">
+            <a:extLst>
+              <a:ext uri="{FF2B5EF4-FFF2-40B4-BE49-F238E27FC236}">
+                <a16:creationId xmlns:a16="http://schemas.microsoft.com/office/drawing/2014/main" id="{F56BB083-FBCE-26F7-B99D-2517CA459620}"/>
+              </a:ext>
+            </a:extLst>
+          </p:cNvPr>
+          <p:cNvCxnSpPr>
+            <a:cxnSpLocks/>
+          </p:cNvCxnSpPr>
+          <p:nvPr/>
+        </p:nvCxnSpPr>
+        <p:spPr>
+          <a:xfrm>
+            <a:off x="5757002" y="4217055"/>
+            <a:ext cx="1241211" cy="0"/>
+          </a:xfrm>
+          <a:prstGeom prst="line">
+            <a:avLst/>
+          </a:prstGeom>
+          <a:ln>
+            <a:solidFill>
+              <a:schemeClr val="tx2">
+                <a:lumMod val="75000"/>
+                <a:lumOff val="25000"/>
+              </a:schemeClr>
+            </a:solidFill>
+            <a:prstDash val="sysDash"/>
+          </a:ln>
+        </p:spPr>
+        <p:style>
+          <a:lnRef idx="2">
+            <a:schemeClr val="accent1"/>
+          </a:lnRef>
+          <a:fillRef idx="0">
+            <a:schemeClr val="accent1"/>
+          </a:fillRef>
+          <a:effectRef idx="1">
+            <a:schemeClr val="accent1"/>
+          </a:effectRef>
+          <a:fontRef idx="minor">
+            <a:schemeClr val="tx1"/>
+          </a:fontRef>
+        </p:style>
+      </p:cxnSp>
+      <p:cxnSp>
+        <p:nvCxnSpPr>
+          <p:cNvPr id="83" name="Straight Connector 82">
+            <a:extLst>
+              <a:ext uri="{FF2B5EF4-FFF2-40B4-BE49-F238E27FC236}">
+                <a16:creationId xmlns:a16="http://schemas.microsoft.com/office/drawing/2014/main" id="{038708EB-36F2-DA08-05C5-0196AEEE385A}"/>
+              </a:ext>
+            </a:extLst>
+          </p:cNvPr>
+          <p:cNvCxnSpPr>
+            <a:cxnSpLocks/>
+            <a:stCxn id="30" idx="3"/>
+          </p:cNvCxnSpPr>
+          <p:nvPr/>
+        </p:nvCxnSpPr>
+        <p:spPr>
+          <a:xfrm>
+            <a:off x="5745436" y="5317915"/>
+            <a:ext cx="1252777" cy="0"/>
+          </a:xfrm>
+          <a:prstGeom prst="line">
+            <a:avLst/>
+          </a:prstGeom>
+          <a:ln>
+            <a:solidFill>
+              <a:schemeClr val="tx2">
+                <a:lumMod val="75000"/>
+                <a:lumOff val="25000"/>
+              </a:schemeClr>
+            </a:solidFill>
+            <a:prstDash val="sysDash"/>
+          </a:ln>
+        </p:spPr>
+        <p:style>
+          <a:lnRef idx="2">
+            <a:schemeClr val="accent1"/>
+          </a:lnRef>
+          <a:fillRef idx="0">
+            <a:schemeClr val="accent1"/>
+          </a:fillRef>
+          <a:effectRef idx="1">
+            <a:schemeClr val="accent1"/>
+          </a:effectRef>
+          <a:fontRef idx="minor">
+            <a:schemeClr val="tx1"/>
+          </a:fontRef>
+        </p:style>
+      </p:cxnSp>
+      <p:cxnSp>
+        <p:nvCxnSpPr>
+          <p:cNvPr id="86" name="Straight Connector 85">
+            <a:extLst>
+              <a:ext uri="{FF2B5EF4-FFF2-40B4-BE49-F238E27FC236}">
+                <a16:creationId xmlns:a16="http://schemas.microsoft.com/office/drawing/2014/main" id="{C20D8B27-C70F-65F2-91B4-64B8CA1E3FAA}"/>
+              </a:ext>
+            </a:extLst>
+          </p:cNvPr>
+          <p:cNvCxnSpPr>
+            <a:cxnSpLocks/>
+          </p:cNvCxnSpPr>
+          <p:nvPr/>
+        </p:nvCxnSpPr>
+        <p:spPr>
+          <a:xfrm>
+            <a:off x="6998213" y="3534619"/>
+            <a:ext cx="531368" cy="0"/>
+          </a:xfrm>
+          <a:prstGeom prst="line">
+            <a:avLst/>
+          </a:prstGeom>
+          <a:ln>
+            <a:solidFill>
+              <a:schemeClr val="tx2">
+                <a:lumMod val="75000"/>
+                <a:lumOff val="25000"/>
+              </a:schemeClr>
+            </a:solidFill>
+            <a:prstDash val="sysDash"/>
+          </a:ln>
+        </p:spPr>
+        <p:style>
+          <a:lnRef idx="2">
+            <a:schemeClr val="accent1"/>
+          </a:lnRef>
+          <a:fillRef idx="0">
+            <a:schemeClr val="accent1"/>
+          </a:fillRef>
+          <a:effectRef idx="1">
+            <a:schemeClr val="accent1"/>
+          </a:effectRef>
+          <a:fontRef idx="minor">
+            <a:schemeClr val="tx1"/>
+          </a:fontRef>
+        </p:style>
+      </p:cxnSp>
+      <p:cxnSp>
+        <p:nvCxnSpPr>
+          <p:cNvPr id="88" name="Straight Connector 87">
+            <a:extLst>
+              <a:ext uri="{FF2B5EF4-FFF2-40B4-BE49-F238E27FC236}">
+                <a16:creationId xmlns:a16="http://schemas.microsoft.com/office/drawing/2014/main" id="{B46453A1-A246-470F-FD4B-505634F7E55F}"/>
+              </a:ext>
+            </a:extLst>
+          </p:cNvPr>
+          <p:cNvCxnSpPr>
+            <a:cxnSpLocks/>
+            <a:endCxn id="59" idx="1"/>
+          </p:cNvCxnSpPr>
+          <p:nvPr/>
+        </p:nvCxnSpPr>
+        <p:spPr>
+          <a:xfrm flipV="1">
+            <a:off x="7020527" y="4790611"/>
+            <a:ext cx="415865" cy="5476"/>
+          </a:xfrm>
+          <a:prstGeom prst="line">
+            <a:avLst/>
+          </a:prstGeom>
+          <a:ln>
+            <a:solidFill>
+              <a:schemeClr val="tx2">
+                <a:lumMod val="75000"/>
+                <a:lumOff val="25000"/>
+              </a:schemeClr>
+            </a:solidFill>
+            <a:prstDash val="sysDash"/>
+          </a:ln>
+        </p:spPr>
+        <p:style>
+          <a:lnRef idx="2">
+            <a:schemeClr val="accent1"/>
+          </a:lnRef>
+          <a:fillRef idx="0">
+            <a:schemeClr val="accent1"/>
+          </a:fillRef>
+          <a:effectRef idx="1">
+            <a:schemeClr val="accent1"/>
+          </a:effectRef>
+          <a:fontRef idx="minor">
+            <a:schemeClr val="tx1"/>
+          </a:fontRef>
+        </p:style>
+      </p:cxnSp>
+      <p:sp>
+        <p:nvSpPr>
+          <p:cNvPr id="91" name="TextBox 90">
+            <a:extLst>
+              <a:ext uri="{FF2B5EF4-FFF2-40B4-BE49-F238E27FC236}">
+                <a16:creationId xmlns:a16="http://schemas.microsoft.com/office/drawing/2014/main" id="{AAA1618C-1F74-B98A-8E64-1F5B30C35A09}"/>
+              </a:ext>
+            </a:extLst>
+          </p:cNvPr>
+          <p:cNvSpPr txBox="1"/>
+          <p:nvPr/>
+        </p:nvSpPr>
+        <p:spPr>
+          <a:xfrm>
+            <a:off x="7436392" y="812969"/>
+            <a:ext cx="2208199" cy="276999"/>
+          </a:xfrm>
+          <a:prstGeom prst="rect">
+            <a:avLst/>
+          </a:prstGeom>
+          <a:noFill/>
+        </p:spPr>
+        <p:txBody>
+          <a:bodyPr wrap="square" rtlCol="0">
+            <a:spAutoFit/>
+          </a:bodyPr>
+          <a:lstStyle/>
+          <a:p>
+            <a:r>
+              <a:rPr lang="en-US" sz="1200" b="1" dirty="0"/>
+              <a:t>Railway Signal System HMI</a:t>
+            </a:r>
+            <a:endParaRPr lang="en-SG" sz="1200" b="1" dirty="0"/>
+          </a:p>
+        </p:txBody>
+      </p:sp>
+      <p:sp>
+        <p:nvSpPr>
+          <p:cNvPr id="92" name="TextBox 91">
+            <a:extLst>
+              <a:ext uri="{FF2B5EF4-FFF2-40B4-BE49-F238E27FC236}">
+                <a16:creationId xmlns:a16="http://schemas.microsoft.com/office/drawing/2014/main" id="{E4AEBEF4-9F8A-20F0-5D40-7485DFAFCE59}"/>
+              </a:ext>
+            </a:extLst>
+          </p:cNvPr>
+          <p:cNvSpPr txBox="1"/>
+          <p:nvPr/>
+        </p:nvSpPr>
+        <p:spPr>
+          <a:xfrm>
+            <a:off x="7461984" y="2357476"/>
+            <a:ext cx="2208199" cy="276999"/>
+          </a:xfrm>
+          <a:prstGeom prst="rect">
+            <a:avLst/>
+          </a:prstGeom>
+          <a:noFill/>
+        </p:spPr>
+        <p:txBody>
+          <a:bodyPr wrap="square" rtlCol="0">
+            <a:spAutoFit/>
+          </a:bodyPr>
+          <a:lstStyle/>
+          <a:p>
+            <a:r>
+              <a:rPr lang="en-US" sz="1200" b="1" dirty="0"/>
+              <a:t>Railway Train System HMI</a:t>
+            </a:r>
+            <a:endParaRPr lang="en-SG" sz="1200" b="1" dirty="0"/>
+          </a:p>
+        </p:txBody>
+      </p:sp>
+      <p:sp>
+        <p:nvSpPr>
+          <p:cNvPr id="93" name="TextBox 92">
+            <a:extLst>
+              <a:ext uri="{FF2B5EF4-FFF2-40B4-BE49-F238E27FC236}">
+                <a16:creationId xmlns:a16="http://schemas.microsoft.com/office/drawing/2014/main" id="{9A38814E-1516-670C-20D8-AAEBCC3073D3}"/>
+              </a:ext>
+            </a:extLst>
+          </p:cNvPr>
+          <p:cNvSpPr txBox="1"/>
+          <p:nvPr/>
+        </p:nvSpPr>
+        <p:spPr>
+          <a:xfrm>
+            <a:off x="7357431" y="3955104"/>
+            <a:ext cx="2980916" cy="276999"/>
+          </a:xfrm>
+          <a:prstGeom prst="rect">
+            <a:avLst/>
+          </a:prstGeom>
+          <a:noFill/>
+        </p:spPr>
+        <p:txBody>
+          <a:bodyPr wrap="square" rtlCol="0">
+            <a:spAutoFit/>
+          </a:bodyPr>
+          <a:lstStyle/>
+          <a:p>
+            <a:r>
+              <a:rPr lang="en-US" sz="1200" b="1" dirty="0"/>
+              <a:t>Power Grid and Substation System HMI</a:t>
+            </a:r>
+            <a:endParaRPr lang="en-SG" sz="1200" b="1" dirty="0"/>
+          </a:p>
+        </p:txBody>
+      </p:sp>
     </p:spTree>
     <p:extLst>
       <p:ext uri="{BB962C8B-B14F-4D97-AF65-F5344CB8AC3E}">

</xml_diff>

<commit_message>
Added the test case program and update the design document.
</commit_message>
<xml_diff>
--- a/doc/designDoc.pptx
+++ b/doc/designDoc.pptx
@@ -261,7 +261,7 @@
           <a:p>
             <a:fld id="{F953FF10-B1B6-4147-A9BC-BC236B7E3AD4}" type="datetimeFigureOut">
               <a:rPr lang="en-SG" smtClean="0"/>
-              <a:t>3/4/2024</a:t>
+              <a:t>4/4/2024</a:t>
             </a:fld>
             <a:endParaRPr lang="en-SG"/>
           </a:p>
@@ -461,7 +461,7 @@
           <a:p>
             <a:fld id="{F953FF10-B1B6-4147-A9BC-BC236B7E3AD4}" type="datetimeFigureOut">
               <a:rPr lang="en-SG" smtClean="0"/>
-              <a:t>3/4/2024</a:t>
+              <a:t>4/4/2024</a:t>
             </a:fld>
             <a:endParaRPr lang="en-SG"/>
           </a:p>
@@ -671,7 +671,7 @@
           <a:p>
             <a:fld id="{F953FF10-B1B6-4147-A9BC-BC236B7E3AD4}" type="datetimeFigureOut">
               <a:rPr lang="en-SG" smtClean="0"/>
-              <a:t>3/4/2024</a:t>
+              <a:t>4/4/2024</a:t>
             </a:fld>
             <a:endParaRPr lang="en-SG"/>
           </a:p>
@@ -871,7 +871,7 @@
           <a:p>
             <a:fld id="{F953FF10-B1B6-4147-A9BC-BC236B7E3AD4}" type="datetimeFigureOut">
               <a:rPr lang="en-SG" smtClean="0"/>
-              <a:t>3/4/2024</a:t>
+              <a:t>4/4/2024</a:t>
             </a:fld>
             <a:endParaRPr lang="en-SG"/>
           </a:p>
@@ -1147,7 +1147,7 @@
           <a:p>
             <a:fld id="{F953FF10-B1B6-4147-A9BC-BC236B7E3AD4}" type="datetimeFigureOut">
               <a:rPr lang="en-SG" smtClean="0"/>
-              <a:t>3/4/2024</a:t>
+              <a:t>4/4/2024</a:t>
             </a:fld>
             <a:endParaRPr lang="en-SG"/>
           </a:p>
@@ -1415,7 +1415,7 @@
           <a:p>
             <a:fld id="{F953FF10-B1B6-4147-A9BC-BC236B7E3AD4}" type="datetimeFigureOut">
               <a:rPr lang="en-SG" smtClean="0"/>
-              <a:t>3/4/2024</a:t>
+              <a:t>4/4/2024</a:t>
             </a:fld>
             <a:endParaRPr lang="en-SG"/>
           </a:p>
@@ -1830,7 +1830,7 @@
           <a:p>
             <a:fld id="{F953FF10-B1B6-4147-A9BC-BC236B7E3AD4}" type="datetimeFigureOut">
               <a:rPr lang="en-SG" smtClean="0"/>
-              <a:t>3/4/2024</a:t>
+              <a:t>4/4/2024</a:t>
             </a:fld>
             <a:endParaRPr lang="en-SG"/>
           </a:p>
@@ -1972,7 +1972,7 @@
           <a:p>
             <a:fld id="{F953FF10-B1B6-4147-A9BC-BC236B7E3AD4}" type="datetimeFigureOut">
               <a:rPr lang="en-SG" smtClean="0"/>
-              <a:t>3/4/2024</a:t>
+              <a:t>4/4/2024</a:t>
             </a:fld>
             <a:endParaRPr lang="en-SG"/>
           </a:p>
@@ -2085,7 +2085,7 @@
           <a:p>
             <a:fld id="{F953FF10-B1B6-4147-A9BC-BC236B7E3AD4}" type="datetimeFigureOut">
               <a:rPr lang="en-SG" smtClean="0"/>
-              <a:t>3/4/2024</a:t>
+              <a:t>4/4/2024</a:t>
             </a:fld>
             <a:endParaRPr lang="en-SG"/>
           </a:p>
@@ -2398,7 +2398,7 @@
           <a:p>
             <a:fld id="{F953FF10-B1B6-4147-A9BC-BC236B7E3AD4}" type="datetimeFigureOut">
               <a:rPr lang="en-SG" smtClean="0"/>
-              <a:t>3/4/2024</a:t>
+              <a:t>4/4/2024</a:t>
             </a:fld>
             <a:endParaRPr lang="en-SG"/>
           </a:p>
@@ -2687,7 +2687,7 @@
           <a:p>
             <a:fld id="{F953FF10-B1B6-4147-A9BC-BC236B7E3AD4}" type="datetimeFigureOut">
               <a:rPr lang="en-SG" smtClean="0"/>
-              <a:t>3/4/2024</a:t>
+              <a:t>4/4/2024</a:t>
             </a:fld>
             <a:endParaRPr lang="en-SG"/>
           </a:p>
@@ -2930,7 +2930,7 @@
           <a:p>
             <a:fld id="{F953FF10-B1B6-4147-A9BC-BC236B7E3AD4}" type="datetimeFigureOut">
               <a:rPr lang="en-SG" smtClean="0"/>
-              <a:t>3/4/2024</a:t>
+              <a:t>4/4/2024</a:t>
             </a:fld>
             <a:endParaRPr lang="en-SG"/>
           </a:p>
@@ -3646,7 +3646,7 @@
                 <a:lumMod val="75000"/>
               </a:schemeClr>
             </a:solidFill>
-            <a:prstDash val="sysDash"/>
+            <a:prstDash val="solid"/>
           </a:ln>
         </p:spPr>
         <p:style>
@@ -5154,7 +5154,7 @@
         </p:blipFill>
         <p:spPr>
           <a:xfrm>
-            <a:off x="7529581" y="2654527"/>
+            <a:off x="7510483" y="2511594"/>
             <a:ext cx="1900047" cy="1011117"/>
           </a:xfrm>
           <a:prstGeom prst="rect">
@@ -5195,7 +5195,7 @@
         </p:blipFill>
         <p:spPr>
           <a:xfrm>
-            <a:off x="7436392" y="4235040"/>
+            <a:off x="7500272" y="3855290"/>
             <a:ext cx="2650427" cy="1111141"/>
           </a:xfrm>
           <a:prstGeom prst="rect">
@@ -5219,8 +5219,8 @@
         </p:nvCxnSpPr>
         <p:spPr>
           <a:xfrm>
-            <a:off x="6580455" y="1068567"/>
-            <a:ext cx="0" cy="4362775"/>
+            <a:off x="6580455" y="1194297"/>
+            <a:ext cx="0" cy="4652629"/>
           </a:xfrm>
           <a:prstGeom prst="line">
             <a:avLst/>
@@ -5262,7 +5262,7 @@
         </p:nvSpPr>
         <p:spPr>
           <a:xfrm>
-            <a:off x="6140384" y="809789"/>
+            <a:off x="6102922" y="969454"/>
             <a:ext cx="833305" cy="276999"/>
           </a:xfrm>
           <a:prstGeom prst="rect">
@@ -5305,13 +5305,14 @@
           </p:cNvPr>
           <p:cNvCxnSpPr>
             <a:cxnSpLocks/>
+            <a:stCxn id="2" idx="3"/>
           </p:cNvCxnSpPr>
           <p:nvPr/>
         </p:nvCxnSpPr>
         <p:spPr>
-          <a:xfrm flipV="1">
-            <a:off x="5757000" y="1651243"/>
-            <a:ext cx="833304" cy="0"/>
+          <a:xfrm>
+            <a:off x="5757001" y="1692879"/>
+            <a:ext cx="821948" cy="0"/>
           </a:xfrm>
           <a:prstGeom prst="line">
             <a:avLst/>
@@ -5355,7 +5356,7 @@
         </p:nvCxnSpPr>
         <p:spPr>
           <a:xfrm>
-            <a:off x="6590304" y="1816164"/>
+            <a:off x="6578949" y="1554109"/>
             <a:ext cx="909968" cy="0"/>
           </a:xfrm>
           <a:prstGeom prst="line">
@@ -5400,7 +5401,7 @@
         </p:nvCxnSpPr>
         <p:spPr>
           <a:xfrm>
-            <a:off x="6580455" y="3206466"/>
+            <a:off x="6569100" y="2760188"/>
             <a:ext cx="919817" cy="0"/>
           </a:xfrm>
           <a:prstGeom prst="line">
@@ -5444,9 +5445,9 @@
           <p:nvPr/>
         </p:nvCxnSpPr>
         <p:spPr>
-          <a:xfrm>
-            <a:off x="7001888" y="1191909"/>
-            <a:ext cx="0" cy="4386186"/>
+          <a:xfrm flipH="1">
+            <a:off x="6998213" y="1191909"/>
+            <a:ext cx="3675" cy="4655017"/>
           </a:xfrm>
           <a:prstGeom prst="line">
             <a:avLst/>
@@ -5490,8 +5491,8 @@
         </p:nvSpPr>
         <p:spPr>
           <a:xfrm>
-            <a:off x="6557036" y="5604515"/>
-            <a:ext cx="1534799" cy="276999"/>
+            <a:off x="6282231" y="5877583"/>
+            <a:ext cx="1121678" cy="276999"/>
           </a:xfrm>
           <a:prstGeom prst="rect">
             <a:avLst/>
@@ -5685,7 +5686,7 @@
         </p:nvCxnSpPr>
         <p:spPr>
           <a:xfrm>
-            <a:off x="6998213" y="3534619"/>
+            <a:off x="7008963" y="3273009"/>
             <a:ext cx="531368" cy="0"/>
           </a:xfrm>
           <a:prstGeom prst="line">
@@ -5732,9 +5733,9 @@
           <p:nvPr/>
         </p:nvCxnSpPr>
         <p:spPr>
-          <a:xfrm flipV="1">
-            <a:off x="7020527" y="4790611"/>
-            <a:ext cx="415865" cy="5476"/>
+          <a:xfrm>
+            <a:off x="7008963" y="4410860"/>
+            <a:ext cx="491309" cy="1"/>
           </a:xfrm>
           <a:prstGeom prst="line">
             <a:avLst/>
@@ -5814,7 +5815,7 @@
         </p:nvSpPr>
         <p:spPr>
           <a:xfrm>
-            <a:off x="7461984" y="2357476"/>
+            <a:off x="7415475" y="2226512"/>
             <a:ext cx="2208199" cy="276999"/>
           </a:xfrm>
           <a:prstGeom prst="rect">
@@ -5850,7 +5851,7 @@
         </p:nvSpPr>
         <p:spPr>
           <a:xfrm>
-            <a:off x="7357431" y="3955104"/>
+            <a:off x="7415475" y="3558404"/>
             <a:ext cx="2980916" cy="276999"/>
           </a:xfrm>
           <a:prstGeom prst="rect">
@@ -5872,6 +5873,582 @@
           </a:p>
         </p:txBody>
       </p:sp>
+      <p:sp>
+        <p:nvSpPr>
+          <p:cNvPr id="13" name="TextBox 12">
+            <a:extLst>
+              <a:ext uri="{FF2B5EF4-FFF2-40B4-BE49-F238E27FC236}">
+                <a16:creationId xmlns:a16="http://schemas.microsoft.com/office/drawing/2014/main" id="{E6537011-A8F7-D82B-4CE3-7BF486404638}"/>
+              </a:ext>
+            </a:extLst>
+          </p:cNvPr>
+          <p:cNvSpPr txBox="1"/>
+          <p:nvPr/>
+        </p:nvSpPr>
+        <p:spPr>
+          <a:xfrm>
+            <a:off x="768772" y="430357"/>
+            <a:ext cx="4532004" cy="338554"/>
+          </a:xfrm>
+          <a:prstGeom prst="rect">
+            <a:avLst/>
+          </a:prstGeom>
+          <a:noFill/>
+          <a:ln w="12700">
+            <a:solidFill>
+              <a:schemeClr val="tx1"/>
+            </a:solidFill>
+            <a:prstDash val="sysDash"/>
+          </a:ln>
+        </p:spPr>
+        <p:txBody>
+          <a:bodyPr wrap="square">
+            <a:spAutoFit/>
+          </a:bodyPr>
+          <a:lstStyle/>
+          <a:p>
+            <a:r>
+              <a:rPr lang="en-US" sz="1600" b="1" dirty="0"/>
+              <a:t>Virtual PLC/RTU System Connection Diagram</a:t>
+            </a:r>
+            <a:endParaRPr lang="en-SG" sz="1600" b="1" dirty="0"/>
+          </a:p>
+        </p:txBody>
+      </p:sp>
+      <p:sp>
+        <p:nvSpPr>
+          <p:cNvPr id="21" name="Rectangle 20">
+            <a:extLst>
+              <a:ext uri="{FF2B5EF4-FFF2-40B4-BE49-F238E27FC236}">
+                <a16:creationId xmlns:a16="http://schemas.microsoft.com/office/drawing/2014/main" id="{8C4FB91B-5D64-BA7A-D9D1-E927393DBD82}"/>
+              </a:ext>
+            </a:extLst>
+          </p:cNvPr>
+          <p:cNvSpPr/>
+          <p:nvPr/>
+        </p:nvSpPr>
+        <p:spPr>
+          <a:xfrm>
+            <a:off x="811521" y="5945067"/>
+            <a:ext cx="175568" cy="119190"/>
+          </a:xfrm>
+          <a:prstGeom prst="rect">
+            <a:avLst/>
+          </a:prstGeom>
+          <a:solidFill>
+            <a:schemeClr val="bg1">
+              <a:lumMod val="75000"/>
+            </a:schemeClr>
+          </a:solidFill>
+        </p:spPr>
+        <p:style>
+          <a:lnRef idx="2">
+            <a:schemeClr val="dk1">
+              <a:shade val="15000"/>
+            </a:schemeClr>
+          </a:lnRef>
+          <a:fillRef idx="1">
+            <a:schemeClr val="dk1"/>
+          </a:fillRef>
+          <a:effectRef idx="0">
+            <a:schemeClr val="dk1"/>
+          </a:effectRef>
+          <a:fontRef idx="minor">
+            <a:schemeClr val="lt1"/>
+          </a:fontRef>
+        </p:style>
+        <p:txBody>
+          <a:bodyPr rtlCol="0" anchor="ctr"/>
+          <a:lstStyle/>
+          <a:p>
+            <a:pPr algn="ctr"/>
+            <a:endParaRPr lang="en-SG"/>
+          </a:p>
+        </p:txBody>
+      </p:sp>
+      <p:sp>
+        <p:nvSpPr>
+          <p:cNvPr id="25" name="Rectangle 24">
+            <a:extLst>
+              <a:ext uri="{FF2B5EF4-FFF2-40B4-BE49-F238E27FC236}">
+                <a16:creationId xmlns:a16="http://schemas.microsoft.com/office/drawing/2014/main" id="{EFD2EEA6-8129-B633-BAE5-59F24640873B}"/>
+              </a:ext>
+            </a:extLst>
+          </p:cNvPr>
+          <p:cNvSpPr/>
+          <p:nvPr/>
+        </p:nvSpPr>
+        <p:spPr>
+          <a:xfrm>
+            <a:off x="1277354" y="5945067"/>
+            <a:ext cx="175568" cy="119190"/>
+          </a:xfrm>
+          <a:prstGeom prst="rect">
+            <a:avLst/>
+          </a:prstGeom>
+          <a:solidFill>
+            <a:schemeClr val="bg1">
+              <a:lumMod val="75000"/>
+            </a:schemeClr>
+          </a:solidFill>
+        </p:spPr>
+        <p:style>
+          <a:lnRef idx="2">
+            <a:schemeClr val="dk1">
+              <a:shade val="15000"/>
+            </a:schemeClr>
+          </a:lnRef>
+          <a:fillRef idx="1">
+            <a:schemeClr val="dk1"/>
+          </a:fillRef>
+          <a:effectRef idx="0">
+            <a:schemeClr val="dk1"/>
+          </a:effectRef>
+          <a:fontRef idx="minor">
+            <a:schemeClr val="lt1"/>
+          </a:fontRef>
+        </p:style>
+        <p:txBody>
+          <a:bodyPr rtlCol="0" anchor="ctr"/>
+          <a:lstStyle/>
+          <a:p>
+            <a:pPr algn="ctr"/>
+            <a:endParaRPr lang="en-SG"/>
+          </a:p>
+        </p:txBody>
+      </p:sp>
+      <p:cxnSp>
+        <p:nvCxnSpPr>
+          <p:cNvPr id="26" name="Straight Connector 25">
+            <a:extLst>
+              <a:ext uri="{FF2B5EF4-FFF2-40B4-BE49-F238E27FC236}">
+                <a16:creationId xmlns:a16="http://schemas.microsoft.com/office/drawing/2014/main" id="{6FB774B6-0575-0219-5AC9-D578FF792B39}"/>
+              </a:ext>
+            </a:extLst>
+          </p:cNvPr>
+          <p:cNvCxnSpPr>
+            <a:cxnSpLocks/>
+            <a:stCxn id="21" idx="3"/>
+            <a:endCxn id="25" idx="1"/>
+          </p:cNvCxnSpPr>
+          <p:nvPr/>
+        </p:nvCxnSpPr>
+        <p:spPr>
+          <a:xfrm>
+            <a:off x="987089" y="6004662"/>
+            <a:ext cx="290265" cy="0"/>
+          </a:xfrm>
+          <a:prstGeom prst="line">
+            <a:avLst/>
+          </a:prstGeom>
+          <a:ln>
+            <a:solidFill>
+              <a:schemeClr val="tx1"/>
+            </a:solidFill>
+          </a:ln>
+        </p:spPr>
+        <p:style>
+          <a:lnRef idx="2">
+            <a:schemeClr val="accent1"/>
+          </a:lnRef>
+          <a:fillRef idx="0">
+            <a:schemeClr val="accent1"/>
+          </a:fillRef>
+          <a:effectRef idx="1">
+            <a:schemeClr val="accent1"/>
+          </a:effectRef>
+          <a:fontRef idx="minor">
+            <a:schemeClr val="tx1"/>
+          </a:fontRef>
+        </p:style>
+      </p:cxnSp>
+      <p:sp>
+        <p:nvSpPr>
+          <p:cNvPr id="38" name="TextBox 37">
+            <a:extLst>
+              <a:ext uri="{FF2B5EF4-FFF2-40B4-BE49-F238E27FC236}">
+                <a16:creationId xmlns:a16="http://schemas.microsoft.com/office/drawing/2014/main" id="{FB194BC6-C4D8-9433-3710-3F8C647C7A28}"/>
+              </a:ext>
+            </a:extLst>
+          </p:cNvPr>
+          <p:cNvSpPr txBox="1"/>
+          <p:nvPr/>
+        </p:nvSpPr>
+        <p:spPr>
+          <a:xfrm>
+            <a:off x="1467417" y="5881514"/>
+            <a:ext cx="3006949" cy="276999"/>
+          </a:xfrm>
+          <a:prstGeom prst="rect">
+            <a:avLst/>
+          </a:prstGeom>
+          <a:noFill/>
+        </p:spPr>
+        <p:txBody>
+          <a:bodyPr wrap="square" rtlCol="0">
+            <a:spAutoFit/>
+          </a:bodyPr>
+          <a:lstStyle/>
+          <a:p>
+            <a:r>
+              <a:rPr lang="en-US" sz="1200" dirty="0"/>
+              <a:t>Electrical signal / Physical Wire Simulation</a:t>
+            </a:r>
+            <a:endParaRPr lang="en-SG" sz="1200" dirty="0"/>
+          </a:p>
+        </p:txBody>
+      </p:sp>
+      <p:cxnSp>
+        <p:nvCxnSpPr>
+          <p:cNvPr id="39" name="Straight Connector 38">
+            <a:extLst>
+              <a:ext uri="{FF2B5EF4-FFF2-40B4-BE49-F238E27FC236}">
+                <a16:creationId xmlns:a16="http://schemas.microsoft.com/office/drawing/2014/main" id="{7C8E7A00-4BAD-247F-84DE-8B0C596EC160}"/>
+              </a:ext>
+            </a:extLst>
+          </p:cNvPr>
+          <p:cNvCxnSpPr>
+            <a:cxnSpLocks/>
+          </p:cNvCxnSpPr>
+          <p:nvPr/>
+        </p:nvCxnSpPr>
+        <p:spPr>
+          <a:xfrm>
+            <a:off x="811521" y="5702449"/>
+            <a:ext cx="577735" cy="0"/>
+          </a:xfrm>
+          <a:prstGeom prst="line">
+            <a:avLst/>
+          </a:prstGeom>
+          <a:ln>
+            <a:solidFill>
+              <a:schemeClr val="accent6">
+                <a:lumMod val="75000"/>
+              </a:schemeClr>
+            </a:solidFill>
+          </a:ln>
+        </p:spPr>
+        <p:style>
+          <a:lnRef idx="2">
+            <a:schemeClr val="accent1"/>
+          </a:lnRef>
+          <a:fillRef idx="0">
+            <a:schemeClr val="accent1"/>
+          </a:fillRef>
+          <a:effectRef idx="1">
+            <a:schemeClr val="accent1"/>
+          </a:effectRef>
+          <a:fontRef idx="minor">
+            <a:schemeClr val="tx1"/>
+          </a:fontRef>
+        </p:style>
+      </p:cxnSp>
+      <p:sp>
+        <p:nvSpPr>
+          <p:cNvPr id="41" name="TextBox 40">
+            <a:extLst>
+              <a:ext uri="{FF2B5EF4-FFF2-40B4-BE49-F238E27FC236}">
+                <a16:creationId xmlns:a16="http://schemas.microsoft.com/office/drawing/2014/main" id="{9902B424-41BE-3883-0AC6-5D51049BD458}"/>
+              </a:ext>
+            </a:extLst>
+          </p:cNvPr>
+          <p:cNvSpPr txBox="1"/>
+          <p:nvPr/>
+        </p:nvSpPr>
+        <p:spPr>
+          <a:xfrm>
+            <a:off x="1505078" y="5578095"/>
+            <a:ext cx="1140630" cy="276999"/>
+          </a:xfrm>
+          <a:prstGeom prst="rect">
+            <a:avLst/>
+          </a:prstGeom>
+          <a:noFill/>
+        </p:spPr>
+        <p:txBody>
+          <a:bodyPr wrap="square" rtlCol="0">
+            <a:spAutoFit/>
+          </a:bodyPr>
+          <a:lstStyle/>
+          <a:p>
+            <a:r>
+              <a:rPr lang="en-US" sz="1200" b="1" dirty="0">
+                <a:solidFill>
+                  <a:schemeClr val="accent3">
+                    <a:lumMod val="75000"/>
+                  </a:schemeClr>
+                </a:solidFill>
+              </a:rPr>
+              <a:t>Modbus-TCP</a:t>
+            </a:r>
+            <a:r>
+              <a:rPr lang="en-US" sz="1200" b="1" dirty="0"/>
+              <a:t> </a:t>
+            </a:r>
+            <a:endParaRPr lang="en-SG" sz="1200" b="1" dirty="0"/>
+          </a:p>
+        </p:txBody>
+      </p:sp>
+      <p:cxnSp>
+        <p:nvCxnSpPr>
+          <p:cNvPr id="44" name="Straight Connector 43">
+            <a:extLst>
+              <a:ext uri="{FF2B5EF4-FFF2-40B4-BE49-F238E27FC236}">
+                <a16:creationId xmlns:a16="http://schemas.microsoft.com/office/drawing/2014/main" id="{1E702276-852E-0C13-A357-027D8A003932}"/>
+              </a:ext>
+            </a:extLst>
+          </p:cNvPr>
+          <p:cNvCxnSpPr>
+            <a:cxnSpLocks/>
+          </p:cNvCxnSpPr>
+          <p:nvPr/>
+        </p:nvCxnSpPr>
+        <p:spPr>
+          <a:xfrm flipV="1">
+            <a:off x="2812057" y="5702951"/>
+            <a:ext cx="415865" cy="5476"/>
+          </a:xfrm>
+          <a:prstGeom prst="line">
+            <a:avLst/>
+          </a:prstGeom>
+          <a:ln>
+            <a:solidFill>
+              <a:schemeClr val="tx2">
+                <a:lumMod val="75000"/>
+                <a:lumOff val="25000"/>
+              </a:schemeClr>
+            </a:solidFill>
+            <a:prstDash val="sysDash"/>
+          </a:ln>
+        </p:spPr>
+        <p:style>
+          <a:lnRef idx="2">
+            <a:schemeClr val="accent1"/>
+          </a:lnRef>
+          <a:fillRef idx="0">
+            <a:schemeClr val="accent1"/>
+          </a:fillRef>
+          <a:effectRef idx="1">
+            <a:schemeClr val="accent1"/>
+          </a:effectRef>
+          <a:fontRef idx="minor">
+            <a:schemeClr val="tx1"/>
+          </a:fontRef>
+        </p:style>
+      </p:cxnSp>
+      <p:sp>
+        <p:nvSpPr>
+          <p:cNvPr id="45" name="TextBox 44">
+            <a:extLst>
+              <a:ext uri="{FF2B5EF4-FFF2-40B4-BE49-F238E27FC236}">
+                <a16:creationId xmlns:a16="http://schemas.microsoft.com/office/drawing/2014/main" id="{C3481E5B-2D6F-8AC1-54D7-1A3C3FE941C5}"/>
+              </a:ext>
+            </a:extLst>
+          </p:cNvPr>
+          <p:cNvSpPr txBox="1"/>
+          <p:nvPr/>
+        </p:nvSpPr>
+        <p:spPr>
+          <a:xfrm>
+            <a:off x="3226116" y="5569927"/>
+            <a:ext cx="1534799" cy="276999"/>
+          </a:xfrm>
+          <a:prstGeom prst="rect">
+            <a:avLst/>
+          </a:prstGeom>
+          <a:noFill/>
+        </p:spPr>
+        <p:txBody>
+          <a:bodyPr wrap="square" rtlCol="0">
+            <a:spAutoFit/>
+          </a:bodyPr>
+          <a:lstStyle/>
+          <a:p>
+            <a:r>
+              <a:rPr lang="en-US" sz="1200" b="1" dirty="0">
+                <a:solidFill>
+                  <a:schemeClr val="tx2">
+                    <a:lumMod val="75000"/>
+                    <a:lumOff val="25000"/>
+                  </a:schemeClr>
+                </a:solidFill>
+              </a:rPr>
+              <a:t>S7Comm bus </a:t>
+            </a:r>
+            <a:endParaRPr lang="en-SG" sz="1200" b="1" dirty="0">
+              <a:solidFill>
+                <a:schemeClr val="tx2">
+                  <a:lumMod val="75000"/>
+                  <a:lumOff val="25000"/>
+                </a:schemeClr>
+              </a:solidFill>
+            </a:endParaRPr>
+          </a:p>
+        </p:txBody>
+      </p:sp>
+      <p:pic>
+        <p:nvPicPr>
+          <p:cNvPr id="46" name="Picture 45">
+            <a:extLst>
+              <a:ext uri="{FF2B5EF4-FFF2-40B4-BE49-F238E27FC236}">
+                <a16:creationId xmlns:a16="http://schemas.microsoft.com/office/drawing/2014/main" id="{D4582A2D-14C9-2B61-966A-386E586EEB5E}"/>
+              </a:ext>
+            </a:extLst>
+          </p:cNvPr>
+          <p:cNvPicPr>
+            <a:picLocks noChangeAspect="1"/>
+          </p:cNvPicPr>
+          <p:nvPr/>
+        </p:nvPicPr>
+        <p:blipFill rotWithShape="1">
+          <a:blip r:embed="rId10"/>
+          <a:srcRect b="18796"/>
+          <a:stretch/>
+        </p:blipFill>
+        <p:spPr>
+          <a:xfrm>
+            <a:off x="7475746" y="5268534"/>
+            <a:ext cx="2013279" cy="795723"/>
+          </a:xfrm>
+          <a:prstGeom prst="rect">
+            <a:avLst/>
+          </a:prstGeom>
+          <a:ln w="9525">
+            <a:solidFill>
+              <a:schemeClr val="tx1"/>
+            </a:solidFill>
+          </a:ln>
+        </p:spPr>
+      </p:pic>
+      <p:sp>
+        <p:nvSpPr>
+          <p:cNvPr id="60" name="TextBox 59">
+            <a:extLst>
+              <a:ext uri="{FF2B5EF4-FFF2-40B4-BE49-F238E27FC236}">
+                <a16:creationId xmlns:a16="http://schemas.microsoft.com/office/drawing/2014/main" id="{E88E917E-43F4-3E13-DF56-7BC4A518B996}"/>
+              </a:ext>
+            </a:extLst>
+          </p:cNvPr>
+          <p:cNvSpPr txBox="1"/>
+          <p:nvPr/>
+        </p:nvSpPr>
+        <p:spPr>
+          <a:xfrm>
+            <a:off x="7428126" y="5030466"/>
+            <a:ext cx="2460919" cy="276999"/>
+          </a:xfrm>
+          <a:prstGeom prst="rect">
+            <a:avLst/>
+          </a:prstGeom>
+          <a:noFill/>
+        </p:spPr>
+        <p:txBody>
+          <a:bodyPr wrap="square" rtlCol="0">
+            <a:spAutoFit/>
+          </a:bodyPr>
+          <a:lstStyle/>
+          <a:p>
+            <a:r>
+              <a:rPr lang="en-US" sz="1200" b="1" dirty="0"/>
+              <a:t>Transformer display panel </a:t>
+            </a:r>
+            <a:endParaRPr lang="en-SG" sz="1200" b="1" dirty="0"/>
+          </a:p>
+        </p:txBody>
+      </p:sp>
+      <p:cxnSp>
+        <p:nvCxnSpPr>
+          <p:cNvPr id="65" name="Straight Connector 64">
+            <a:extLst>
+              <a:ext uri="{FF2B5EF4-FFF2-40B4-BE49-F238E27FC236}">
+                <a16:creationId xmlns:a16="http://schemas.microsoft.com/office/drawing/2014/main" id="{AA7EF537-4CFE-A54C-12A0-AD93D3B30BA6}"/>
+              </a:ext>
+            </a:extLst>
+          </p:cNvPr>
+          <p:cNvCxnSpPr>
+            <a:cxnSpLocks/>
+          </p:cNvCxnSpPr>
+          <p:nvPr/>
+        </p:nvCxnSpPr>
+        <p:spPr>
+          <a:xfrm>
+            <a:off x="7008963" y="5522000"/>
+            <a:ext cx="491309" cy="1"/>
+          </a:xfrm>
+          <a:prstGeom prst="line">
+            <a:avLst/>
+          </a:prstGeom>
+          <a:ln>
+            <a:solidFill>
+              <a:schemeClr val="tx2">
+                <a:lumMod val="75000"/>
+                <a:lumOff val="25000"/>
+              </a:schemeClr>
+            </a:solidFill>
+            <a:prstDash val="sysDash"/>
+          </a:ln>
+        </p:spPr>
+        <p:style>
+          <a:lnRef idx="2">
+            <a:schemeClr val="accent1"/>
+          </a:lnRef>
+          <a:fillRef idx="0">
+            <a:schemeClr val="accent1"/>
+          </a:fillRef>
+          <a:effectRef idx="1">
+            <a:schemeClr val="accent1"/>
+          </a:effectRef>
+          <a:fontRef idx="minor">
+            <a:schemeClr val="tx1"/>
+          </a:fontRef>
+        </p:style>
+      </p:cxnSp>
+      <p:cxnSp>
+        <p:nvCxnSpPr>
+          <p:cNvPr id="69" name="Straight Connector 68">
+            <a:extLst>
+              <a:ext uri="{FF2B5EF4-FFF2-40B4-BE49-F238E27FC236}">
+                <a16:creationId xmlns:a16="http://schemas.microsoft.com/office/drawing/2014/main" id="{FF80EB93-95AD-DC1A-B4B9-96E5B4F09674}"/>
+              </a:ext>
+            </a:extLst>
+          </p:cNvPr>
+          <p:cNvCxnSpPr>
+            <a:cxnSpLocks/>
+            <a:endCxn id="46" idx="1"/>
+          </p:cNvCxnSpPr>
+          <p:nvPr/>
+        </p:nvCxnSpPr>
+        <p:spPr>
+          <a:xfrm>
+            <a:off x="6578949" y="5666396"/>
+            <a:ext cx="896797" cy="0"/>
+          </a:xfrm>
+          <a:prstGeom prst="line">
+            <a:avLst/>
+          </a:prstGeom>
+          <a:ln>
+            <a:solidFill>
+              <a:schemeClr val="accent6">
+                <a:lumMod val="75000"/>
+              </a:schemeClr>
+            </a:solidFill>
+          </a:ln>
+        </p:spPr>
+        <p:style>
+          <a:lnRef idx="2">
+            <a:schemeClr val="accent1"/>
+          </a:lnRef>
+          <a:fillRef idx="0">
+            <a:schemeClr val="accent1"/>
+          </a:fillRef>
+          <a:effectRef idx="1">
+            <a:schemeClr val="accent1"/>
+          </a:effectRef>
+          <a:fontRef idx="minor">
+            <a:schemeClr val="tx1"/>
+          </a:fontRef>
+        </p:style>
+      </p:cxnSp>
     </p:spTree>
     <p:extLst>
       <p:ext uri="{BB962C8B-B14F-4D97-AF65-F5344CB8AC3E}">

</xml_diff>

<commit_message>
Update the code and design document.
</commit_message>
<xml_diff>
--- a/doc/designDoc.pptx
+++ b/doc/designDoc.pptx
@@ -206,7 +206,7 @@
           <a:p>
             <a:fld id="{CA98FC0A-A656-46B8-8BCE-B9957593F2EC}" type="datetimeFigureOut">
               <a:rPr lang="en-SG" smtClean="0"/>
-              <a:t>28/6/2024</a:t>
+              <a:t>29/6/2024</a:t>
             </a:fld>
             <a:endParaRPr lang="en-SG"/>
           </a:p>
@@ -707,7 +707,7 @@
           <a:p>
             <a:fld id="{F953FF10-B1B6-4147-A9BC-BC236B7E3AD4}" type="datetimeFigureOut">
               <a:rPr lang="en-SG" smtClean="0"/>
-              <a:t>28/6/2024</a:t>
+              <a:t>29/6/2024</a:t>
             </a:fld>
             <a:endParaRPr lang="en-SG"/>
           </a:p>
@@ -907,7 +907,7 @@
           <a:p>
             <a:fld id="{F953FF10-B1B6-4147-A9BC-BC236B7E3AD4}" type="datetimeFigureOut">
               <a:rPr lang="en-SG" smtClean="0"/>
-              <a:t>28/6/2024</a:t>
+              <a:t>29/6/2024</a:t>
             </a:fld>
             <a:endParaRPr lang="en-SG"/>
           </a:p>
@@ -1117,7 +1117,7 @@
           <a:p>
             <a:fld id="{F953FF10-B1B6-4147-A9BC-BC236B7E3AD4}" type="datetimeFigureOut">
               <a:rPr lang="en-SG" smtClean="0"/>
-              <a:t>28/6/2024</a:t>
+              <a:t>29/6/2024</a:t>
             </a:fld>
             <a:endParaRPr lang="en-SG"/>
           </a:p>
@@ -1317,7 +1317,7 @@
           <a:p>
             <a:fld id="{F953FF10-B1B6-4147-A9BC-BC236B7E3AD4}" type="datetimeFigureOut">
               <a:rPr lang="en-SG" smtClean="0"/>
-              <a:t>28/6/2024</a:t>
+              <a:t>29/6/2024</a:t>
             </a:fld>
             <a:endParaRPr lang="en-SG"/>
           </a:p>
@@ -1593,7 +1593,7 @@
           <a:p>
             <a:fld id="{F953FF10-B1B6-4147-A9BC-BC236B7E3AD4}" type="datetimeFigureOut">
               <a:rPr lang="en-SG" smtClean="0"/>
-              <a:t>28/6/2024</a:t>
+              <a:t>29/6/2024</a:t>
             </a:fld>
             <a:endParaRPr lang="en-SG"/>
           </a:p>
@@ -1861,7 +1861,7 @@
           <a:p>
             <a:fld id="{F953FF10-B1B6-4147-A9BC-BC236B7E3AD4}" type="datetimeFigureOut">
               <a:rPr lang="en-SG" smtClean="0"/>
-              <a:t>28/6/2024</a:t>
+              <a:t>29/6/2024</a:t>
             </a:fld>
             <a:endParaRPr lang="en-SG"/>
           </a:p>
@@ -2276,7 +2276,7 @@
           <a:p>
             <a:fld id="{F953FF10-B1B6-4147-A9BC-BC236B7E3AD4}" type="datetimeFigureOut">
               <a:rPr lang="en-SG" smtClean="0"/>
-              <a:t>28/6/2024</a:t>
+              <a:t>29/6/2024</a:t>
             </a:fld>
             <a:endParaRPr lang="en-SG"/>
           </a:p>
@@ -2418,7 +2418,7 @@
           <a:p>
             <a:fld id="{F953FF10-B1B6-4147-A9BC-BC236B7E3AD4}" type="datetimeFigureOut">
               <a:rPr lang="en-SG" smtClean="0"/>
-              <a:t>28/6/2024</a:t>
+              <a:t>29/6/2024</a:t>
             </a:fld>
             <a:endParaRPr lang="en-SG"/>
           </a:p>
@@ -2531,7 +2531,7 @@
           <a:p>
             <a:fld id="{F953FF10-B1B6-4147-A9BC-BC236B7E3AD4}" type="datetimeFigureOut">
               <a:rPr lang="en-SG" smtClean="0"/>
-              <a:t>28/6/2024</a:t>
+              <a:t>29/6/2024</a:t>
             </a:fld>
             <a:endParaRPr lang="en-SG"/>
           </a:p>
@@ -2844,7 +2844,7 @@
           <a:p>
             <a:fld id="{F953FF10-B1B6-4147-A9BC-BC236B7E3AD4}" type="datetimeFigureOut">
               <a:rPr lang="en-SG" smtClean="0"/>
-              <a:t>28/6/2024</a:t>
+              <a:t>29/6/2024</a:t>
             </a:fld>
             <a:endParaRPr lang="en-SG"/>
           </a:p>
@@ -3133,7 +3133,7 @@
           <a:p>
             <a:fld id="{F953FF10-B1B6-4147-A9BC-BC236B7E3AD4}" type="datetimeFigureOut">
               <a:rPr lang="en-SG" smtClean="0"/>
-              <a:t>28/6/2024</a:t>
+              <a:t>29/6/2024</a:t>
             </a:fld>
             <a:endParaRPr lang="en-SG"/>
           </a:p>
@@ -3376,7 +3376,7 @@
           <a:p>
             <a:fld id="{F953FF10-B1B6-4147-A9BC-BC236B7E3AD4}" type="datetimeFigureOut">
               <a:rPr lang="en-SG" smtClean="0"/>
-              <a:t>28/6/2024</a:t>
+              <a:t>29/6/2024</a:t>
             </a:fld>
             <a:endParaRPr lang="en-SG"/>
           </a:p>
@@ -22203,6 +22203,56 @@
           <a:chExt cx="0" cy="0"/>
         </a:xfrm>
       </p:grpSpPr>
+      <p:sp>
+        <p:nvSpPr>
+          <p:cNvPr id="4" name="Rectangle 3">
+            <a:extLst>
+              <a:ext uri="{FF2B5EF4-FFF2-40B4-BE49-F238E27FC236}">
+                <a16:creationId xmlns:a16="http://schemas.microsoft.com/office/drawing/2014/main" id="{B68081F3-FB43-94D6-5BDD-32B6477220F2}"/>
+              </a:ext>
+            </a:extLst>
+          </p:cNvPr>
+          <p:cNvSpPr/>
+          <p:nvPr/>
+        </p:nvSpPr>
+        <p:spPr>
+          <a:xfrm>
+            <a:off x="1953928" y="1164657"/>
+            <a:ext cx="6766560" cy="3869356"/>
+          </a:xfrm>
+          <a:prstGeom prst="rect">
+            <a:avLst/>
+          </a:prstGeom>
+          <a:noFill/>
+          <a:ln>
+            <a:prstDash val="sysDash"/>
+          </a:ln>
+        </p:spPr>
+        <p:style>
+          <a:lnRef idx="2">
+            <a:schemeClr val="accent1">
+              <a:shade val="15000"/>
+            </a:schemeClr>
+          </a:lnRef>
+          <a:fillRef idx="1">
+            <a:schemeClr val="accent1"/>
+          </a:fillRef>
+          <a:effectRef idx="0">
+            <a:schemeClr val="accent1"/>
+          </a:effectRef>
+          <a:fontRef idx="minor">
+            <a:schemeClr val="lt1"/>
+          </a:fontRef>
+        </p:style>
+        <p:txBody>
+          <a:bodyPr rtlCol="0" anchor="ctr"/>
+          <a:lstStyle/>
+          <a:p>
+            <a:pPr algn="ctr"/>
+            <a:endParaRPr lang="en-SG"/>
+          </a:p>
+        </p:txBody>
+      </p:sp>
       <p:pic>
         <p:nvPicPr>
           <p:cNvPr id="5" name="Picture 4">
@@ -22416,7 +22466,7 @@
         </p:nvCxnSpPr>
         <p:spPr>
           <a:xfrm>
-            <a:off x="3760237" y="3700272"/>
+            <a:off x="3760237" y="3709897"/>
             <a:ext cx="1617499" cy="0"/>
           </a:xfrm>
           <a:prstGeom prst="straightConnector1">
@@ -22970,7 +23020,13 @@
           <a:lstStyle/>
           <a:p>
             <a:r>
-              <a:rPr lang="en-SG" sz="1200" b="1" dirty="0"/>
+              <a:rPr lang="en-SG" sz="1200" b="1" dirty="0">
+                <a:solidFill>
+                  <a:schemeClr val="accent2">
+                    <a:lumMod val="75000"/>
+                  </a:schemeClr>
+                </a:solidFill>
+              </a:rPr>
               <a:t>Electrical signals </a:t>
             </a:r>
           </a:p>
@@ -23161,7 +23217,7 @@
           <a:p>
             <a:r>
               <a:rPr lang="en-SG" sz="1200" b="1" dirty="0"/>
-              <a:t>Signal</a:t>
+              <a:t>Signals</a:t>
             </a:r>
           </a:p>
         </p:txBody>
@@ -23180,7 +23236,7 @@
         </p:nvSpPr>
         <p:spPr>
           <a:xfrm>
-            <a:off x="2537854" y="3682258"/>
+            <a:off x="2525967" y="2314237"/>
             <a:ext cx="1175788" cy="461665"/>
           </a:xfrm>
           <a:prstGeom prst="rect">
@@ -23232,9 +23288,7 @@
             <a:r>
               <a:rPr lang="en-SG" sz="1200" b="1" dirty="0">
                 <a:solidFill>
-                  <a:schemeClr val="accent4">
-                    <a:lumMod val="75000"/>
-                  </a:schemeClr>
+                  <a:srgbClr val="0070C0"/>
                 </a:solidFill>
               </a:rPr>
               <a:t>SCADA Network</a:t>
@@ -23332,7 +23386,7 @@
           <a:p>
             <a:r>
               <a:rPr lang="en-SG" sz="1200" b="1" dirty="0"/>
-              <a:t>Motor</a:t>
+              <a:t>Motors</a:t>
             </a:r>
           </a:p>
         </p:txBody>
@@ -23427,8 +23481,100 @@
           <a:p>
             <a:r>
               <a:rPr lang="en-SG" sz="1200" b="1" dirty="0"/>
-              <a:t>Pump</a:t>
+              <a:t>Pumps</a:t>
             </a:r>
+          </a:p>
+        </p:txBody>
+      </p:sp>
+      <p:sp>
+        <p:nvSpPr>
+          <p:cNvPr id="2" name="TextBox 1">
+            <a:extLst>
+              <a:ext uri="{FF2B5EF4-FFF2-40B4-BE49-F238E27FC236}">
+                <a16:creationId xmlns:a16="http://schemas.microsoft.com/office/drawing/2014/main" id="{6E08DDEB-00FA-2F45-E8FF-10DD130F1164}"/>
+              </a:ext>
+            </a:extLst>
+          </p:cNvPr>
+          <p:cNvSpPr txBox="1"/>
+          <p:nvPr/>
+        </p:nvSpPr>
+        <p:spPr>
+          <a:xfrm>
+            <a:off x="4295139" y="2466809"/>
+            <a:ext cx="1175788" cy="276999"/>
+          </a:xfrm>
+          <a:prstGeom prst="rect">
+            <a:avLst/>
+          </a:prstGeom>
+          <a:noFill/>
+        </p:spPr>
+        <p:txBody>
+          <a:bodyPr wrap="square" rtlCol="0">
+            <a:spAutoFit/>
+          </a:bodyPr>
+          <a:lstStyle/>
+          <a:p>
+            <a:r>
+              <a:rPr lang="en-US" sz="1200" b="1" dirty="0">
+                <a:solidFill>
+                  <a:schemeClr val="accent6">
+                    <a:lumMod val="50000"/>
+                  </a:schemeClr>
+                </a:solidFill>
+              </a:rPr>
+              <a:t>Modbus-TCP</a:t>
+            </a:r>
+            <a:endParaRPr lang="en-SG" sz="1200" b="1" dirty="0">
+              <a:solidFill>
+                <a:schemeClr val="accent6">
+                  <a:lumMod val="50000"/>
+                </a:schemeClr>
+              </a:solidFill>
+            </a:endParaRPr>
+          </a:p>
+        </p:txBody>
+      </p:sp>
+      <p:sp>
+        <p:nvSpPr>
+          <p:cNvPr id="3" name="TextBox 2">
+            <a:extLst>
+              <a:ext uri="{FF2B5EF4-FFF2-40B4-BE49-F238E27FC236}">
+                <a16:creationId xmlns:a16="http://schemas.microsoft.com/office/drawing/2014/main" id="{87677088-D7C6-CB05-F3BD-D1EF748ABB06}"/>
+              </a:ext>
+            </a:extLst>
+          </p:cNvPr>
+          <p:cNvSpPr txBox="1"/>
+          <p:nvPr/>
+        </p:nvSpPr>
+        <p:spPr>
+          <a:xfrm>
+            <a:off x="4368818" y="3742765"/>
+            <a:ext cx="1175788" cy="276999"/>
+          </a:xfrm>
+          <a:prstGeom prst="rect">
+            <a:avLst/>
+          </a:prstGeom>
+          <a:noFill/>
+        </p:spPr>
+        <p:txBody>
+          <a:bodyPr wrap="square" rtlCol="0">
+            <a:spAutoFit/>
+          </a:bodyPr>
+          <a:lstStyle/>
+          <a:p>
+            <a:r>
+              <a:rPr lang="en-US" sz="1200" b="1" dirty="0">
+                <a:solidFill>
+                  <a:srgbClr val="0070C0"/>
+                </a:solidFill>
+              </a:rPr>
+              <a:t>S7Comm</a:t>
+            </a:r>
+            <a:endParaRPr lang="en-SG" sz="1200" b="1" dirty="0">
+              <a:solidFill>
+                <a:srgbClr val="0070C0"/>
+              </a:solidFill>
+            </a:endParaRPr>
           </a:p>
         </p:txBody>
       </p:sp>
@@ -24596,7 +24742,7 @@
         </p:nvSpPr>
         <p:spPr>
           <a:xfrm>
-            <a:off x="3050005" y="3734495"/>
+            <a:off x="2888351" y="3507029"/>
             <a:ext cx="552010" cy="276999"/>
           </a:xfrm>
           <a:prstGeom prst="rect">
@@ -24941,8 +25087,8 @@
         </p:nvCxnSpPr>
         <p:spPr>
           <a:xfrm rot="16200000" flipH="1">
-            <a:off x="2373402" y="3196392"/>
-            <a:ext cx="1207630" cy="145576"/>
+            <a:off x="2338548" y="3095726"/>
+            <a:ext cx="979994" cy="119612"/>
           </a:xfrm>
           <a:prstGeom prst="bentConnector2">
             <a:avLst/>
@@ -24983,8 +25129,8 @@
         </p:nvCxnSpPr>
         <p:spPr>
           <a:xfrm rot="16200000" flipH="1">
-            <a:off x="1651929" y="3193784"/>
-            <a:ext cx="1183188" cy="178111"/>
+            <a:off x="1623413" y="3072730"/>
+            <a:ext cx="947222" cy="156932"/>
           </a:xfrm>
           <a:prstGeom prst="bentConnector2">
             <a:avLst/>
@@ -25022,7 +25168,7 @@
         </p:nvSpPr>
         <p:spPr>
           <a:xfrm>
-            <a:off x="2332579" y="3735934"/>
+            <a:off x="2175490" y="3486307"/>
             <a:ext cx="552010" cy="276999"/>
           </a:xfrm>
           <a:prstGeom prst="rect">
@@ -25495,7 +25641,7 @@
           <p:nvPr>
             <p:extLst>
               <p:ext uri="{D42A27DB-BD31-4B8C-83A1-F6EECF244321}">
-                <p14:modId xmlns:p14="http://schemas.microsoft.com/office/powerpoint/2010/main" val="797039819"/>
+                <p14:modId xmlns:p14="http://schemas.microsoft.com/office/powerpoint/2010/main" val="836521037"/>
               </p:ext>
             </p:extLst>
           </p:nvPr>
@@ -25643,7 +25789,7 @@
                       </a:pPr>
                       <a:r>
                         <a:rPr lang="en-US" sz="900" dirty="0"/>
-                        <a:t>( 1 bytes ) </a:t>
+                        <a:t>( 2 bytes ) </a:t>
                       </a:r>
                       <a:endParaRPr lang="en-SG" sz="900" dirty="0"/>
                     </a:p>
@@ -25674,7 +25820,7 @@
                       </a:pPr>
                       <a:r>
                         <a:rPr lang="en-US" sz="900" dirty="0"/>
-                        <a:t>( 2 bytes ) </a:t>
+                        <a:t>( 1 bytes ) </a:t>
                       </a:r>
                       <a:endParaRPr lang="en-SG" sz="900" dirty="0"/>
                     </a:p>
@@ -25974,7 +26120,7 @@
         </p:nvCxnSpPr>
         <p:spPr>
           <a:xfrm rot="16200000" flipH="1">
-            <a:off x="8056665" y="3406285"/>
+            <a:off x="7401814" y="3416065"/>
             <a:ext cx="235746" cy="143676"/>
           </a:xfrm>
           <a:prstGeom prst="bentConnector2">
@@ -26013,7 +26159,7 @@
         </p:nvSpPr>
         <p:spPr>
           <a:xfrm>
-            <a:off x="8246376" y="3457496"/>
+            <a:off x="7591525" y="3467276"/>
             <a:ext cx="552010" cy="276999"/>
           </a:xfrm>
           <a:prstGeom prst="rect">
@@ -26070,7 +26216,7 @@
         </p:nvCxnSpPr>
         <p:spPr>
           <a:xfrm rot="16200000" flipH="1">
-            <a:off x="7379366" y="3421838"/>
+            <a:off x="8192931" y="3435203"/>
             <a:ext cx="235746" cy="143676"/>
           </a:xfrm>
           <a:prstGeom prst="bentConnector2">
@@ -26109,7 +26255,7 @@
         </p:nvSpPr>
         <p:spPr>
           <a:xfrm>
-            <a:off x="7569077" y="3473049"/>
+            <a:off x="8382642" y="3486414"/>
             <a:ext cx="552010" cy="276999"/>
           </a:xfrm>
           <a:prstGeom prst="rect">

</xml_diff>

<commit_message>
Update the ModBus PLC simulation lib to 1.4 version.
</commit_message>
<xml_diff>
--- a/doc/designDoc.pptx
+++ b/doc/designDoc.pptx
@@ -5,7 +5,7 @@
     <p:sldMasterId id="2147483648" r:id="rId1"/>
   </p:sldMasterIdLst>
   <p:notesMasterIdLst>
-    <p:notesMasterId r:id="rId12"/>
+    <p:notesMasterId r:id="rId13"/>
   </p:notesMasterIdLst>
   <p:sldIdLst>
     <p:sldId id="256" r:id="rId2"/>
@@ -18,6 +18,7 @@
     <p:sldId id="264" r:id="rId9"/>
     <p:sldId id="265" r:id="rId10"/>
     <p:sldId id="259" r:id="rId11"/>
+    <p:sldId id="266" r:id="rId12"/>
   </p:sldIdLst>
   <p:sldSz cx="12192000" cy="6858000"/>
   <p:notesSz cx="6858000" cy="9144000"/>
@@ -206,7 +207,7 @@
           <a:p>
             <a:fld id="{CA98FC0A-A656-46B8-8BCE-B9957593F2EC}" type="datetimeFigureOut">
               <a:rPr lang="en-SG" smtClean="0"/>
-              <a:t>29/6/2024</a:t>
+              <a:t>16/4/2025</a:t>
             </a:fld>
             <a:endParaRPr lang="en-SG"/>
           </a:p>
@@ -707,7 +708,7 @@
           <a:p>
             <a:fld id="{F953FF10-B1B6-4147-A9BC-BC236B7E3AD4}" type="datetimeFigureOut">
               <a:rPr lang="en-SG" smtClean="0"/>
-              <a:t>29/6/2024</a:t>
+              <a:t>16/4/2025</a:t>
             </a:fld>
             <a:endParaRPr lang="en-SG"/>
           </a:p>
@@ -907,7 +908,7 @@
           <a:p>
             <a:fld id="{F953FF10-B1B6-4147-A9BC-BC236B7E3AD4}" type="datetimeFigureOut">
               <a:rPr lang="en-SG" smtClean="0"/>
-              <a:t>29/6/2024</a:t>
+              <a:t>16/4/2025</a:t>
             </a:fld>
             <a:endParaRPr lang="en-SG"/>
           </a:p>
@@ -1117,7 +1118,7 @@
           <a:p>
             <a:fld id="{F953FF10-B1B6-4147-A9BC-BC236B7E3AD4}" type="datetimeFigureOut">
               <a:rPr lang="en-SG" smtClean="0"/>
-              <a:t>29/6/2024</a:t>
+              <a:t>16/4/2025</a:t>
             </a:fld>
             <a:endParaRPr lang="en-SG"/>
           </a:p>
@@ -1317,7 +1318,7 @@
           <a:p>
             <a:fld id="{F953FF10-B1B6-4147-A9BC-BC236B7E3AD4}" type="datetimeFigureOut">
               <a:rPr lang="en-SG" smtClean="0"/>
-              <a:t>29/6/2024</a:t>
+              <a:t>16/4/2025</a:t>
             </a:fld>
             <a:endParaRPr lang="en-SG"/>
           </a:p>
@@ -1593,7 +1594,7 @@
           <a:p>
             <a:fld id="{F953FF10-B1B6-4147-A9BC-BC236B7E3AD4}" type="datetimeFigureOut">
               <a:rPr lang="en-SG" smtClean="0"/>
-              <a:t>29/6/2024</a:t>
+              <a:t>16/4/2025</a:t>
             </a:fld>
             <a:endParaRPr lang="en-SG"/>
           </a:p>
@@ -1861,7 +1862,7 @@
           <a:p>
             <a:fld id="{F953FF10-B1B6-4147-A9BC-BC236B7E3AD4}" type="datetimeFigureOut">
               <a:rPr lang="en-SG" smtClean="0"/>
-              <a:t>29/6/2024</a:t>
+              <a:t>16/4/2025</a:t>
             </a:fld>
             <a:endParaRPr lang="en-SG"/>
           </a:p>
@@ -2276,7 +2277,7 @@
           <a:p>
             <a:fld id="{F953FF10-B1B6-4147-A9BC-BC236B7E3AD4}" type="datetimeFigureOut">
               <a:rPr lang="en-SG" smtClean="0"/>
-              <a:t>29/6/2024</a:t>
+              <a:t>16/4/2025</a:t>
             </a:fld>
             <a:endParaRPr lang="en-SG"/>
           </a:p>
@@ -2418,7 +2419,7 @@
           <a:p>
             <a:fld id="{F953FF10-B1B6-4147-A9BC-BC236B7E3AD4}" type="datetimeFigureOut">
               <a:rPr lang="en-SG" smtClean="0"/>
-              <a:t>29/6/2024</a:t>
+              <a:t>16/4/2025</a:t>
             </a:fld>
             <a:endParaRPr lang="en-SG"/>
           </a:p>
@@ -2531,7 +2532,7 @@
           <a:p>
             <a:fld id="{F953FF10-B1B6-4147-A9BC-BC236B7E3AD4}" type="datetimeFigureOut">
               <a:rPr lang="en-SG" smtClean="0"/>
-              <a:t>29/6/2024</a:t>
+              <a:t>16/4/2025</a:t>
             </a:fld>
             <a:endParaRPr lang="en-SG"/>
           </a:p>
@@ -2844,7 +2845,7 @@
           <a:p>
             <a:fld id="{F953FF10-B1B6-4147-A9BC-BC236B7E3AD4}" type="datetimeFigureOut">
               <a:rPr lang="en-SG" smtClean="0"/>
-              <a:t>29/6/2024</a:t>
+              <a:t>16/4/2025</a:t>
             </a:fld>
             <a:endParaRPr lang="en-SG"/>
           </a:p>
@@ -3133,7 +3134,7 @@
           <a:p>
             <a:fld id="{F953FF10-B1B6-4147-A9BC-BC236B7E3AD4}" type="datetimeFigureOut">
               <a:rPr lang="en-SG" smtClean="0"/>
-              <a:t>29/6/2024</a:t>
+              <a:t>16/4/2025</a:t>
             </a:fld>
             <a:endParaRPr lang="en-SG"/>
           </a:p>
@@ -3376,7 +3377,7 @@
           <a:p>
             <a:fld id="{F953FF10-B1B6-4147-A9BC-BC236B7E3AD4}" type="datetimeFigureOut">
               <a:rPr lang="en-SG" smtClean="0"/>
-              <a:t>29/6/2024</a:t>
+              <a:t>16/4/2025</a:t>
             </a:fld>
             <a:endParaRPr lang="en-SG"/>
           </a:p>
@@ -11283,6 +11284,2037 @@
     <p:extLst>
       <p:ext uri="{BB962C8B-B14F-4D97-AF65-F5344CB8AC3E}">
         <p14:creationId xmlns:p14="http://schemas.microsoft.com/office/powerpoint/2010/main" val="1039190101"/>
+      </p:ext>
+    </p:extLst>
+  </p:cSld>
+  <p:clrMapOvr>
+    <a:masterClrMapping/>
+  </p:clrMapOvr>
+</p:sld>
+</file>
+
+<file path=ppt/slides/slide11.xml><?xml version="1.0" encoding="utf-8"?>
+<p:sld xmlns:a="http://schemas.openxmlformats.org/drawingml/2006/main" xmlns:r="http://schemas.openxmlformats.org/officeDocument/2006/relationships" xmlns:p="http://schemas.openxmlformats.org/presentationml/2006/main">
+  <p:cSld>
+    <p:spTree>
+      <p:nvGrpSpPr>
+        <p:cNvPr id="1" name=""/>
+        <p:cNvGrpSpPr/>
+        <p:nvPr/>
+      </p:nvGrpSpPr>
+      <p:grpSpPr>
+        <a:xfrm>
+          <a:off x="0" y="0"/>
+          <a:ext cx="0" cy="0"/>
+          <a:chOff x="0" y="0"/>
+          <a:chExt cx="0" cy="0"/>
+        </a:xfrm>
+      </p:grpSpPr>
+      <p:sp>
+        <p:nvSpPr>
+          <p:cNvPr id="2" name="Rectangle 1">
+            <a:extLst>
+              <a:ext uri="{FF2B5EF4-FFF2-40B4-BE49-F238E27FC236}">
+                <a16:creationId xmlns:a16="http://schemas.microsoft.com/office/drawing/2014/main" id="{DE96234B-80A7-2EE0-4853-28E53BE4995E}"/>
+              </a:ext>
+            </a:extLst>
+          </p:cNvPr>
+          <p:cNvSpPr/>
+          <p:nvPr/>
+        </p:nvSpPr>
+        <p:spPr>
+          <a:xfrm>
+            <a:off x="1115568" y="1005840"/>
+            <a:ext cx="8403336" cy="5111496"/>
+          </a:xfrm>
+          <a:prstGeom prst="rect">
+            <a:avLst/>
+          </a:prstGeom>
+          <a:solidFill>
+            <a:schemeClr val="bg2">
+              <a:lumMod val="50000"/>
+            </a:schemeClr>
+          </a:solidFill>
+        </p:spPr>
+        <p:style>
+          <a:lnRef idx="2">
+            <a:schemeClr val="accent1">
+              <a:shade val="15000"/>
+            </a:schemeClr>
+          </a:lnRef>
+          <a:fillRef idx="1">
+            <a:schemeClr val="accent1"/>
+          </a:fillRef>
+          <a:effectRef idx="0">
+            <a:schemeClr val="accent1"/>
+          </a:effectRef>
+          <a:fontRef idx="minor">
+            <a:schemeClr val="lt1"/>
+          </a:fontRef>
+        </p:style>
+        <p:txBody>
+          <a:bodyPr rtlCol="0" anchor="ctr"/>
+          <a:lstStyle/>
+          <a:p>
+            <a:pPr algn="ctr"/>
+            <a:endParaRPr lang="en-SG" dirty="0"/>
+          </a:p>
+        </p:txBody>
+      </p:sp>
+      <p:pic>
+        <p:nvPicPr>
+          <p:cNvPr id="35" name="Picture 2" descr="Train Side View: Over 3,932 Royalty-Free Licensable Stock Illustrations &amp;  Drawings | Shutterstock">
+            <a:extLst>
+              <a:ext uri="{FF2B5EF4-FFF2-40B4-BE49-F238E27FC236}">
+                <a16:creationId xmlns:a16="http://schemas.microsoft.com/office/drawing/2014/main" id="{130A0340-123F-85B3-4FA1-F63CE05A179A}"/>
+              </a:ext>
+            </a:extLst>
+          </p:cNvPr>
+          <p:cNvPicPr>
+            <a:picLocks noChangeAspect="1" noChangeArrowheads="1"/>
+          </p:cNvPicPr>
+          <p:nvPr/>
+        </p:nvPicPr>
+        <p:blipFill rotWithShape="1">
+          <a:blip r:embed="rId2">
+            <a:alphaModFix/>
+            <a:extLst>
+              <a:ext uri="{28A0092B-C50C-407E-A947-70E740481C1C}">
+                <a14:useLocalDpi xmlns:a14="http://schemas.microsoft.com/office/drawing/2010/main" val="0"/>
+              </a:ext>
+            </a:extLst>
+          </a:blip>
+          <a:srcRect t="18869" b="33339"/>
+          <a:stretch/>
+        </p:blipFill>
+        <p:spPr bwMode="auto">
+          <a:xfrm flipH="1">
+            <a:off x="2085562" y="2706729"/>
+            <a:ext cx="5674025" cy="1668781"/>
+          </a:xfrm>
+          <a:prstGeom prst="rect">
+            <a:avLst/>
+          </a:prstGeom>
+          <a:noFill/>
+          <a:extLst>
+            <a:ext uri="{909E8E84-426E-40DD-AFC4-6F175D3DCCD1}">
+              <a14:hiddenFill xmlns:a14="http://schemas.microsoft.com/office/drawing/2010/main">
+                <a:solidFill>
+                  <a:srgbClr val="FFFFFF"/>
+                </a:solidFill>
+              </a14:hiddenFill>
+            </a:ext>
+          </a:extLst>
+        </p:spPr>
+      </p:pic>
+      <p:sp>
+        <p:nvSpPr>
+          <p:cNvPr id="36" name="Isosceles Triangle 35">
+            <a:extLst>
+              <a:ext uri="{FF2B5EF4-FFF2-40B4-BE49-F238E27FC236}">
+                <a16:creationId xmlns:a16="http://schemas.microsoft.com/office/drawing/2014/main" id="{C914C5ED-2A95-7010-5F96-FA24819D8749}"/>
+              </a:ext>
+            </a:extLst>
+          </p:cNvPr>
+          <p:cNvSpPr/>
+          <p:nvPr/>
+        </p:nvSpPr>
+        <p:spPr>
+          <a:xfrm rot="16200000">
+            <a:off x="7581321" y="2930775"/>
+            <a:ext cx="847725" cy="1311809"/>
+          </a:xfrm>
+          <a:prstGeom prst="triangle">
+            <a:avLst/>
+          </a:prstGeom>
+          <a:solidFill>
+            <a:schemeClr val="accent2">
+              <a:alpha val="50000"/>
+            </a:schemeClr>
+          </a:solidFill>
+          <a:ln>
+            <a:noFill/>
+          </a:ln>
+        </p:spPr>
+        <p:style>
+          <a:lnRef idx="0">
+            <a:scrgbClr r="0" g="0" b="0"/>
+          </a:lnRef>
+          <a:fillRef idx="0">
+            <a:scrgbClr r="0" g="0" b="0"/>
+          </a:fillRef>
+          <a:effectRef idx="0">
+            <a:scrgbClr r="0" g="0" b="0"/>
+          </a:effectRef>
+          <a:fontRef idx="minor">
+            <a:schemeClr val="lt1"/>
+          </a:fontRef>
+        </p:style>
+        <p:txBody>
+          <a:bodyPr rtlCol="0" anchor="ctr"/>
+          <a:lstStyle/>
+          <a:p>
+            <a:pPr algn="ctr"/>
+            <a:endParaRPr lang="en-SG" dirty="0">
+              <a:solidFill>
+                <a:schemeClr val="bg1"/>
+              </a:solidFill>
+            </a:endParaRPr>
+          </a:p>
+        </p:txBody>
+      </p:sp>
+      <p:sp>
+        <p:nvSpPr>
+          <p:cNvPr id="37" name="Rectangle 36">
+            <a:extLst>
+              <a:ext uri="{FF2B5EF4-FFF2-40B4-BE49-F238E27FC236}">
+                <a16:creationId xmlns:a16="http://schemas.microsoft.com/office/drawing/2014/main" id="{5AD78BB0-28C4-C99A-DA2F-2990E07C3294}"/>
+              </a:ext>
+            </a:extLst>
+          </p:cNvPr>
+          <p:cNvSpPr/>
+          <p:nvPr/>
+        </p:nvSpPr>
+        <p:spPr>
+          <a:xfrm>
+            <a:off x="7287285" y="3527084"/>
+            <a:ext cx="123987" cy="119190"/>
+          </a:xfrm>
+          <a:prstGeom prst="rect">
+            <a:avLst/>
+          </a:prstGeom>
+          <a:solidFill>
+            <a:schemeClr val="bg1">
+              <a:lumMod val="75000"/>
+            </a:schemeClr>
+          </a:solidFill>
+        </p:spPr>
+        <p:style>
+          <a:lnRef idx="2">
+            <a:schemeClr val="dk1">
+              <a:shade val="15000"/>
+            </a:schemeClr>
+          </a:lnRef>
+          <a:fillRef idx="1">
+            <a:schemeClr val="dk1"/>
+          </a:fillRef>
+          <a:effectRef idx="0">
+            <a:schemeClr val="dk1"/>
+          </a:effectRef>
+          <a:fontRef idx="minor">
+            <a:schemeClr val="lt1"/>
+          </a:fontRef>
+        </p:style>
+        <p:txBody>
+          <a:bodyPr rtlCol="0" anchor="ctr"/>
+          <a:lstStyle/>
+          <a:p>
+            <a:pPr algn="ctr"/>
+            <a:endParaRPr lang="en-SG">
+              <a:solidFill>
+                <a:schemeClr val="bg1"/>
+              </a:solidFill>
+            </a:endParaRPr>
+          </a:p>
+        </p:txBody>
+      </p:sp>
+      <p:sp>
+        <p:nvSpPr>
+          <p:cNvPr id="38" name="TextBox 37">
+            <a:extLst>
+              <a:ext uri="{FF2B5EF4-FFF2-40B4-BE49-F238E27FC236}">
+                <a16:creationId xmlns:a16="http://schemas.microsoft.com/office/drawing/2014/main" id="{490DFBBB-77DD-C759-9E1A-D3395B6C2221}"/>
+              </a:ext>
+            </a:extLst>
+          </p:cNvPr>
+          <p:cNvSpPr txBox="1"/>
+          <p:nvPr/>
+        </p:nvSpPr>
+        <p:spPr>
+          <a:xfrm>
+            <a:off x="5365069" y="2128757"/>
+            <a:ext cx="2736470" cy="276999"/>
+          </a:xfrm>
+          <a:prstGeom prst="rect">
+            <a:avLst/>
+          </a:prstGeom>
+          <a:noFill/>
+        </p:spPr>
+        <p:txBody>
+          <a:bodyPr wrap="square">
+            <a:spAutoFit/>
+          </a:bodyPr>
+          <a:lstStyle/>
+          <a:p>
+            <a:r>
+              <a:rPr lang="en-US" sz="1200" b="1" dirty="0">
+                <a:solidFill>
+                  <a:schemeClr val="bg1"/>
+                </a:solidFill>
+              </a:rPr>
+              <a:t>Train front collision  detection radar</a:t>
+            </a:r>
+            <a:endParaRPr lang="en-SG" sz="1200" b="1" dirty="0">
+              <a:solidFill>
+                <a:schemeClr val="bg1"/>
+              </a:solidFill>
+            </a:endParaRPr>
+          </a:p>
+        </p:txBody>
+      </p:sp>
+      <p:cxnSp>
+        <p:nvCxnSpPr>
+          <p:cNvPr id="39" name="Straight Arrow Connector 38">
+            <a:extLst>
+              <a:ext uri="{FF2B5EF4-FFF2-40B4-BE49-F238E27FC236}">
+                <a16:creationId xmlns:a16="http://schemas.microsoft.com/office/drawing/2014/main" id="{DB52D0BC-DDE8-9105-E03D-33864DA74E57}"/>
+              </a:ext>
+            </a:extLst>
+          </p:cNvPr>
+          <p:cNvCxnSpPr>
+            <a:cxnSpLocks/>
+          </p:cNvCxnSpPr>
+          <p:nvPr/>
+        </p:nvCxnSpPr>
+        <p:spPr>
+          <a:xfrm>
+            <a:off x="7322549" y="2463450"/>
+            <a:ext cx="0" cy="1011486"/>
+          </a:xfrm>
+          <a:prstGeom prst="straightConnector1">
+            <a:avLst/>
+          </a:prstGeom>
+          <a:ln w="9525">
+            <a:prstDash val="sysDash"/>
+            <a:tailEnd type="triangle"/>
+          </a:ln>
+        </p:spPr>
+        <p:style>
+          <a:lnRef idx="2">
+            <a:schemeClr val="accent2"/>
+          </a:lnRef>
+          <a:fillRef idx="0">
+            <a:schemeClr val="accent2"/>
+          </a:fillRef>
+          <a:effectRef idx="1">
+            <a:schemeClr val="accent2"/>
+          </a:effectRef>
+          <a:fontRef idx="minor">
+            <a:schemeClr val="tx1"/>
+          </a:fontRef>
+        </p:style>
+      </p:cxnSp>
+      <p:pic>
+        <p:nvPicPr>
+          <p:cNvPr id="40" name="Picture 39" descr="A black and white circular object with a circular object in the middle&#10;&#10;Description automatically generated">
+            <a:extLst>
+              <a:ext uri="{FF2B5EF4-FFF2-40B4-BE49-F238E27FC236}">
+                <a16:creationId xmlns:a16="http://schemas.microsoft.com/office/drawing/2014/main" id="{F3BD0DC0-2DCA-05C9-E2A9-FAAF4BE537D6}"/>
+              </a:ext>
+            </a:extLst>
+          </p:cNvPr>
+          <p:cNvPicPr>
+            <a:picLocks noChangeAspect="1"/>
+          </p:cNvPicPr>
+          <p:nvPr/>
+        </p:nvPicPr>
+        <p:blipFill>
+          <a:blip r:embed="rId3">
+            <a:extLst>
+              <a:ext uri="{28A0092B-C50C-407E-A947-70E740481C1C}">
+                <a14:useLocalDpi xmlns:a14="http://schemas.microsoft.com/office/drawing/2010/main" val="0"/>
+              </a:ext>
+            </a:extLst>
+          </a:blip>
+          <a:stretch>
+            <a:fillRect/>
+          </a:stretch>
+        </p:blipFill>
+        <p:spPr>
+          <a:xfrm>
+            <a:off x="3191562" y="3613527"/>
+            <a:ext cx="533481" cy="533481"/>
+          </a:xfrm>
+          <a:prstGeom prst="rect">
+            <a:avLst/>
+          </a:prstGeom>
+          <a:ln w="9525">
+            <a:solidFill>
+              <a:schemeClr val="tx1"/>
+            </a:solidFill>
+          </a:ln>
+        </p:spPr>
+      </p:pic>
+      <p:cxnSp>
+        <p:nvCxnSpPr>
+          <p:cNvPr id="41" name="Straight Arrow Connector 40">
+            <a:extLst>
+              <a:ext uri="{FF2B5EF4-FFF2-40B4-BE49-F238E27FC236}">
+                <a16:creationId xmlns:a16="http://schemas.microsoft.com/office/drawing/2014/main" id="{F7A3D7CC-1503-BDB3-60E2-65498F3EF1C6}"/>
+              </a:ext>
+            </a:extLst>
+          </p:cNvPr>
+          <p:cNvCxnSpPr>
+            <a:cxnSpLocks/>
+          </p:cNvCxnSpPr>
+          <p:nvPr/>
+        </p:nvCxnSpPr>
+        <p:spPr>
+          <a:xfrm flipH="1">
+            <a:off x="3519966" y="2676858"/>
+            <a:ext cx="79801" cy="909821"/>
+          </a:xfrm>
+          <a:prstGeom prst="straightConnector1">
+            <a:avLst/>
+          </a:prstGeom>
+          <a:ln w="9525">
+            <a:prstDash val="sysDash"/>
+            <a:tailEnd type="triangle"/>
+          </a:ln>
+        </p:spPr>
+        <p:style>
+          <a:lnRef idx="2">
+            <a:schemeClr val="accent2"/>
+          </a:lnRef>
+          <a:fillRef idx="0">
+            <a:schemeClr val="accent2"/>
+          </a:fillRef>
+          <a:effectRef idx="1">
+            <a:schemeClr val="accent2"/>
+          </a:effectRef>
+          <a:fontRef idx="minor">
+            <a:schemeClr val="tx1"/>
+          </a:fontRef>
+        </p:style>
+      </p:cxnSp>
+      <p:sp>
+        <p:nvSpPr>
+          <p:cNvPr id="42" name="TextBox 41">
+            <a:extLst>
+              <a:ext uri="{FF2B5EF4-FFF2-40B4-BE49-F238E27FC236}">
+                <a16:creationId xmlns:a16="http://schemas.microsoft.com/office/drawing/2014/main" id="{2D619C63-B0AE-1B9C-A137-4103E791C3F8}"/>
+              </a:ext>
+            </a:extLst>
+          </p:cNvPr>
+          <p:cNvSpPr txBox="1"/>
+          <p:nvPr/>
+        </p:nvSpPr>
+        <p:spPr>
+          <a:xfrm>
+            <a:off x="3358125" y="2399859"/>
+            <a:ext cx="1188622" cy="276999"/>
+          </a:xfrm>
+          <a:prstGeom prst="rect">
+            <a:avLst/>
+          </a:prstGeom>
+          <a:noFill/>
+        </p:spPr>
+        <p:txBody>
+          <a:bodyPr wrap="square">
+            <a:spAutoFit/>
+          </a:bodyPr>
+          <a:lstStyle/>
+          <a:p>
+            <a:r>
+              <a:rPr lang="en-US" sz="1200" b="1" dirty="0">
+                <a:solidFill>
+                  <a:schemeClr val="bg1"/>
+                </a:solidFill>
+              </a:rPr>
+              <a:t>Train DC moto</a:t>
+            </a:r>
+            <a:endParaRPr lang="en-SG" sz="1200" b="1" dirty="0">
+              <a:solidFill>
+                <a:schemeClr val="bg1"/>
+              </a:solidFill>
+            </a:endParaRPr>
+          </a:p>
+        </p:txBody>
+      </p:sp>
+      <p:pic>
+        <p:nvPicPr>
+          <p:cNvPr id="43" name="Picture 42" descr="TM221CE16R Schneider Electric Modicon M221 PLC CPU Mini USB Interface –  Ralakde Automation">
+            <a:extLst>
+              <a:ext uri="{FF2B5EF4-FFF2-40B4-BE49-F238E27FC236}">
+                <a16:creationId xmlns:a16="http://schemas.microsoft.com/office/drawing/2014/main" id="{28006821-BE67-0F58-33DD-05CEE00002DA}"/>
+              </a:ext>
+            </a:extLst>
+          </p:cNvPr>
+          <p:cNvPicPr>
+            <a:picLocks noChangeAspect="1" noChangeArrowheads="1"/>
+          </p:cNvPicPr>
+          <p:nvPr/>
+        </p:nvPicPr>
+        <p:blipFill>
+          <a:blip r:embed="rId4">
+            <a:extLst>
+              <a:ext uri="{28A0092B-C50C-407E-A947-70E740481C1C}">
+                <a14:useLocalDpi xmlns:a14="http://schemas.microsoft.com/office/drawing/2010/main" val="0"/>
+              </a:ext>
+            </a:extLst>
+          </a:blip>
+          <a:srcRect/>
+          <a:stretch>
+            <a:fillRect/>
+          </a:stretch>
+        </p:blipFill>
+        <p:spPr bwMode="auto">
+          <a:xfrm>
+            <a:off x="5995230" y="4445932"/>
+            <a:ext cx="559540" cy="613422"/>
+          </a:xfrm>
+          <a:prstGeom prst="rect">
+            <a:avLst/>
+          </a:prstGeom>
+          <a:noFill/>
+          <a:extLst>
+            <a:ext uri="{909E8E84-426E-40DD-AFC4-6F175D3DCCD1}">
+              <a14:hiddenFill xmlns:a14="http://schemas.microsoft.com/office/drawing/2010/main">
+                <a:solidFill>
+                  <a:srgbClr val="FFFFFF"/>
+                </a:solidFill>
+              </a14:hiddenFill>
+            </a:ext>
+          </a:extLst>
+        </p:spPr>
+      </p:pic>
+      <p:cxnSp>
+        <p:nvCxnSpPr>
+          <p:cNvPr id="44" name="Connector: Elbow 43">
+            <a:extLst>
+              <a:ext uri="{FF2B5EF4-FFF2-40B4-BE49-F238E27FC236}">
+                <a16:creationId xmlns:a16="http://schemas.microsoft.com/office/drawing/2014/main" id="{F090137A-C521-0D17-BE78-8EE5404C46D2}"/>
+              </a:ext>
+            </a:extLst>
+          </p:cNvPr>
+          <p:cNvCxnSpPr>
+            <a:cxnSpLocks/>
+            <a:stCxn id="43" idx="3"/>
+            <a:endCxn id="37" idx="2"/>
+          </p:cNvCxnSpPr>
+          <p:nvPr/>
+        </p:nvCxnSpPr>
+        <p:spPr>
+          <a:xfrm flipV="1">
+            <a:off x="6554770" y="3646274"/>
+            <a:ext cx="794509" cy="1106369"/>
+          </a:xfrm>
+          <a:prstGeom prst="bentConnector2">
+            <a:avLst/>
+          </a:prstGeom>
+          <a:ln w="19050">
+            <a:solidFill>
+              <a:schemeClr val="accent6">
+                <a:lumMod val="40000"/>
+                <a:lumOff val="60000"/>
+              </a:schemeClr>
+            </a:solidFill>
+          </a:ln>
+        </p:spPr>
+        <p:style>
+          <a:lnRef idx="2">
+            <a:schemeClr val="accent1"/>
+          </a:lnRef>
+          <a:fillRef idx="0">
+            <a:schemeClr val="accent1"/>
+          </a:fillRef>
+          <a:effectRef idx="1">
+            <a:schemeClr val="accent1"/>
+          </a:effectRef>
+          <a:fontRef idx="minor">
+            <a:schemeClr val="tx1"/>
+          </a:fontRef>
+        </p:style>
+      </p:cxnSp>
+      <p:cxnSp>
+        <p:nvCxnSpPr>
+          <p:cNvPr id="45" name="Connector: Elbow 44">
+            <a:extLst>
+              <a:ext uri="{FF2B5EF4-FFF2-40B4-BE49-F238E27FC236}">
+                <a16:creationId xmlns:a16="http://schemas.microsoft.com/office/drawing/2014/main" id="{15E85F9D-5C2F-3A90-783E-E17E3A1DBAB9}"/>
+              </a:ext>
+            </a:extLst>
+          </p:cNvPr>
+          <p:cNvCxnSpPr>
+            <a:cxnSpLocks/>
+            <a:stCxn id="40" idx="2"/>
+            <a:endCxn id="43" idx="1"/>
+          </p:cNvCxnSpPr>
+          <p:nvPr/>
+        </p:nvCxnSpPr>
+        <p:spPr>
+          <a:xfrm rot="16200000" flipH="1">
+            <a:off x="4423949" y="3181361"/>
+            <a:ext cx="605635" cy="2536927"/>
+          </a:xfrm>
+          <a:prstGeom prst="bentConnector2">
+            <a:avLst/>
+          </a:prstGeom>
+          <a:ln w="19050">
+            <a:solidFill>
+              <a:schemeClr val="accent6">
+                <a:lumMod val="40000"/>
+                <a:lumOff val="60000"/>
+              </a:schemeClr>
+            </a:solidFill>
+          </a:ln>
+        </p:spPr>
+        <p:style>
+          <a:lnRef idx="2">
+            <a:schemeClr val="accent1"/>
+          </a:lnRef>
+          <a:fillRef idx="0">
+            <a:schemeClr val="accent1"/>
+          </a:fillRef>
+          <a:effectRef idx="1">
+            <a:schemeClr val="accent1"/>
+          </a:effectRef>
+          <a:fontRef idx="minor">
+            <a:schemeClr val="tx1"/>
+          </a:fontRef>
+        </p:style>
+      </p:cxnSp>
+      <p:pic>
+        <p:nvPicPr>
+          <p:cNvPr id="46" name="Picture 45">
+            <a:extLst>
+              <a:ext uri="{FF2B5EF4-FFF2-40B4-BE49-F238E27FC236}">
+                <a16:creationId xmlns:a16="http://schemas.microsoft.com/office/drawing/2014/main" id="{0417B3B8-E546-4543-654A-2C37CFF7B2D0}"/>
+              </a:ext>
+            </a:extLst>
+          </p:cNvPr>
+          <p:cNvPicPr>
+            <a:picLocks noChangeAspect="1"/>
+          </p:cNvPicPr>
+          <p:nvPr/>
+        </p:nvPicPr>
+        <p:blipFill>
+          <a:blip r:embed="rId5"/>
+          <a:stretch>
+            <a:fillRect/>
+          </a:stretch>
+        </p:blipFill>
+        <p:spPr>
+          <a:xfrm>
+            <a:off x="4793637" y="4060951"/>
+            <a:ext cx="642054" cy="456572"/>
+          </a:xfrm>
+          <a:prstGeom prst="rect">
+            <a:avLst/>
+          </a:prstGeom>
+        </p:spPr>
+      </p:pic>
+      <p:cxnSp>
+        <p:nvCxnSpPr>
+          <p:cNvPr id="47" name="Straight Connector 46">
+            <a:extLst>
+              <a:ext uri="{FF2B5EF4-FFF2-40B4-BE49-F238E27FC236}">
+                <a16:creationId xmlns:a16="http://schemas.microsoft.com/office/drawing/2014/main" id="{C531EE64-5D4F-DE2A-EB9A-A562063D9D09}"/>
+              </a:ext>
+            </a:extLst>
+          </p:cNvPr>
+          <p:cNvCxnSpPr>
+            <a:cxnSpLocks/>
+            <a:endCxn id="48" idx="3"/>
+          </p:cNvCxnSpPr>
+          <p:nvPr/>
+        </p:nvCxnSpPr>
+        <p:spPr>
+          <a:xfrm>
+            <a:off x="3375346" y="3301167"/>
+            <a:ext cx="1498494" cy="0"/>
+          </a:xfrm>
+          <a:prstGeom prst="line">
+            <a:avLst/>
+          </a:prstGeom>
+          <a:ln>
+            <a:solidFill>
+              <a:srgbClr val="C00000"/>
+            </a:solidFill>
+          </a:ln>
+        </p:spPr>
+        <p:style>
+          <a:lnRef idx="2">
+            <a:schemeClr val="accent1"/>
+          </a:lnRef>
+          <a:fillRef idx="0">
+            <a:schemeClr val="accent1"/>
+          </a:fillRef>
+          <a:effectRef idx="1">
+            <a:schemeClr val="accent1"/>
+          </a:effectRef>
+          <a:fontRef idx="minor">
+            <a:schemeClr val="tx1"/>
+          </a:fontRef>
+        </p:style>
+      </p:cxnSp>
+      <p:sp>
+        <p:nvSpPr>
+          <p:cNvPr id="48" name="Rectangle 47">
+            <a:extLst>
+              <a:ext uri="{FF2B5EF4-FFF2-40B4-BE49-F238E27FC236}">
+                <a16:creationId xmlns:a16="http://schemas.microsoft.com/office/drawing/2014/main" id="{B9506393-AC6A-6F7B-CEFB-2DDC2114E0F8}"/>
+              </a:ext>
+            </a:extLst>
+          </p:cNvPr>
+          <p:cNvSpPr/>
+          <p:nvPr/>
+        </p:nvSpPr>
+        <p:spPr>
+          <a:xfrm flipH="1">
+            <a:off x="4873840" y="3221307"/>
+            <a:ext cx="146309" cy="159719"/>
+          </a:xfrm>
+          <a:prstGeom prst="rect">
+            <a:avLst/>
+          </a:prstGeom>
+          <a:solidFill>
+            <a:schemeClr val="bg1">
+              <a:lumMod val="85000"/>
+            </a:schemeClr>
+          </a:solidFill>
+          <a:ln>
+            <a:solidFill>
+              <a:srgbClr val="C00000"/>
+            </a:solidFill>
+          </a:ln>
+        </p:spPr>
+        <p:style>
+          <a:lnRef idx="2">
+            <a:schemeClr val="dk1">
+              <a:shade val="15000"/>
+            </a:schemeClr>
+          </a:lnRef>
+          <a:fillRef idx="1">
+            <a:schemeClr val="dk1"/>
+          </a:fillRef>
+          <a:effectRef idx="0">
+            <a:schemeClr val="dk1"/>
+          </a:effectRef>
+          <a:fontRef idx="minor">
+            <a:schemeClr val="lt1"/>
+          </a:fontRef>
+        </p:style>
+        <p:txBody>
+          <a:bodyPr rtlCol="0" anchor="ctr"/>
+          <a:lstStyle/>
+          <a:p>
+            <a:pPr algn="ctr"/>
+            <a:endParaRPr lang="en-SG">
+              <a:solidFill>
+                <a:schemeClr val="bg1"/>
+              </a:solidFill>
+            </a:endParaRPr>
+          </a:p>
+        </p:txBody>
+      </p:sp>
+      <p:cxnSp>
+        <p:nvCxnSpPr>
+          <p:cNvPr id="49" name="Straight Arrow Connector 48">
+            <a:extLst>
+              <a:ext uri="{FF2B5EF4-FFF2-40B4-BE49-F238E27FC236}">
+                <a16:creationId xmlns:a16="http://schemas.microsoft.com/office/drawing/2014/main" id="{BDD3DFDE-A137-2998-9548-9C8565AF53AC}"/>
+              </a:ext>
+            </a:extLst>
+          </p:cNvPr>
+          <p:cNvCxnSpPr>
+            <a:cxnSpLocks/>
+          </p:cNvCxnSpPr>
+          <p:nvPr/>
+        </p:nvCxnSpPr>
+        <p:spPr>
+          <a:xfrm flipH="1">
+            <a:off x="4952565" y="2849087"/>
+            <a:ext cx="0" cy="376696"/>
+          </a:xfrm>
+          <a:prstGeom prst="straightConnector1">
+            <a:avLst/>
+          </a:prstGeom>
+          <a:ln w="9525">
+            <a:prstDash val="sysDash"/>
+            <a:tailEnd type="triangle"/>
+          </a:ln>
+        </p:spPr>
+        <p:style>
+          <a:lnRef idx="2">
+            <a:schemeClr val="accent2"/>
+          </a:lnRef>
+          <a:fillRef idx="0">
+            <a:schemeClr val="accent2"/>
+          </a:fillRef>
+          <a:effectRef idx="1">
+            <a:schemeClr val="accent2"/>
+          </a:effectRef>
+          <a:fontRef idx="minor">
+            <a:schemeClr val="tx1"/>
+          </a:fontRef>
+        </p:style>
+      </p:cxnSp>
+      <p:sp>
+        <p:nvSpPr>
+          <p:cNvPr id="50" name="TextBox 49">
+            <a:extLst>
+              <a:ext uri="{FF2B5EF4-FFF2-40B4-BE49-F238E27FC236}">
+                <a16:creationId xmlns:a16="http://schemas.microsoft.com/office/drawing/2014/main" id="{787169A7-EF64-063E-9043-EEF207E79A74}"/>
+              </a:ext>
+            </a:extLst>
+          </p:cNvPr>
+          <p:cNvSpPr txBox="1"/>
+          <p:nvPr/>
+        </p:nvSpPr>
+        <p:spPr>
+          <a:xfrm>
+            <a:off x="4492529" y="2463450"/>
+            <a:ext cx="1745081" cy="276999"/>
+          </a:xfrm>
+          <a:prstGeom prst="rect">
+            <a:avLst/>
+          </a:prstGeom>
+          <a:noFill/>
+        </p:spPr>
+        <p:txBody>
+          <a:bodyPr wrap="square">
+            <a:spAutoFit/>
+          </a:bodyPr>
+          <a:lstStyle/>
+          <a:p>
+            <a:r>
+              <a:rPr lang="en-US" sz="1200" b="1" dirty="0">
+                <a:solidFill>
+                  <a:schemeClr val="bg1"/>
+                </a:solidFill>
+              </a:rPr>
+              <a:t>Input voltage sensor</a:t>
+            </a:r>
+            <a:endParaRPr lang="en-SG" sz="1200" b="1" dirty="0">
+              <a:solidFill>
+                <a:schemeClr val="bg1"/>
+              </a:solidFill>
+            </a:endParaRPr>
+          </a:p>
+        </p:txBody>
+      </p:sp>
+      <p:sp>
+        <p:nvSpPr>
+          <p:cNvPr id="51" name="Rectangle 50">
+            <a:extLst>
+              <a:ext uri="{FF2B5EF4-FFF2-40B4-BE49-F238E27FC236}">
+                <a16:creationId xmlns:a16="http://schemas.microsoft.com/office/drawing/2014/main" id="{58AA5605-C6EC-3FC5-3997-287E53850B82}"/>
+              </a:ext>
+            </a:extLst>
+          </p:cNvPr>
+          <p:cNvSpPr/>
+          <p:nvPr/>
+        </p:nvSpPr>
+        <p:spPr>
+          <a:xfrm flipH="1">
+            <a:off x="3305088" y="3361632"/>
+            <a:ext cx="146309" cy="159719"/>
+          </a:xfrm>
+          <a:prstGeom prst="rect">
+            <a:avLst/>
+          </a:prstGeom>
+          <a:solidFill>
+            <a:schemeClr val="bg1">
+              <a:lumMod val="85000"/>
+            </a:schemeClr>
+          </a:solidFill>
+          <a:ln>
+            <a:solidFill>
+              <a:srgbClr val="C00000"/>
+            </a:solidFill>
+          </a:ln>
+        </p:spPr>
+        <p:style>
+          <a:lnRef idx="2">
+            <a:schemeClr val="dk1">
+              <a:shade val="15000"/>
+            </a:schemeClr>
+          </a:lnRef>
+          <a:fillRef idx="1">
+            <a:schemeClr val="dk1"/>
+          </a:fillRef>
+          <a:effectRef idx="0">
+            <a:schemeClr val="dk1"/>
+          </a:effectRef>
+          <a:fontRef idx="minor">
+            <a:schemeClr val="lt1"/>
+          </a:fontRef>
+        </p:style>
+        <p:txBody>
+          <a:bodyPr rtlCol="0" anchor="ctr"/>
+          <a:lstStyle/>
+          <a:p>
+            <a:pPr algn="ctr"/>
+            <a:endParaRPr lang="en-SG">
+              <a:solidFill>
+                <a:schemeClr val="bg1"/>
+              </a:solidFill>
+            </a:endParaRPr>
+          </a:p>
+        </p:txBody>
+      </p:sp>
+      <p:sp>
+        <p:nvSpPr>
+          <p:cNvPr id="52" name="TextBox 51">
+            <a:extLst>
+              <a:ext uri="{FF2B5EF4-FFF2-40B4-BE49-F238E27FC236}">
+                <a16:creationId xmlns:a16="http://schemas.microsoft.com/office/drawing/2014/main" id="{69912F79-016E-AA6C-9814-A2E03DADCF97}"/>
+              </a:ext>
+            </a:extLst>
+          </p:cNvPr>
+          <p:cNvSpPr txBox="1"/>
+          <p:nvPr/>
+        </p:nvSpPr>
+        <p:spPr>
+          <a:xfrm>
+            <a:off x="3684834" y="2727319"/>
+            <a:ext cx="1274203" cy="276999"/>
+          </a:xfrm>
+          <a:prstGeom prst="rect">
+            <a:avLst/>
+          </a:prstGeom>
+          <a:noFill/>
+        </p:spPr>
+        <p:txBody>
+          <a:bodyPr wrap="square">
+            <a:spAutoFit/>
+          </a:bodyPr>
+          <a:lstStyle/>
+          <a:p>
+            <a:r>
+              <a:rPr lang="en-US" sz="1200" b="1" dirty="0">
+                <a:solidFill>
+                  <a:schemeClr val="bg1"/>
+                </a:solidFill>
+              </a:rPr>
+              <a:t>Current sensor</a:t>
+            </a:r>
+            <a:endParaRPr lang="en-SG" sz="1200" b="1" dirty="0">
+              <a:solidFill>
+                <a:schemeClr val="bg1"/>
+              </a:solidFill>
+            </a:endParaRPr>
+          </a:p>
+        </p:txBody>
+      </p:sp>
+      <p:cxnSp>
+        <p:nvCxnSpPr>
+          <p:cNvPr id="53" name="Straight Arrow Connector 52">
+            <a:extLst>
+              <a:ext uri="{FF2B5EF4-FFF2-40B4-BE49-F238E27FC236}">
+                <a16:creationId xmlns:a16="http://schemas.microsoft.com/office/drawing/2014/main" id="{9C4F9772-2EE9-B645-9DF8-792B6C767293}"/>
+              </a:ext>
+            </a:extLst>
+          </p:cNvPr>
+          <p:cNvCxnSpPr>
+            <a:cxnSpLocks/>
+            <a:endCxn id="51" idx="1"/>
+          </p:cNvCxnSpPr>
+          <p:nvPr/>
+        </p:nvCxnSpPr>
+        <p:spPr>
+          <a:xfrm flipH="1">
+            <a:off x="3451397" y="2933105"/>
+            <a:ext cx="745439" cy="508387"/>
+          </a:xfrm>
+          <a:prstGeom prst="straightConnector1">
+            <a:avLst/>
+          </a:prstGeom>
+          <a:ln w="9525">
+            <a:prstDash val="sysDash"/>
+            <a:tailEnd type="triangle"/>
+          </a:ln>
+        </p:spPr>
+        <p:style>
+          <a:lnRef idx="2">
+            <a:schemeClr val="accent2"/>
+          </a:lnRef>
+          <a:fillRef idx="0">
+            <a:schemeClr val="accent2"/>
+          </a:fillRef>
+          <a:effectRef idx="1">
+            <a:schemeClr val="accent2"/>
+          </a:effectRef>
+          <a:fontRef idx="minor">
+            <a:schemeClr val="tx1"/>
+          </a:fontRef>
+        </p:style>
+      </p:cxnSp>
+      <p:sp>
+        <p:nvSpPr>
+          <p:cNvPr id="54" name="Rectangle 53">
+            <a:extLst>
+              <a:ext uri="{FF2B5EF4-FFF2-40B4-BE49-F238E27FC236}">
+                <a16:creationId xmlns:a16="http://schemas.microsoft.com/office/drawing/2014/main" id="{5EC0A107-3F1E-78E8-A90A-81C4085D8EF8}"/>
+              </a:ext>
+            </a:extLst>
+          </p:cNvPr>
+          <p:cNvSpPr/>
+          <p:nvPr/>
+        </p:nvSpPr>
+        <p:spPr>
+          <a:xfrm flipH="1">
+            <a:off x="5699666" y="3746915"/>
+            <a:ext cx="146309" cy="159719"/>
+          </a:xfrm>
+          <a:prstGeom prst="rect">
+            <a:avLst/>
+          </a:prstGeom>
+          <a:solidFill>
+            <a:schemeClr val="bg1">
+              <a:lumMod val="85000"/>
+            </a:schemeClr>
+          </a:solidFill>
+          <a:ln>
+            <a:solidFill>
+              <a:srgbClr val="C00000"/>
+            </a:solidFill>
+          </a:ln>
+        </p:spPr>
+        <p:style>
+          <a:lnRef idx="2">
+            <a:schemeClr val="dk1">
+              <a:shade val="15000"/>
+            </a:schemeClr>
+          </a:lnRef>
+          <a:fillRef idx="1">
+            <a:schemeClr val="dk1"/>
+          </a:fillRef>
+          <a:effectRef idx="0">
+            <a:schemeClr val="dk1"/>
+          </a:effectRef>
+          <a:fontRef idx="minor">
+            <a:schemeClr val="lt1"/>
+          </a:fontRef>
+        </p:style>
+        <p:txBody>
+          <a:bodyPr rtlCol="0" anchor="ctr"/>
+          <a:lstStyle/>
+          <a:p>
+            <a:pPr algn="ctr"/>
+            <a:endParaRPr lang="en-SG">
+              <a:solidFill>
+                <a:schemeClr val="bg1"/>
+              </a:solidFill>
+            </a:endParaRPr>
+          </a:p>
+        </p:txBody>
+      </p:sp>
+      <p:sp>
+        <p:nvSpPr>
+          <p:cNvPr id="55" name="TextBox 54">
+            <a:extLst>
+              <a:ext uri="{FF2B5EF4-FFF2-40B4-BE49-F238E27FC236}">
+                <a16:creationId xmlns:a16="http://schemas.microsoft.com/office/drawing/2014/main" id="{A79E6D13-B42C-C669-224B-63E63C92C777}"/>
+              </a:ext>
+            </a:extLst>
+          </p:cNvPr>
+          <p:cNvSpPr txBox="1"/>
+          <p:nvPr/>
+        </p:nvSpPr>
+        <p:spPr>
+          <a:xfrm>
+            <a:off x="5160869" y="2856759"/>
+            <a:ext cx="1532347" cy="276999"/>
+          </a:xfrm>
+          <a:prstGeom prst="rect">
+            <a:avLst/>
+          </a:prstGeom>
+          <a:noFill/>
+        </p:spPr>
+        <p:txBody>
+          <a:bodyPr wrap="square">
+            <a:spAutoFit/>
+          </a:bodyPr>
+          <a:lstStyle/>
+          <a:p>
+            <a:r>
+              <a:rPr lang="en-US" sz="1200" b="1" dirty="0">
+                <a:solidFill>
+                  <a:schemeClr val="bg1"/>
+                </a:solidFill>
+              </a:rPr>
+              <a:t>Train speed sensor</a:t>
+            </a:r>
+            <a:endParaRPr lang="en-SG" sz="1200" b="1" dirty="0">
+              <a:solidFill>
+                <a:schemeClr val="bg1"/>
+              </a:solidFill>
+            </a:endParaRPr>
+          </a:p>
+        </p:txBody>
+      </p:sp>
+      <p:cxnSp>
+        <p:nvCxnSpPr>
+          <p:cNvPr id="56" name="Straight Arrow Connector 55">
+            <a:extLst>
+              <a:ext uri="{FF2B5EF4-FFF2-40B4-BE49-F238E27FC236}">
+                <a16:creationId xmlns:a16="http://schemas.microsoft.com/office/drawing/2014/main" id="{A0A3FD5E-468C-0411-62CA-3F50C3541698}"/>
+              </a:ext>
+            </a:extLst>
+          </p:cNvPr>
+          <p:cNvCxnSpPr>
+            <a:cxnSpLocks/>
+          </p:cNvCxnSpPr>
+          <p:nvPr/>
+        </p:nvCxnSpPr>
+        <p:spPr>
+          <a:xfrm>
+            <a:off x="5765588" y="3098240"/>
+            <a:ext cx="0" cy="638133"/>
+          </a:xfrm>
+          <a:prstGeom prst="straightConnector1">
+            <a:avLst/>
+          </a:prstGeom>
+          <a:ln w="9525">
+            <a:prstDash val="sysDash"/>
+            <a:tailEnd type="triangle"/>
+          </a:ln>
+        </p:spPr>
+        <p:style>
+          <a:lnRef idx="2">
+            <a:schemeClr val="accent2"/>
+          </a:lnRef>
+          <a:fillRef idx="0">
+            <a:schemeClr val="accent2"/>
+          </a:fillRef>
+          <a:effectRef idx="1">
+            <a:schemeClr val="accent2"/>
+          </a:effectRef>
+          <a:fontRef idx="minor">
+            <a:schemeClr val="tx1"/>
+          </a:fontRef>
+        </p:style>
+      </p:cxnSp>
+      <p:cxnSp>
+        <p:nvCxnSpPr>
+          <p:cNvPr id="57" name="Connector: Elbow 56">
+            <a:extLst>
+              <a:ext uri="{FF2B5EF4-FFF2-40B4-BE49-F238E27FC236}">
+                <a16:creationId xmlns:a16="http://schemas.microsoft.com/office/drawing/2014/main" id="{47F8C763-AB2C-EC92-F85C-313D3BF7D1D5}"/>
+              </a:ext>
+            </a:extLst>
+          </p:cNvPr>
+          <p:cNvCxnSpPr>
+            <a:cxnSpLocks/>
+            <a:stCxn id="46" idx="3"/>
+            <a:endCxn id="37" idx="1"/>
+          </p:cNvCxnSpPr>
+          <p:nvPr/>
+        </p:nvCxnSpPr>
+        <p:spPr>
+          <a:xfrm flipV="1">
+            <a:off x="5435691" y="3586679"/>
+            <a:ext cx="1851594" cy="702558"/>
+          </a:xfrm>
+          <a:prstGeom prst="bentConnector3">
+            <a:avLst>
+              <a:gd name="adj1" fmla="val 50000"/>
+            </a:avLst>
+          </a:prstGeom>
+          <a:ln w="19050">
+            <a:solidFill>
+              <a:schemeClr val="tx2">
+                <a:lumMod val="75000"/>
+                <a:lumOff val="25000"/>
+              </a:schemeClr>
+            </a:solidFill>
+          </a:ln>
+        </p:spPr>
+        <p:style>
+          <a:lnRef idx="2">
+            <a:schemeClr val="accent1"/>
+          </a:lnRef>
+          <a:fillRef idx="0">
+            <a:schemeClr val="accent1"/>
+          </a:fillRef>
+          <a:effectRef idx="1">
+            <a:schemeClr val="accent1"/>
+          </a:effectRef>
+          <a:fontRef idx="minor">
+            <a:schemeClr val="tx1"/>
+          </a:fontRef>
+        </p:style>
+      </p:cxnSp>
+      <p:cxnSp>
+        <p:nvCxnSpPr>
+          <p:cNvPr id="58" name="Connector: Elbow 57">
+            <a:extLst>
+              <a:ext uri="{FF2B5EF4-FFF2-40B4-BE49-F238E27FC236}">
+                <a16:creationId xmlns:a16="http://schemas.microsoft.com/office/drawing/2014/main" id="{873F8AB7-E48C-797D-3C28-13D834D923AA}"/>
+              </a:ext>
+            </a:extLst>
+          </p:cNvPr>
+          <p:cNvCxnSpPr>
+            <a:cxnSpLocks/>
+            <a:stCxn id="46" idx="3"/>
+            <a:endCxn id="54" idx="2"/>
+          </p:cNvCxnSpPr>
+          <p:nvPr/>
+        </p:nvCxnSpPr>
+        <p:spPr>
+          <a:xfrm flipV="1">
+            <a:off x="5435691" y="3906634"/>
+            <a:ext cx="337129" cy="382603"/>
+          </a:xfrm>
+          <a:prstGeom prst="bentConnector2">
+            <a:avLst/>
+          </a:prstGeom>
+          <a:ln w="19050">
+            <a:solidFill>
+              <a:schemeClr val="tx2">
+                <a:lumMod val="75000"/>
+                <a:lumOff val="25000"/>
+              </a:schemeClr>
+            </a:solidFill>
+          </a:ln>
+        </p:spPr>
+        <p:style>
+          <a:lnRef idx="2">
+            <a:schemeClr val="accent1"/>
+          </a:lnRef>
+          <a:fillRef idx="0">
+            <a:schemeClr val="accent1"/>
+          </a:fillRef>
+          <a:effectRef idx="1">
+            <a:schemeClr val="accent1"/>
+          </a:effectRef>
+          <a:fontRef idx="minor">
+            <a:schemeClr val="tx1"/>
+          </a:fontRef>
+        </p:style>
+      </p:cxnSp>
+      <p:cxnSp>
+        <p:nvCxnSpPr>
+          <p:cNvPr id="59" name="Connector: Elbow 58">
+            <a:extLst>
+              <a:ext uri="{FF2B5EF4-FFF2-40B4-BE49-F238E27FC236}">
+                <a16:creationId xmlns:a16="http://schemas.microsoft.com/office/drawing/2014/main" id="{AFD01B7F-240A-E646-C3CC-C52067AC719B}"/>
+              </a:ext>
+            </a:extLst>
+          </p:cNvPr>
+          <p:cNvCxnSpPr>
+            <a:cxnSpLocks/>
+            <a:stCxn id="46" idx="0"/>
+            <a:endCxn id="48" idx="2"/>
+          </p:cNvCxnSpPr>
+          <p:nvPr/>
+        </p:nvCxnSpPr>
+        <p:spPr>
+          <a:xfrm rot="16200000" flipV="1">
+            <a:off x="4690867" y="3637154"/>
+            <a:ext cx="679925" cy="167670"/>
+          </a:xfrm>
+          <a:prstGeom prst="bentConnector3">
+            <a:avLst>
+              <a:gd name="adj1" fmla="val 50000"/>
+            </a:avLst>
+          </a:prstGeom>
+          <a:ln w="19050">
+            <a:solidFill>
+              <a:schemeClr val="tx2">
+                <a:lumMod val="75000"/>
+                <a:lumOff val="25000"/>
+              </a:schemeClr>
+            </a:solidFill>
+          </a:ln>
+        </p:spPr>
+        <p:style>
+          <a:lnRef idx="2">
+            <a:schemeClr val="accent1"/>
+          </a:lnRef>
+          <a:fillRef idx="0">
+            <a:schemeClr val="accent1"/>
+          </a:fillRef>
+          <a:effectRef idx="1">
+            <a:schemeClr val="accent1"/>
+          </a:effectRef>
+          <a:fontRef idx="minor">
+            <a:schemeClr val="tx1"/>
+          </a:fontRef>
+        </p:style>
+      </p:cxnSp>
+      <p:cxnSp>
+        <p:nvCxnSpPr>
+          <p:cNvPr id="60" name="Connector: Elbow 59">
+            <a:extLst>
+              <a:ext uri="{FF2B5EF4-FFF2-40B4-BE49-F238E27FC236}">
+                <a16:creationId xmlns:a16="http://schemas.microsoft.com/office/drawing/2014/main" id="{640F1950-F283-D1CC-7899-BB8CBC3970CD}"/>
+              </a:ext>
+            </a:extLst>
+          </p:cNvPr>
+          <p:cNvCxnSpPr>
+            <a:cxnSpLocks/>
+            <a:stCxn id="46" idx="1"/>
+          </p:cNvCxnSpPr>
+          <p:nvPr/>
+        </p:nvCxnSpPr>
+        <p:spPr>
+          <a:xfrm rot="10800000">
+            <a:off x="3478129" y="3428351"/>
+            <a:ext cx="1315509" cy="860886"/>
+          </a:xfrm>
+          <a:prstGeom prst="bentConnector3">
+            <a:avLst>
+              <a:gd name="adj1" fmla="val 61295"/>
+            </a:avLst>
+          </a:prstGeom>
+          <a:ln w="19050">
+            <a:solidFill>
+              <a:schemeClr val="tx2">
+                <a:lumMod val="75000"/>
+                <a:lumOff val="25000"/>
+              </a:schemeClr>
+            </a:solidFill>
+          </a:ln>
+        </p:spPr>
+        <p:style>
+          <a:lnRef idx="2">
+            <a:schemeClr val="accent1"/>
+          </a:lnRef>
+          <a:fillRef idx="0">
+            <a:schemeClr val="accent1"/>
+          </a:fillRef>
+          <a:effectRef idx="1">
+            <a:schemeClr val="accent1"/>
+          </a:effectRef>
+          <a:fontRef idx="minor">
+            <a:schemeClr val="tx1"/>
+          </a:fontRef>
+        </p:style>
+      </p:cxnSp>
+      <p:cxnSp>
+        <p:nvCxnSpPr>
+          <p:cNvPr id="61" name="Connector: Elbow 60">
+            <a:extLst>
+              <a:ext uri="{FF2B5EF4-FFF2-40B4-BE49-F238E27FC236}">
+                <a16:creationId xmlns:a16="http://schemas.microsoft.com/office/drawing/2014/main" id="{23EFF02A-BE26-22B4-1CCC-ADE330DC5E9D}"/>
+              </a:ext>
+            </a:extLst>
+          </p:cNvPr>
+          <p:cNvCxnSpPr>
+            <a:cxnSpLocks/>
+            <a:stCxn id="46" idx="2"/>
+          </p:cNvCxnSpPr>
+          <p:nvPr/>
+        </p:nvCxnSpPr>
+        <p:spPr>
+          <a:xfrm rot="16200000" flipH="1">
+            <a:off x="5504646" y="4127541"/>
+            <a:ext cx="91671" cy="871634"/>
+          </a:xfrm>
+          <a:prstGeom prst="bentConnector2">
+            <a:avLst/>
+          </a:prstGeom>
+        </p:spPr>
+        <p:style>
+          <a:lnRef idx="2">
+            <a:schemeClr val="accent1"/>
+          </a:lnRef>
+          <a:fillRef idx="0">
+            <a:schemeClr val="accent1"/>
+          </a:fillRef>
+          <a:effectRef idx="1">
+            <a:schemeClr val="accent1"/>
+          </a:effectRef>
+          <a:fontRef idx="minor">
+            <a:schemeClr val="tx1"/>
+          </a:fontRef>
+        </p:style>
+      </p:cxnSp>
+      <p:sp>
+        <p:nvSpPr>
+          <p:cNvPr id="62" name="TextBox 61">
+            <a:extLst>
+              <a:ext uri="{FF2B5EF4-FFF2-40B4-BE49-F238E27FC236}">
+                <a16:creationId xmlns:a16="http://schemas.microsoft.com/office/drawing/2014/main" id="{4AA59346-0290-5757-1BD4-B3AA0E496921}"/>
+              </a:ext>
+            </a:extLst>
+          </p:cNvPr>
+          <p:cNvSpPr txBox="1"/>
+          <p:nvPr/>
+        </p:nvSpPr>
+        <p:spPr>
+          <a:xfrm>
+            <a:off x="1312255" y="1904194"/>
+            <a:ext cx="1935834" cy="738664"/>
+          </a:xfrm>
+          <a:prstGeom prst="rect">
+            <a:avLst/>
+          </a:prstGeom>
+          <a:noFill/>
+        </p:spPr>
+        <p:txBody>
+          <a:bodyPr wrap="square">
+            <a:spAutoFit/>
+          </a:bodyPr>
+          <a:lstStyle/>
+          <a:p>
+            <a:r>
+              <a:rPr lang="en-US" sz="1400" b="1" dirty="0">
+                <a:solidFill>
+                  <a:schemeClr val="bg1"/>
+                </a:solidFill>
+              </a:rPr>
+              <a:t>Real-world train module function mapping </a:t>
+            </a:r>
+            <a:endParaRPr lang="en-SG" sz="1400" b="1" dirty="0">
+              <a:solidFill>
+                <a:schemeClr val="bg1"/>
+              </a:solidFill>
+            </a:endParaRPr>
+          </a:p>
+        </p:txBody>
+      </p:sp>
+      <p:sp>
+        <p:nvSpPr>
+          <p:cNvPr id="63" name="TextBox 62">
+            <a:extLst>
+              <a:ext uri="{FF2B5EF4-FFF2-40B4-BE49-F238E27FC236}">
+                <a16:creationId xmlns:a16="http://schemas.microsoft.com/office/drawing/2014/main" id="{01D7C0E6-DBAA-1F53-FF3E-D4ABC542B12A}"/>
+              </a:ext>
+            </a:extLst>
+          </p:cNvPr>
+          <p:cNvSpPr txBox="1"/>
+          <p:nvPr/>
+        </p:nvSpPr>
+        <p:spPr>
+          <a:xfrm>
+            <a:off x="7365162" y="4395398"/>
+            <a:ext cx="1356985" cy="461665"/>
+          </a:xfrm>
+          <a:prstGeom prst="rect">
+            <a:avLst/>
+          </a:prstGeom>
+          <a:noFill/>
+        </p:spPr>
+        <p:txBody>
+          <a:bodyPr wrap="square">
+            <a:spAutoFit/>
+          </a:bodyPr>
+          <a:lstStyle/>
+          <a:p>
+            <a:r>
+              <a:rPr lang="en-US" sz="1200" b="1" dirty="0">
+                <a:solidFill>
+                  <a:schemeClr val="bg1"/>
+                </a:solidFill>
+              </a:rPr>
+              <a:t>Train driving control PLC</a:t>
+            </a:r>
+            <a:endParaRPr lang="en-SG" sz="1200" b="1" dirty="0">
+              <a:solidFill>
+                <a:schemeClr val="bg1"/>
+              </a:solidFill>
+            </a:endParaRPr>
+          </a:p>
+        </p:txBody>
+      </p:sp>
+      <p:sp>
+        <p:nvSpPr>
+          <p:cNvPr id="64" name="TextBox 63">
+            <a:extLst>
+              <a:ext uri="{FF2B5EF4-FFF2-40B4-BE49-F238E27FC236}">
+                <a16:creationId xmlns:a16="http://schemas.microsoft.com/office/drawing/2014/main" id="{ABEC18DA-FA18-2751-0B6B-7AD28159C911}"/>
+              </a:ext>
+            </a:extLst>
+          </p:cNvPr>
+          <p:cNvSpPr txBox="1"/>
+          <p:nvPr/>
+        </p:nvSpPr>
+        <p:spPr>
+          <a:xfrm>
+            <a:off x="3441084" y="4489751"/>
+            <a:ext cx="2017339" cy="276999"/>
+          </a:xfrm>
+          <a:prstGeom prst="rect">
+            <a:avLst/>
+          </a:prstGeom>
+          <a:noFill/>
+        </p:spPr>
+        <p:txBody>
+          <a:bodyPr wrap="square">
+            <a:spAutoFit/>
+          </a:bodyPr>
+          <a:lstStyle/>
+          <a:p>
+            <a:r>
+              <a:rPr lang="en-US" sz="1200" b="1" dirty="0">
+                <a:solidFill>
+                  <a:schemeClr val="bg1"/>
+                </a:solidFill>
+              </a:rPr>
+              <a:t>Train sensors RTU</a:t>
+            </a:r>
+            <a:endParaRPr lang="en-SG" sz="1200" b="1" dirty="0">
+              <a:solidFill>
+                <a:schemeClr val="bg1"/>
+              </a:solidFill>
+            </a:endParaRPr>
+          </a:p>
+        </p:txBody>
+      </p:sp>
+      <p:pic>
+        <p:nvPicPr>
+          <p:cNvPr id="65" name="Picture 64">
+            <a:extLst>
+              <a:ext uri="{FF2B5EF4-FFF2-40B4-BE49-F238E27FC236}">
+                <a16:creationId xmlns:a16="http://schemas.microsoft.com/office/drawing/2014/main" id="{A1D546AB-941A-081F-1CAE-DF443B092F7B}"/>
+              </a:ext>
+            </a:extLst>
+          </p:cNvPr>
+          <p:cNvPicPr>
+            <a:picLocks noChangeAspect="1"/>
+          </p:cNvPicPr>
+          <p:nvPr/>
+        </p:nvPicPr>
+        <p:blipFill>
+          <a:blip r:embed="rId6"/>
+          <a:stretch>
+            <a:fillRect/>
+          </a:stretch>
+        </p:blipFill>
+        <p:spPr>
+          <a:xfrm>
+            <a:off x="2411426" y="3502960"/>
+            <a:ext cx="379553" cy="367567"/>
+          </a:xfrm>
+          <a:prstGeom prst="rect">
+            <a:avLst/>
+          </a:prstGeom>
+          <a:ln w="9525">
+            <a:solidFill>
+              <a:schemeClr val="tx1"/>
+            </a:solidFill>
+          </a:ln>
+        </p:spPr>
+      </p:pic>
+      <p:sp>
+        <p:nvSpPr>
+          <p:cNvPr id="66" name="TextBox 65">
+            <a:extLst>
+              <a:ext uri="{FF2B5EF4-FFF2-40B4-BE49-F238E27FC236}">
+                <a16:creationId xmlns:a16="http://schemas.microsoft.com/office/drawing/2014/main" id="{3CFEFB6C-672E-0801-5A81-552DCDBCD9B1}"/>
+              </a:ext>
+            </a:extLst>
+          </p:cNvPr>
+          <p:cNvSpPr txBox="1"/>
+          <p:nvPr/>
+        </p:nvSpPr>
+        <p:spPr>
+          <a:xfrm>
+            <a:off x="1529545" y="4173494"/>
+            <a:ext cx="915093" cy="461665"/>
+          </a:xfrm>
+          <a:prstGeom prst="rect">
+            <a:avLst/>
+          </a:prstGeom>
+          <a:noFill/>
+        </p:spPr>
+        <p:txBody>
+          <a:bodyPr wrap="square">
+            <a:spAutoFit/>
+          </a:bodyPr>
+          <a:lstStyle/>
+          <a:p>
+            <a:r>
+              <a:rPr lang="en-US" sz="1200" b="1" dirty="0">
+                <a:solidFill>
+                  <a:schemeClr val="bg1"/>
+                </a:solidFill>
+              </a:rPr>
+              <a:t>On train antenna  </a:t>
+            </a:r>
+            <a:endParaRPr lang="en-SG" sz="1200" b="1" dirty="0">
+              <a:solidFill>
+                <a:schemeClr val="bg1"/>
+              </a:solidFill>
+            </a:endParaRPr>
+          </a:p>
+        </p:txBody>
+      </p:sp>
+      <p:cxnSp>
+        <p:nvCxnSpPr>
+          <p:cNvPr id="67" name="Straight Arrow Connector 66">
+            <a:extLst>
+              <a:ext uri="{FF2B5EF4-FFF2-40B4-BE49-F238E27FC236}">
+                <a16:creationId xmlns:a16="http://schemas.microsoft.com/office/drawing/2014/main" id="{B7F31124-D413-9CF8-0CE4-7F7D331FAF6B}"/>
+              </a:ext>
+            </a:extLst>
+          </p:cNvPr>
+          <p:cNvCxnSpPr>
+            <a:cxnSpLocks/>
+          </p:cNvCxnSpPr>
+          <p:nvPr/>
+        </p:nvCxnSpPr>
+        <p:spPr>
+          <a:xfrm flipV="1">
+            <a:off x="2029759" y="3797311"/>
+            <a:ext cx="298823" cy="402147"/>
+          </a:xfrm>
+          <a:prstGeom prst="straightConnector1">
+            <a:avLst/>
+          </a:prstGeom>
+          <a:ln w="9525">
+            <a:prstDash val="sysDash"/>
+            <a:tailEnd type="triangle"/>
+          </a:ln>
+        </p:spPr>
+        <p:style>
+          <a:lnRef idx="2">
+            <a:schemeClr val="accent2"/>
+          </a:lnRef>
+          <a:fillRef idx="0">
+            <a:schemeClr val="accent2"/>
+          </a:fillRef>
+          <a:effectRef idx="1">
+            <a:schemeClr val="accent2"/>
+          </a:effectRef>
+          <a:fontRef idx="minor">
+            <a:schemeClr val="tx1"/>
+          </a:fontRef>
+        </p:style>
+      </p:cxnSp>
+      <p:cxnSp>
+        <p:nvCxnSpPr>
+          <p:cNvPr id="68" name="Connector: Elbow 67">
+            <a:extLst>
+              <a:ext uri="{FF2B5EF4-FFF2-40B4-BE49-F238E27FC236}">
+                <a16:creationId xmlns:a16="http://schemas.microsoft.com/office/drawing/2014/main" id="{6EC8AEFA-4695-6A95-0B55-66C759F38EB5}"/>
+              </a:ext>
+            </a:extLst>
+          </p:cNvPr>
+          <p:cNvCxnSpPr>
+            <a:cxnSpLocks/>
+            <a:endCxn id="65" idx="3"/>
+          </p:cNvCxnSpPr>
+          <p:nvPr/>
+        </p:nvCxnSpPr>
+        <p:spPr>
+          <a:xfrm rot="16200000" flipV="1">
+            <a:off x="2534761" y="3942963"/>
+            <a:ext cx="734847" cy="222410"/>
+          </a:xfrm>
+          <a:prstGeom prst="bentConnector2">
+            <a:avLst/>
+          </a:prstGeom>
+          <a:ln w="19050">
+            <a:solidFill>
+              <a:schemeClr val="tx2">
+                <a:lumMod val="75000"/>
+                <a:lumOff val="25000"/>
+              </a:schemeClr>
+            </a:solidFill>
+            <a:prstDash val="sysDash"/>
+          </a:ln>
+        </p:spPr>
+        <p:style>
+          <a:lnRef idx="2">
+            <a:schemeClr val="accent1"/>
+          </a:lnRef>
+          <a:fillRef idx="0">
+            <a:schemeClr val="accent1"/>
+          </a:fillRef>
+          <a:effectRef idx="1">
+            <a:schemeClr val="accent1"/>
+          </a:effectRef>
+          <a:fontRef idx="minor">
+            <a:schemeClr val="tx1"/>
+          </a:fontRef>
+        </p:style>
+      </p:cxnSp>
+      <p:cxnSp>
+        <p:nvCxnSpPr>
+          <p:cNvPr id="69" name="Straight Connector 68">
+            <a:extLst>
+              <a:ext uri="{FF2B5EF4-FFF2-40B4-BE49-F238E27FC236}">
+                <a16:creationId xmlns:a16="http://schemas.microsoft.com/office/drawing/2014/main" id="{7A5F6A3C-69AE-7777-9696-5EC7F895BA20}"/>
+              </a:ext>
+            </a:extLst>
+          </p:cNvPr>
+          <p:cNvCxnSpPr/>
+          <p:nvPr/>
+        </p:nvCxnSpPr>
+        <p:spPr>
+          <a:xfrm>
+            <a:off x="3013390" y="4421591"/>
+            <a:ext cx="1780247" cy="0"/>
+          </a:xfrm>
+          <a:prstGeom prst="line">
+            <a:avLst/>
+          </a:prstGeom>
+          <a:ln>
+            <a:prstDash val="sysDash"/>
+          </a:ln>
+        </p:spPr>
+        <p:style>
+          <a:lnRef idx="2">
+            <a:schemeClr val="accent1"/>
+          </a:lnRef>
+          <a:fillRef idx="0">
+            <a:schemeClr val="accent1"/>
+          </a:fillRef>
+          <a:effectRef idx="1">
+            <a:schemeClr val="accent1"/>
+          </a:effectRef>
+          <a:fontRef idx="minor">
+            <a:schemeClr val="tx1"/>
+          </a:fontRef>
+        </p:style>
+      </p:cxnSp>
+      <p:pic>
+        <p:nvPicPr>
+          <p:cNvPr id="70" name="Picture 69">
+            <a:extLst>
+              <a:ext uri="{FF2B5EF4-FFF2-40B4-BE49-F238E27FC236}">
+                <a16:creationId xmlns:a16="http://schemas.microsoft.com/office/drawing/2014/main" id="{2AB86227-8118-465A-90A6-D21CDA9D50CD}"/>
+              </a:ext>
+            </a:extLst>
+          </p:cNvPr>
+          <p:cNvPicPr>
+            <a:picLocks noChangeAspect="1"/>
+          </p:cNvPicPr>
+          <p:nvPr/>
+        </p:nvPicPr>
+        <p:blipFill>
+          <a:blip r:embed="rId7"/>
+          <a:stretch>
+            <a:fillRect/>
+          </a:stretch>
+        </p:blipFill>
+        <p:spPr>
+          <a:xfrm>
+            <a:off x="2285348" y="5136612"/>
+            <a:ext cx="625739" cy="619418"/>
+          </a:xfrm>
+          <a:prstGeom prst="rect">
+            <a:avLst/>
+          </a:prstGeom>
+          <a:ln w="9525">
+            <a:solidFill>
+              <a:schemeClr val="tx1"/>
+            </a:solidFill>
+          </a:ln>
+        </p:spPr>
+      </p:pic>
+      <p:sp>
+        <p:nvSpPr>
+          <p:cNvPr id="71" name="TextBox 70">
+            <a:extLst>
+              <a:ext uri="{FF2B5EF4-FFF2-40B4-BE49-F238E27FC236}">
+                <a16:creationId xmlns:a16="http://schemas.microsoft.com/office/drawing/2014/main" id="{D54BB6BD-9164-277F-36C1-0FC6D4F6F78D}"/>
+              </a:ext>
+            </a:extLst>
+          </p:cNvPr>
+          <p:cNvSpPr txBox="1"/>
+          <p:nvPr/>
+        </p:nvSpPr>
+        <p:spPr>
+          <a:xfrm>
+            <a:off x="2906630" y="4981919"/>
+            <a:ext cx="915093" cy="461665"/>
+          </a:xfrm>
+          <a:prstGeom prst="rect">
+            <a:avLst/>
+          </a:prstGeom>
+          <a:noFill/>
+        </p:spPr>
+        <p:txBody>
+          <a:bodyPr wrap="square">
+            <a:spAutoFit/>
+          </a:bodyPr>
+          <a:lstStyle/>
+          <a:p>
+            <a:r>
+              <a:rPr lang="en-US" sz="1200" b="1" dirty="0">
+                <a:solidFill>
+                  <a:schemeClr val="bg1"/>
+                </a:solidFill>
+              </a:rPr>
+              <a:t>Railway antenna  </a:t>
+            </a:r>
+            <a:endParaRPr lang="en-SG" sz="1200" b="1" dirty="0">
+              <a:solidFill>
+                <a:schemeClr val="bg1"/>
+              </a:solidFill>
+            </a:endParaRPr>
+          </a:p>
+        </p:txBody>
+      </p:sp>
+      <p:cxnSp>
+        <p:nvCxnSpPr>
+          <p:cNvPr id="72" name="Straight Connector 71">
+            <a:extLst>
+              <a:ext uri="{FF2B5EF4-FFF2-40B4-BE49-F238E27FC236}">
+                <a16:creationId xmlns:a16="http://schemas.microsoft.com/office/drawing/2014/main" id="{30389ADD-682E-CCDF-412B-963455B6221B}"/>
+              </a:ext>
+            </a:extLst>
+          </p:cNvPr>
+          <p:cNvCxnSpPr>
+            <a:cxnSpLocks/>
+            <a:endCxn id="70" idx="0"/>
+          </p:cNvCxnSpPr>
+          <p:nvPr/>
+        </p:nvCxnSpPr>
+        <p:spPr>
+          <a:xfrm>
+            <a:off x="2598218" y="3867888"/>
+            <a:ext cx="0" cy="1268724"/>
+          </a:xfrm>
+          <a:prstGeom prst="line">
+            <a:avLst/>
+          </a:prstGeom>
+          <a:ln w="19050">
+            <a:solidFill>
+              <a:schemeClr val="bg1"/>
+            </a:solidFill>
+            <a:prstDash val="dash"/>
+          </a:ln>
+        </p:spPr>
+        <p:style>
+          <a:lnRef idx="1">
+            <a:schemeClr val="dk1"/>
+          </a:lnRef>
+          <a:fillRef idx="0">
+            <a:schemeClr val="dk1"/>
+          </a:fillRef>
+          <a:effectRef idx="0">
+            <a:schemeClr val="dk1"/>
+          </a:effectRef>
+          <a:fontRef idx="minor">
+            <a:schemeClr val="tx1"/>
+          </a:fontRef>
+        </p:style>
+      </p:cxnSp>
+      <p:sp>
+        <p:nvSpPr>
+          <p:cNvPr id="73" name="Oval 72">
+            <a:extLst>
+              <a:ext uri="{FF2B5EF4-FFF2-40B4-BE49-F238E27FC236}">
+                <a16:creationId xmlns:a16="http://schemas.microsoft.com/office/drawing/2014/main" id="{8C2554F9-3C3B-468F-83C4-5A6172A2D4CC}"/>
+              </a:ext>
+            </a:extLst>
+          </p:cNvPr>
+          <p:cNvSpPr/>
+          <p:nvPr/>
+        </p:nvSpPr>
+        <p:spPr>
+          <a:xfrm>
+            <a:off x="3290141" y="2871449"/>
+            <a:ext cx="157467" cy="193325"/>
+          </a:xfrm>
+          <a:prstGeom prst="ellipse">
+            <a:avLst/>
+          </a:prstGeom>
+          <a:solidFill>
+            <a:schemeClr val="tx1">
+              <a:lumMod val="50000"/>
+              <a:lumOff val="50000"/>
+            </a:schemeClr>
+          </a:solidFill>
+        </p:spPr>
+        <p:style>
+          <a:lnRef idx="2">
+            <a:schemeClr val="accent1">
+              <a:shade val="15000"/>
+            </a:schemeClr>
+          </a:lnRef>
+          <a:fillRef idx="1">
+            <a:schemeClr val="accent1"/>
+          </a:fillRef>
+          <a:effectRef idx="0">
+            <a:schemeClr val="accent1"/>
+          </a:effectRef>
+          <a:fontRef idx="minor">
+            <a:schemeClr val="lt1"/>
+          </a:fontRef>
+        </p:style>
+        <p:txBody>
+          <a:bodyPr rtlCol="0" anchor="ctr"/>
+          <a:lstStyle/>
+          <a:p>
+            <a:pPr algn="ctr"/>
+            <a:endParaRPr lang="en-SG" dirty="0">
+              <a:solidFill>
+                <a:schemeClr val="bg1"/>
+              </a:solidFill>
+            </a:endParaRPr>
+          </a:p>
+        </p:txBody>
+      </p:sp>
+      <p:cxnSp>
+        <p:nvCxnSpPr>
+          <p:cNvPr id="74" name="Straight Connector 73">
+            <a:extLst>
+              <a:ext uri="{FF2B5EF4-FFF2-40B4-BE49-F238E27FC236}">
+                <a16:creationId xmlns:a16="http://schemas.microsoft.com/office/drawing/2014/main" id="{9BEB9E9A-5AD2-BDA4-0E3A-05E51E36DEF1}"/>
+              </a:ext>
+            </a:extLst>
+          </p:cNvPr>
+          <p:cNvCxnSpPr>
+            <a:cxnSpLocks/>
+          </p:cNvCxnSpPr>
+          <p:nvPr/>
+        </p:nvCxnSpPr>
+        <p:spPr>
+          <a:xfrm flipH="1" flipV="1">
+            <a:off x="3156767" y="2761462"/>
+            <a:ext cx="139955" cy="171643"/>
+          </a:xfrm>
+          <a:prstGeom prst="line">
+            <a:avLst/>
+          </a:prstGeom>
+        </p:spPr>
+        <p:style>
+          <a:lnRef idx="2">
+            <a:schemeClr val="accent1"/>
+          </a:lnRef>
+          <a:fillRef idx="0">
+            <a:schemeClr val="accent1"/>
+          </a:fillRef>
+          <a:effectRef idx="1">
+            <a:schemeClr val="accent1"/>
+          </a:effectRef>
+          <a:fontRef idx="minor">
+            <a:schemeClr val="tx1"/>
+          </a:fontRef>
+        </p:style>
+      </p:cxnSp>
+      <p:cxnSp>
+        <p:nvCxnSpPr>
+          <p:cNvPr id="75" name="Straight Arrow Connector 74">
+            <a:extLst>
+              <a:ext uri="{FF2B5EF4-FFF2-40B4-BE49-F238E27FC236}">
+                <a16:creationId xmlns:a16="http://schemas.microsoft.com/office/drawing/2014/main" id="{BC795703-A305-240E-7D53-83054B740C48}"/>
+              </a:ext>
+            </a:extLst>
+          </p:cNvPr>
+          <p:cNvCxnSpPr>
+            <a:cxnSpLocks/>
+          </p:cNvCxnSpPr>
+          <p:nvPr/>
+        </p:nvCxnSpPr>
+        <p:spPr>
+          <a:xfrm flipH="1">
+            <a:off x="3330002" y="2273526"/>
+            <a:ext cx="444" cy="547121"/>
+          </a:xfrm>
+          <a:prstGeom prst="straightConnector1">
+            <a:avLst/>
+          </a:prstGeom>
+          <a:ln w="9525">
+            <a:prstDash val="sysDash"/>
+            <a:tailEnd type="triangle"/>
+          </a:ln>
+        </p:spPr>
+        <p:style>
+          <a:lnRef idx="2">
+            <a:schemeClr val="accent2"/>
+          </a:lnRef>
+          <a:fillRef idx="0">
+            <a:schemeClr val="accent2"/>
+          </a:fillRef>
+          <a:effectRef idx="1">
+            <a:schemeClr val="accent2"/>
+          </a:effectRef>
+          <a:fontRef idx="minor">
+            <a:schemeClr val="tx1"/>
+          </a:fontRef>
+        </p:style>
+      </p:cxnSp>
+      <p:sp>
+        <p:nvSpPr>
+          <p:cNvPr id="76" name="TextBox 75">
+            <a:extLst>
+              <a:ext uri="{FF2B5EF4-FFF2-40B4-BE49-F238E27FC236}">
+                <a16:creationId xmlns:a16="http://schemas.microsoft.com/office/drawing/2014/main" id="{6095257E-C199-A395-26B3-69337D3416E6}"/>
+              </a:ext>
+            </a:extLst>
+          </p:cNvPr>
+          <p:cNvSpPr txBox="1"/>
+          <p:nvPr/>
+        </p:nvSpPr>
+        <p:spPr>
+          <a:xfrm>
+            <a:off x="2280172" y="4461585"/>
+            <a:ext cx="986686" cy="461665"/>
+          </a:xfrm>
+          <a:prstGeom prst="rect">
+            <a:avLst/>
+          </a:prstGeom>
+          <a:noFill/>
+        </p:spPr>
+        <p:txBody>
+          <a:bodyPr wrap="square">
+            <a:spAutoFit/>
+          </a:bodyPr>
+          <a:lstStyle/>
+          <a:p>
+            <a:r>
+              <a:rPr lang="en-US" sz="1200" b="1" dirty="0">
+                <a:solidFill>
+                  <a:schemeClr val="bg1"/>
+                </a:solidFill>
+              </a:rPr>
+              <a:t>Wireless connection</a:t>
+            </a:r>
+            <a:endParaRPr lang="en-SG" sz="1200" b="1" dirty="0">
+              <a:solidFill>
+                <a:schemeClr val="bg1"/>
+              </a:solidFill>
+            </a:endParaRPr>
+          </a:p>
+        </p:txBody>
+      </p:sp>
+      <p:sp>
+        <p:nvSpPr>
+          <p:cNvPr id="77" name="TextBox 76">
+            <a:extLst>
+              <a:ext uri="{FF2B5EF4-FFF2-40B4-BE49-F238E27FC236}">
+                <a16:creationId xmlns:a16="http://schemas.microsoft.com/office/drawing/2014/main" id="{92D6D40D-F5FB-C61F-415E-BEBF4C0DDB99}"/>
+              </a:ext>
+            </a:extLst>
+          </p:cNvPr>
+          <p:cNvSpPr txBox="1"/>
+          <p:nvPr/>
+        </p:nvSpPr>
+        <p:spPr>
+          <a:xfrm>
+            <a:off x="3090523" y="1970405"/>
+            <a:ext cx="1188622" cy="276999"/>
+          </a:xfrm>
+          <a:prstGeom prst="rect">
+            <a:avLst/>
+          </a:prstGeom>
+          <a:noFill/>
+        </p:spPr>
+        <p:txBody>
+          <a:bodyPr wrap="square">
+            <a:spAutoFit/>
+          </a:bodyPr>
+          <a:lstStyle/>
+          <a:p>
+            <a:r>
+              <a:rPr lang="en-US" sz="1200" b="1" dirty="0">
+                <a:solidFill>
+                  <a:schemeClr val="bg1"/>
+                </a:solidFill>
+              </a:rPr>
+              <a:t>Train DC moto</a:t>
+            </a:r>
+            <a:endParaRPr lang="en-SG" sz="1200" b="1" dirty="0">
+              <a:solidFill>
+                <a:schemeClr val="bg1"/>
+              </a:solidFill>
+            </a:endParaRPr>
+          </a:p>
+        </p:txBody>
+      </p:sp>
+    </p:spTree>
+    <p:extLst>
+      <p:ext uri="{BB962C8B-B14F-4D97-AF65-F5344CB8AC3E}">
+        <p14:creationId xmlns:p14="http://schemas.microsoft.com/office/powerpoint/2010/main" val="3394858066"/>
       </p:ext>
     </p:extLst>
   </p:cSld>

</xml_diff>

<commit_message>
update the use case example of the IEC104 PLC read me file.
</commit_message>
<xml_diff>
--- a/doc/designDoc.pptx
+++ b/doc/designDoc.pptx
@@ -5,7 +5,7 @@
     <p:sldMasterId id="2147483648" r:id="rId1"/>
   </p:sldMasterIdLst>
   <p:notesMasterIdLst>
-    <p:notesMasterId r:id="rId16"/>
+    <p:notesMasterId r:id="rId17"/>
   </p:notesMasterIdLst>
   <p:sldIdLst>
     <p:sldId id="256" r:id="rId2"/>
@@ -22,6 +22,7 @@
     <p:sldId id="265" r:id="rId13"/>
     <p:sldId id="259" r:id="rId14"/>
     <p:sldId id="266" r:id="rId15"/>
+    <p:sldId id="270" r:id="rId16"/>
   </p:sldIdLst>
   <p:sldSz cx="12192000" cy="6858000"/>
   <p:notesSz cx="6858000" cy="9144000"/>
@@ -210,7 +211,7 @@
           <a:p>
             <a:fld id="{CA98FC0A-A656-46B8-8BCE-B9957593F2EC}" type="datetimeFigureOut">
               <a:rPr lang="en-SG" smtClean="0"/>
-              <a:t>12/5/2025</a:t>
+              <a:t>13/5/2025</a:t>
             </a:fld>
             <a:endParaRPr lang="en-SG"/>
           </a:p>
@@ -711,7 +712,7 @@
           <a:p>
             <a:fld id="{F953FF10-B1B6-4147-A9BC-BC236B7E3AD4}" type="datetimeFigureOut">
               <a:rPr lang="en-SG" smtClean="0"/>
-              <a:t>12/5/2025</a:t>
+              <a:t>13/5/2025</a:t>
             </a:fld>
             <a:endParaRPr lang="en-SG"/>
           </a:p>
@@ -911,7 +912,7 @@
           <a:p>
             <a:fld id="{F953FF10-B1B6-4147-A9BC-BC236B7E3AD4}" type="datetimeFigureOut">
               <a:rPr lang="en-SG" smtClean="0"/>
-              <a:t>12/5/2025</a:t>
+              <a:t>13/5/2025</a:t>
             </a:fld>
             <a:endParaRPr lang="en-SG"/>
           </a:p>
@@ -1121,7 +1122,7 @@
           <a:p>
             <a:fld id="{F953FF10-B1B6-4147-A9BC-BC236B7E3AD4}" type="datetimeFigureOut">
               <a:rPr lang="en-SG" smtClean="0"/>
-              <a:t>12/5/2025</a:t>
+              <a:t>13/5/2025</a:t>
             </a:fld>
             <a:endParaRPr lang="en-SG"/>
           </a:p>
@@ -1321,7 +1322,7 @@
           <a:p>
             <a:fld id="{F953FF10-B1B6-4147-A9BC-BC236B7E3AD4}" type="datetimeFigureOut">
               <a:rPr lang="en-SG" smtClean="0"/>
-              <a:t>12/5/2025</a:t>
+              <a:t>13/5/2025</a:t>
             </a:fld>
             <a:endParaRPr lang="en-SG"/>
           </a:p>
@@ -1597,7 +1598,7 @@
           <a:p>
             <a:fld id="{F953FF10-B1B6-4147-A9BC-BC236B7E3AD4}" type="datetimeFigureOut">
               <a:rPr lang="en-SG" smtClean="0"/>
-              <a:t>12/5/2025</a:t>
+              <a:t>13/5/2025</a:t>
             </a:fld>
             <a:endParaRPr lang="en-SG"/>
           </a:p>
@@ -1865,7 +1866,7 @@
           <a:p>
             <a:fld id="{F953FF10-B1B6-4147-A9BC-BC236B7E3AD4}" type="datetimeFigureOut">
               <a:rPr lang="en-SG" smtClean="0"/>
-              <a:t>12/5/2025</a:t>
+              <a:t>13/5/2025</a:t>
             </a:fld>
             <a:endParaRPr lang="en-SG"/>
           </a:p>
@@ -2280,7 +2281,7 @@
           <a:p>
             <a:fld id="{F953FF10-B1B6-4147-A9BC-BC236B7E3AD4}" type="datetimeFigureOut">
               <a:rPr lang="en-SG" smtClean="0"/>
-              <a:t>12/5/2025</a:t>
+              <a:t>13/5/2025</a:t>
             </a:fld>
             <a:endParaRPr lang="en-SG"/>
           </a:p>
@@ -2422,7 +2423,7 @@
           <a:p>
             <a:fld id="{F953FF10-B1B6-4147-A9BC-BC236B7E3AD4}" type="datetimeFigureOut">
               <a:rPr lang="en-SG" smtClean="0"/>
-              <a:t>12/5/2025</a:t>
+              <a:t>13/5/2025</a:t>
             </a:fld>
             <a:endParaRPr lang="en-SG"/>
           </a:p>
@@ -2535,7 +2536,7 @@
           <a:p>
             <a:fld id="{F953FF10-B1B6-4147-A9BC-BC236B7E3AD4}" type="datetimeFigureOut">
               <a:rPr lang="en-SG" smtClean="0"/>
-              <a:t>12/5/2025</a:t>
+              <a:t>13/5/2025</a:t>
             </a:fld>
             <a:endParaRPr lang="en-SG"/>
           </a:p>
@@ -2848,7 +2849,7 @@
           <a:p>
             <a:fld id="{F953FF10-B1B6-4147-A9BC-BC236B7E3AD4}" type="datetimeFigureOut">
               <a:rPr lang="en-SG" smtClean="0"/>
-              <a:t>12/5/2025</a:t>
+              <a:t>13/5/2025</a:t>
             </a:fld>
             <a:endParaRPr lang="en-SG"/>
           </a:p>
@@ -3137,7 +3138,7 @@
           <a:p>
             <a:fld id="{F953FF10-B1B6-4147-A9BC-BC236B7E3AD4}" type="datetimeFigureOut">
               <a:rPr lang="en-SG" smtClean="0"/>
-              <a:t>12/5/2025</a:t>
+              <a:t>13/5/2025</a:t>
             </a:fld>
             <a:endParaRPr lang="en-SG"/>
           </a:p>
@@ -3380,7 +3381,7 @@
           <a:p>
             <a:fld id="{F953FF10-B1B6-4147-A9BC-BC236B7E3AD4}" type="datetimeFigureOut">
               <a:rPr lang="en-SG" smtClean="0"/>
-              <a:t>12/5/2025</a:t>
+              <a:t>13/5/2025</a:t>
             </a:fld>
             <a:endParaRPr lang="en-SG"/>
           </a:p>
@@ -16130,6 +16131,1616 @@
     <p:extLst>
       <p:ext uri="{BB962C8B-B14F-4D97-AF65-F5344CB8AC3E}">
         <p14:creationId xmlns:p14="http://schemas.microsoft.com/office/powerpoint/2010/main" val="3394858066"/>
+      </p:ext>
+    </p:extLst>
+  </p:cSld>
+  <p:clrMapOvr>
+    <a:masterClrMapping/>
+  </p:clrMapOvr>
+</p:sld>
+</file>
+
+<file path=ppt/slides/slide15.xml><?xml version="1.0" encoding="utf-8"?>
+<p:sld xmlns:a="http://schemas.openxmlformats.org/drawingml/2006/main" xmlns:r="http://schemas.openxmlformats.org/officeDocument/2006/relationships" xmlns:p="http://schemas.openxmlformats.org/presentationml/2006/main">
+  <p:cSld>
+    <p:spTree>
+      <p:nvGrpSpPr>
+        <p:cNvPr id="1" name=""/>
+        <p:cNvGrpSpPr/>
+        <p:nvPr/>
+      </p:nvGrpSpPr>
+      <p:grpSpPr>
+        <a:xfrm>
+          <a:off x="0" y="0"/>
+          <a:ext cx="0" cy="0"/>
+          <a:chOff x="0" y="0"/>
+          <a:chExt cx="0" cy="0"/>
+        </a:xfrm>
+      </p:grpSpPr>
+      <p:pic>
+        <p:nvPicPr>
+          <p:cNvPr id="4" name="Picture 3">
+            <a:extLst>
+              <a:ext uri="{FF2B5EF4-FFF2-40B4-BE49-F238E27FC236}">
+                <a16:creationId xmlns:a16="http://schemas.microsoft.com/office/drawing/2014/main" id="{705A6E65-F07E-ABAC-2998-EA412B17C65F}"/>
+              </a:ext>
+            </a:extLst>
+          </p:cNvPr>
+          <p:cNvPicPr>
+            <a:picLocks noChangeAspect="1"/>
+          </p:cNvPicPr>
+          <p:nvPr/>
+        </p:nvPicPr>
+        <p:blipFill>
+          <a:blip r:embed="rId2">
+            <a:extLst>
+              <a:ext uri="{28A0092B-C50C-407E-A947-70E740481C1C}">
+                <a14:useLocalDpi xmlns:a14="http://schemas.microsoft.com/office/drawing/2010/main" val="0"/>
+              </a:ext>
+            </a:extLst>
+          </a:blip>
+          <a:stretch>
+            <a:fillRect/>
+          </a:stretch>
+        </p:blipFill>
+        <p:spPr>
+          <a:xfrm>
+            <a:off x="2259911" y="1240921"/>
+            <a:ext cx="476190" cy="428571"/>
+          </a:xfrm>
+          <a:prstGeom prst="rect">
+            <a:avLst/>
+          </a:prstGeom>
+          <a:ln w="6350">
+            <a:solidFill>
+              <a:schemeClr val="tx1"/>
+            </a:solidFill>
+          </a:ln>
+        </p:spPr>
+      </p:pic>
+      <p:pic>
+        <p:nvPicPr>
+          <p:cNvPr id="5" name="Picture 4">
+            <a:extLst>
+              <a:ext uri="{FF2B5EF4-FFF2-40B4-BE49-F238E27FC236}">
+                <a16:creationId xmlns:a16="http://schemas.microsoft.com/office/drawing/2014/main" id="{AB5929AF-D732-E9B3-F474-2B3F77069F9B}"/>
+              </a:ext>
+            </a:extLst>
+          </p:cNvPr>
+          <p:cNvPicPr>
+            <a:picLocks noChangeAspect="1"/>
+          </p:cNvPicPr>
+          <p:nvPr/>
+        </p:nvPicPr>
+        <p:blipFill>
+          <a:blip r:embed="rId3">
+            <a:extLst>
+              <a:ext uri="{28A0092B-C50C-407E-A947-70E740481C1C}">
+                <a14:useLocalDpi xmlns:a14="http://schemas.microsoft.com/office/drawing/2010/main" val="0"/>
+              </a:ext>
+            </a:extLst>
+          </a:blip>
+          <a:stretch>
+            <a:fillRect/>
+          </a:stretch>
+        </p:blipFill>
+        <p:spPr>
+          <a:xfrm>
+            <a:off x="2259911" y="2056475"/>
+            <a:ext cx="476190" cy="409524"/>
+          </a:xfrm>
+          <a:prstGeom prst="rect">
+            <a:avLst/>
+          </a:prstGeom>
+          <a:ln w="6350">
+            <a:solidFill>
+              <a:schemeClr val="tx1"/>
+            </a:solidFill>
+          </a:ln>
+        </p:spPr>
+      </p:pic>
+      <p:cxnSp>
+        <p:nvCxnSpPr>
+          <p:cNvPr id="7" name="Straight Connector 6">
+            <a:extLst>
+              <a:ext uri="{FF2B5EF4-FFF2-40B4-BE49-F238E27FC236}">
+                <a16:creationId xmlns:a16="http://schemas.microsoft.com/office/drawing/2014/main" id="{17E1AA94-BF5E-C6EF-64B7-A36D9B3712AE}"/>
+              </a:ext>
+            </a:extLst>
+          </p:cNvPr>
+          <p:cNvCxnSpPr>
+            <a:cxnSpLocks/>
+          </p:cNvCxnSpPr>
+          <p:nvPr/>
+        </p:nvCxnSpPr>
+        <p:spPr>
+          <a:xfrm>
+            <a:off x="1521700" y="1519624"/>
+            <a:ext cx="696169" cy="0"/>
+          </a:xfrm>
+          <a:prstGeom prst="line">
+            <a:avLst/>
+          </a:prstGeom>
+        </p:spPr>
+        <p:style>
+          <a:lnRef idx="2">
+            <a:schemeClr val="accent1"/>
+          </a:lnRef>
+          <a:fillRef idx="0">
+            <a:schemeClr val="accent1"/>
+          </a:fillRef>
+          <a:effectRef idx="1">
+            <a:schemeClr val="accent1"/>
+          </a:effectRef>
+          <a:fontRef idx="minor">
+            <a:schemeClr val="tx1"/>
+          </a:fontRef>
+        </p:style>
+      </p:cxnSp>
+      <p:cxnSp>
+        <p:nvCxnSpPr>
+          <p:cNvPr id="11" name="Straight Connector 10">
+            <a:extLst>
+              <a:ext uri="{FF2B5EF4-FFF2-40B4-BE49-F238E27FC236}">
+                <a16:creationId xmlns:a16="http://schemas.microsoft.com/office/drawing/2014/main" id="{8BCF7221-8A13-38F7-A5A1-962B6786631E}"/>
+              </a:ext>
+            </a:extLst>
+          </p:cNvPr>
+          <p:cNvCxnSpPr>
+            <a:cxnSpLocks/>
+          </p:cNvCxnSpPr>
+          <p:nvPr/>
+        </p:nvCxnSpPr>
+        <p:spPr>
+          <a:xfrm>
+            <a:off x="1521699" y="2334176"/>
+            <a:ext cx="696169" cy="0"/>
+          </a:xfrm>
+          <a:prstGeom prst="line">
+            <a:avLst/>
+          </a:prstGeom>
+        </p:spPr>
+        <p:style>
+          <a:lnRef idx="2">
+            <a:schemeClr val="accent1"/>
+          </a:lnRef>
+          <a:fillRef idx="0">
+            <a:schemeClr val="accent1"/>
+          </a:fillRef>
+          <a:effectRef idx="1">
+            <a:schemeClr val="accent1"/>
+          </a:effectRef>
+          <a:fontRef idx="minor">
+            <a:schemeClr val="tx1"/>
+          </a:fontRef>
+        </p:style>
+      </p:cxnSp>
+      <p:sp>
+        <p:nvSpPr>
+          <p:cNvPr id="14" name="TextBox 13">
+            <a:extLst>
+              <a:ext uri="{FF2B5EF4-FFF2-40B4-BE49-F238E27FC236}">
+                <a16:creationId xmlns:a16="http://schemas.microsoft.com/office/drawing/2014/main" id="{0C45B73A-1FA5-FA89-B005-677F3C98C37C}"/>
+              </a:ext>
+            </a:extLst>
+          </p:cNvPr>
+          <p:cNvSpPr txBox="1"/>
+          <p:nvPr/>
+        </p:nvSpPr>
+        <p:spPr>
+          <a:xfrm>
+            <a:off x="352550" y="1326736"/>
+            <a:ext cx="1169149" cy="400110"/>
+          </a:xfrm>
+          <a:prstGeom prst="rect">
+            <a:avLst/>
+          </a:prstGeom>
+          <a:noFill/>
+        </p:spPr>
+        <p:txBody>
+          <a:bodyPr wrap="square" rtlCol="0">
+            <a:spAutoFit/>
+          </a:bodyPr>
+          <a:lstStyle/>
+          <a:p>
+            <a:r>
+              <a:rPr lang="en-US" sz="1000" b="1" dirty="0"/>
+              <a:t>Physical Sensor signal link to PT1</a:t>
+            </a:r>
+            <a:endParaRPr lang="en-SG" sz="1000" b="1" dirty="0"/>
+          </a:p>
+        </p:txBody>
+      </p:sp>
+      <p:sp>
+        <p:nvSpPr>
+          <p:cNvPr id="15" name="TextBox 14">
+            <a:extLst>
+              <a:ext uri="{FF2B5EF4-FFF2-40B4-BE49-F238E27FC236}">
+                <a16:creationId xmlns:a16="http://schemas.microsoft.com/office/drawing/2014/main" id="{0629A499-5278-135B-DAE0-23185E85ECEA}"/>
+              </a:ext>
+            </a:extLst>
+          </p:cNvPr>
+          <p:cNvSpPr txBox="1"/>
+          <p:nvPr/>
+        </p:nvSpPr>
+        <p:spPr>
+          <a:xfrm>
+            <a:off x="352550" y="2134121"/>
+            <a:ext cx="1169149" cy="400110"/>
+          </a:xfrm>
+          <a:prstGeom prst="rect">
+            <a:avLst/>
+          </a:prstGeom>
+          <a:noFill/>
+        </p:spPr>
+        <p:txBody>
+          <a:bodyPr wrap="square" rtlCol="0">
+            <a:spAutoFit/>
+          </a:bodyPr>
+          <a:lstStyle/>
+          <a:p>
+            <a:r>
+              <a:rPr lang="en-US" sz="1000" b="1" dirty="0"/>
+              <a:t>Physical Sensor signal link to PT2</a:t>
+            </a:r>
+            <a:endParaRPr lang="en-SG" sz="1000" b="1" dirty="0"/>
+          </a:p>
+        </p:txBody>
+      </p:sp>
+      <p:cxnSp>
+        <p:nvCxnSpPr>
+          <p:cNvPr id="16" name="Straight Connector 15">
+            <a:extLst>
+              <a:ext uri="{FF2B5EF4-FFF2-40B4-BE49-F238E27FC236}">
+                <a16:creationId xmlns:a16="http://schemas.microsoft.com/office/drawing/2014/main" id="{9A53902E-A04D-3B59-633B-0D3B853E2B01}"/>
+              </a:ext>
+            </a:extLst>
+          </p:cNvPr>
+          <p:cNvCxnSpPr>
+            <a:cxnSpLocks/>
+          </p:cNvCxnSpPr>
+          <p:nvPr/>
+        </p:nvCxnSpPr>
+        <p:spPr>
+          <a:xfrm>
+            <a:off x="2074994" y="917444"/>
+            <a:ext cx="0" cy="431103"/>
+          </a:xfrm>
+          <a:prstGeom prst="line">
+            <a:avLst/>
+          </a:prstGeom>
+        </p:spPr>
+        <p:style>
+          <a:lnRef idx="2">
+            <a:schemeClr val="accent1"/>
+          </a:lnRef>
+          <a:fillRef idx="0">
+            <a:schemeClr val="accent1"/>
+          </a:fillRef>
+          <a:effectRef idx="1">
+            <a:schemeClr val="accent1"/>
+          </a:effectRef>
+          <a:fontRef idx="minor">
+            <a:schemeClr val="tx1"/>
+          </a:fontRef>
+        </p:style>
+      </p:cxnSp>
+      <p:cxnSp>
+        <p:nvCxnSpPr>
+          <p:cNvPr id="18" name="Straight Connector 17">
+            <a:extLst>
+              <a:ext uri="{FF2B5EF4-FFF2-40B4-BE49-F238E27FC236}">
+                <a16:creationId xmlns:a16="http://schemas.microsoft.com/office/drawing/2014/main" id="{34817779-EC0A-1846-84B9-B5F7F8ABDF68}"/>
+              </a:ext>
+            </a:extLst>
+          </p:cNvPr>
+          <p:cNvCxnSpPr>
+            <a:cxnSpLocks/>
+          </p:cNvCxnSpPr>
+          <p:nvPr/>
+        </p:nvCxnSpPr>
+        <p:spPr>
+          <a:xfrm>
+            <a:off x="2074994" y="1348547"/>
+            <a:ext cx="142874" cy="0"/>
+          </a:xfrm>
+          <a:prstGeom prst="line">
+            <a:avLst/>
+          </a:prstGeom>
+        </p:spPr>
+        <p:style>
+          <a:lnRef idx="2">
+            <a:schemeClr val="accent1"/>
+          </a:lnRef>
+          <a:fillRef idx="0">
+            <a:schemeClr val="accent1"/>
+          </a:fillRef>
+          <a:effectRef idx="1">
+            <a:schemeClr val="accent1"/>
+          </a:effectRef>
+          <a:fontRef idx="minor">
+            <a:schemeClr val="tx1"/>
+          </a:fontRef>
+        </p:style>
+      </p:cxnSp>
+      <p:cxnSp>
+        <p:nvCxnSpPr>
+          <p:cNvPr id="22" name="Straight Connector 21">
+            <a:extLst>
+              <a:ext uri="{FF2B5EF4-FFF2-40B4-BE49-F238E27FC236}">
+                <a16:creationId xmlns:a16="http://schemas.microsoft.com/office/drawing/2014/main" id="{1B54ECE7-5CB8-F7E2-F7FC-3564A0C13B18}"/>
+              </a:ext>
+            </a:extLst>
+          </p:cNvPr>
+          <p:cNvCxnSpPr>
+            <a:cxnSpLocks/>
+          </p:cNvCxnSpPr>
+          <p:nvPr/>
+        </p:nvCxnSpPr>
+        <p:spPr>
+          <a:xfrm>
+            <a:off x="1693994" y="917443"/>
+            <a:ext cx="0" cy="1216678"/>
+          </a:xfrm>
+          <a:prstGeom prst="line">
+            <a:avLst/>
+          </a:prstGeom>
+        </p:spPr>
+        <p:style>
+          <a:lnRef idx="2">
+            <a:schemeClr val="accent1"/>
+          </a:lnRef>
+          <a:fillRef idx="0">
+            <a:schemeClr val="accent1"/>
+          </a:fillRef>
+          <a:effectRef idx="1">
+            <a:schemeClr val="accent1"/>
+          </a:effectRef>
+          <a:fontRef idx="minor">
+            <a:schemeClr val="tx1"/>
+          </a:fontRef>
+        </p:style>
+      </p:cxnSp>
+      <p:cxnSp>
+        <p:nvCxnSpPr>
+          <p:cNvPr id="23" name="Straight Connector 22">
+            <a:extLst>
+              <a:ext uri="{FF2B5EF4-FFF2-40B4-BE49-F238E27FC236}">
+                <a16:creationId xmlns:a16="http://schemas.microsoft.com/office/drawing/2014/main" id="{33F20152-23D6-FE0F-A00E-6B7A947A88C6}"/>
+              </a:ext>
+            </a:extLst>
+          </p:cNvPr>
+          <p:cNvCxnSpPr>
+            <a:cxnSpLocks/>
+          </p:cNvCxnSpPr>
+          <p:nvPr/>
+        </p:nvCxnSpPr>
+        <p:spPr>
+          <a:xfrm>
+            <a:off x="1693994" y="2134121"/>
+            <a:ext cx="523874" cy="0"/>
+          </a:xfrm>
+          <a:prstGeom prst="line">
+            <a:avLst/>
+          </a:prstGeom>
+        </p:spPr>
+        <p:style>
+          <a:lnRef idx="2">
+            <a:schemeClr val="accent1"/>
+          </a:lnRef>
+          <a:fillRef idx="0">
+            <a:schemeClr val="accent1"/>
+          </a:fillRef>
+          <a:effectRef idx="1">
+            <a:schemeClr val="accent1"/>
+          </a:effectRef>
+          <a:fontRef idx="minor">
+            <a:schemeClr val="tx1"/>
+          </a:fontRef>
+        </p:style>
+      </p:cxnSp>
+      <p:sp>
+        <p:nvSpPr>
+          <p:cNvPr id="26" name="TextBox 25">
+            <a:extLst>
+              <a:ext uri="{FF2B5EF4-FFF2-40B4-BE49-F238E27FC236}">
+                <a16:creationId xmlns:a16="http://schemas.microsoft.com/office/drawing/2014/main" id="{2D68B778-6198-361B-D075-210B347F48F7}"/>
+              </a:ext>
+            </a:extLst>
+          </p:cNvPr>
+          <p:cNvSpPr txBox="1"/>
+          <p:nvPr/>
+        </p:nvSpPr>
+        <p:spPr>
+          <a:xfrm>
+            <a:off x="1945651" y="517335"/>
+            <a:ext cx="790450" cy="400110"/>
+          </a:xfrm>
+          <a:prstGeom prst="rect">
+            <a:avLst/>
+          </a:prstGeom>
+          <a:noFill/>
+        </p:spPr>
+        <p:txBody>
+          <a:bodyPr wrap="square" rtlCol="0">
+            <a:spAutoFit/>
+          </a:bodyPr>
+          <a:lstStyle/>
+          <a:p>
+            <a:r>
+              <a:rPr lang="en-US" sz="1000" b="1" dirty="0"/>
+              <a:t>HMI Set Val to PT3</a:t>
+            </a:r>
+            <a:endParaRPr lang="en-SG" sz="1000" b="1" dirty="0"/>
+          </a:p>
+        </p:txBody>
+      </p:sp>
+      <p:sp>
+        <p:nvSpPr>
+          <p:cNvPr id="27" name="TextBox 26">
+            <a:extLst>
+              <a:ext uri="{FF2B5EF4-FFF2-40B4-BE49-F238E27FC236}">
+                <a16:creationId xmlns:a16="http://schemas.microsoft.com/office/drawing/2014/main" id="{8B0241FD-F538-4FDC-C866-E4A1FEC2C854}"/>
+              </a:ext>
+            </a:extLst>
+          </p:cNvPr>
+          <p:cNvSpPr txBox="1"/>
+          <p:nvPr/>
+        </p:nvSpPr>
+        <p:spPr>
+          <a:xfrm>
+            <a:off x="1165481" y="532831"/>
+            <a:ext cx="790450" cy="400110"/>
+          </a:xfrm>
+          <a:prstGeom prst="rect">
+            <a:avLst/>
+          </a:prstGeom>
+          <a:noFill/>
+        </p:spPr>
+        <p:txBody>
+          <a:bodyPr wrap="square" rtlCol="0">
+            <a:spAutoFit/>
+          </a:bodyPr>
+          <a:lstStyle/>
+          <a:p>
+            <a:r>
+              <a:rPr lang="en-US" sz="1000" b="1" dirty="0"/>
+              <a:t>HMI Set Val to PT4</a:t>
+            </a:r>
+            <a:endParaRPr lang="en-SG" sz="1000" b="1" dirty="0"/>
+          </a:p>
+        </p:txBody>
+      </p:sp>
+      <p:cxnSp>
+        <p:nvCxnSpPr>
+          <p:cNvPr id="28" name="Straight Connector 27">
+            <a:extLst>
+              <a:ext uri="{FF2B5EF4-FFF2-40B4-BE49-F238E27FC236}">
+                <a16:creationId xmlns:a16="http://schemas.microsoft.com/office/drawing/2014/main" id="{FC5345E2-8E6C-358A-51AB-5036FF8A2143}"/>
+              </a:ext>
+            </a:extLst>
+          </p:cNvPr>
+          <p:cNvCxnSpPr>
+            <a:cxnSpLocks/>
+          </p:cNvCxnSpPr>
+          <p:nvPr/>
+        </p:nvCxnSpPr>
+        <p:spPr>
+          <a:xfrm>
+            <a:off x="2736101" y="1455206"/>
+            <a:ext cx="696169" cy="0"/>
+          </a:xfrm>
+          <a:prstGeom prst="line">
+            <a:avLst/>
+          </a:prstGeom>
+        </p:spPr>
+        <p:style>
+          <a:lnRef idx="2">
+            <a:schemeClr val="accent1"/>
+          </a:lnRef>
+          <a:fillRef idx="0">
+            <a:schemeClr val="accent1"/>
+          </a:fillRef>
+          <a:effectRef idx="1">
+            <a:schemeClr val="accent1"/>
+          </a:effectRef>
+          <a:fontRef idx="minor">
+            <a:schemeClr val="tx1"/>
+          </a:fontRef>
+        </p:style>
+      </p:cxnSp>
+      <p:pic>
+        <p:nvPicPr>
+          <p:cNvPr id="29" name="Picture 28">
+            <a:extLst>
+              <a:ext uri="{FF2B5EF4-FFF2-40B4-BE49-F238E27FC236}">
+                <a16:creationId xmlns:a16="http://schemas.microsoft.com/office/drawing/2014/main" id="{FD4509EC-0768-959D-3D77-227BA4E90863}"/>
+              </a:ext>
+            </a:extLst>
+          </p:cNvPr>
+          <p:cNvPicPr>
+            <a:picLocks noChangeAspect="1"/>
+          </p:cNvPicPr>
+          <p:nvPr/>
+        </p:nvPicPr>
+        <p:blipFill>
+          <a:blip r:embed="rId2">
+            <a:extLst>
+              <a:ext uri="{28A0092B-C50C-407E-A947-70E740481C1C}">
+                <a14:useLocalDpi xmlns:a14="http://schemas.microsoft.com/office/drawing/2010/main" val="0"/>
+              </a:ext>
+            </a:extLst>
+          </a:blip>
+          <a:stretch>
+            <a:fillRect/>
+          </a:stretch>
+        </p:blipFill>
+        <p:spPr>
+          <a:xfrm>
+            <a:off x="3724275" y="1586369"/>
+            <a:ext cx="476190" cy="428571"/>
+          </a:xfrm>
+          <a:prstGeom prst="rect">
+            <a:avLst/>
+          </a:prstGeom>
+          <a:ln w="6350">
+            <a:solidFill>
+              <a:schemeClr val="tx1"/>
+            </a:solidFill>
+          </a:ln>
+        </p:spPr>
+      </p:pic>
+      <p:cxnSp>
+        <p:nvCxnSpPr>
+          <p:cNvPr id="30" name="Straight Connector 29">
+            <a:extLst>
+              <a:ext uri="{FF2B5EF4-FFF2-40B4-BE49-F238E27FC236}">
+                <a16:creationId xmlns:a16="http://schemas.microsoft.com/office/drawing/2014/main" id="{9CC07FB0-3A83-E36D-8932-DFC8AD31A2FF}"/>
+              </a:ext>
+            </a:extLst>
+          </p:cNvPr>
+          <p:cNvCxnSpPr>
+            <a:cxnSpLocks/>
+          </p:cNvCxnSpPr>
+          <p:nvPr/>
+        </p:nvCxnSpPr>
+        <p:spPr>
+          <a:xfrm>
+            <a:off x="2736101" y="2261237"/>
+            <a:ext cx="696169" cy="0"/>
+          </a:xfrm>
+          <a:prstGeom prst="line">
+            <a:avLst/>
+          </a:prstGeom>
+        </p:spPr>
+        <p:style>
+          <a:lnRef idx="2">
+            <a:schemeClr val="accent1"/>
+          </a:lnRef>
+          <a:fillRef idx="0">
+            <a:schemeClr val="accent1"/>
+          </a:fillRef>
+          <a:effectRef idx="1">
+            <a:schemeClr val="accent1"/>
+          </a:effectRef>
+          <a:fontRef idx="minor">
+            <a:schemeClr val="tx1"/>
+          </a:fontRef>
+        </p:style>
+      </p:cxnSp>
+      <p:cxnSp>
+        <p:nvCxnSpPr>
+          <p:cNvPr id="31" name="Straight Connector 30">
+            <a:extLst>
+              <a:ext uri="{FF2B5EF4-FFF2-40B4-BE49-F238E27FC236}">
+                <a16:creationId xmlns:a16="http://schemas.microsoft.com/office/drawing/2014/main" id="{67B55EF0-4BC8-0282-E50E-308746F6F6A3}"/>
+              </a:ext>
+            </a:extLst>
+          </p:cNvPr>
+          <p:cNvCxnSpPr>
+            <a:cxnSpLocks/>
+          </p:cNvCxnSpPr>
+          <p:nvPr/>
+        </p:nvCxnSpPr>
+        <p:spPr>
+          <a:xfrm>
+            <a:off x="3432270" y="1455206"/>
+            <a:ext cx="0" cy="224435"/>
+          </a:xfrm>
+          <a:prstGeom prst="line">
+            <a:avLst/>
+          </a:prstGeom>
+        </p:spPr>
+        <p:style>
+          <a:lnRef idx="2">
+            <a:schemeClr val="accent1"/>
+          </a:lnRef>
+          <a:fillRef idx="0">
+            <a:schemeClr val="accent1"/>
+          </a:fillRef>
+          <a:effectRef idx="1">
+            <a:schemeClr val="accent1"/>
+          </a:effectRef>
+          <a:fontRef idx="minor">
+            <a:schemeClr val="tx1"/>
+          </a:fontRef>
+        </p:style>
+      </p:cxnSp>
+      <p:cxnSp>
+        <p:nvCxnSpPr>
+          <p:cNvPr id="34" name="Straight Connector 33">
+            <a:extLst>
+              <a:ext uri="{FF2B5EF4-FFF2-40B4-BE49-F238E27FC236}">
+                <a16:creationId xmlns:a16="http://schemas.microsoft.com/office/drawing/2014/main" id="{4F7833C3-BE9D-3ABA-2C20-185709B3DD15}"/>
+              </a:ext>
+            </a:extLst>
+          </p:cNvPr>
+          <p:cNvCxnSpPr>
+            <a:cxnSpLocks/>
+          </p:cNvCxnSpPr>
+          <p:nvPr/>
+        </p:nvCxnSpPr>
+        <p:spPr>
+          <a:xfrm>
+            <a:off x="3423223" y="1689292"/>
+            <a:ext cx="292005" cy="5392"/>
+          </a:xfrm>
+          <a:prstGeom prst="line">
+            <a:avLst/>
+          </a:prstGeom>
+        </p:spPr>
+        <p:style>
+          <a:lnRef idx="2">
+            <a:schemeClr val="accent1"/>
+          </a:lnRef>
+          <a:fillRef idx="0">
+            <a:schemeClr val="accent1"/>
+          </a:fillRef>
+          <a:effectRef idx="1">
+            <a:schemeClr val="accent1"/>
+          </a:effectRef>
+          <a:fontRef idx="minor">
+            <a:schemeClr val="tx1"/>
+          </a:fontRef>
+        </p:style>
+      </p:cxnSp>
+      <p:cxnSp>
+        <p:nvCxnSpPr>
+          <p:cNvPr id="38" name="Straight Connector 37">
+            <a:extLst>
+              <a:ext uri="{FF2B5EF4-FFF2-40B4-BE49-F238E27FC236}">
+                <a16:creationId xmlns:a16="http://schemas.microsoft.com/office/drawing/2014/main" id="{C32BA773-9681-6581-56A4-017D8C33637C}"/>
+              </a:ext>
+            </a:extLst>
+          </p:cNvPr>
+          <p:cNvCxnSpPr>
+            <a:cxnSpLocks/>
+          </p:cNvCxnSpPr>
+          <p:nvPr/>
+        </p:nvCxnSpPr>
+        <p:spPr>
+          <a:xfrm>
+            <a:off x="3432270" y="1909632"/>
+            <a:ext cx="0" cy="371942"/>
+          </a:xfrm>
+          <a:prstGeom prst="line">
+            <a:avLst/>
+          </a:prstGeom>
+        </p:spPr>
+        <p:style>
+          <a:lnRef idx="2">
+            <a:schemeClr val="accent1"/>
+          </a:lnRef>
+          <a:fillRef idx="0">
+            <a:schemeClr val="accent1"/>
+          </a:fillRef>
+          <a:effectRef idx="1">
+            <a:schemeClr val="accent1"/>
+          </a:effectRef>
+          <a:fontRef idx="minor">
+            <a:schemeClr val="tx1"/>
+          </a:fontRef>
+        </p:style>
+      </p:cxnSp>
+      <p:cxnSp>
+        <p:nvCxnSpPr>
+          <p:cNvPr id="40" name="Straight Connector 39">
+            <a:extLst>
+              <a:ext uri="{FF2B5EF4-FFF2-40B4-BE49-F238E27FC236}">
+                <a16:creationId xmlns:a16="http://schemas.microsoft.com/office/drawing/2014/main" id="{74B8B6BB-2FC8-E3ED-BD8D-B71155E3441F}"/>
+              </a:ext>
+            </a:extLst>
+          </p:cNvPr>
+          <p:cNvCxnSpPr>
+            <a:cxnSpLocks/>
+          </p:cNvCxnSpPr>
+          <p:nvPr/>
+        </p:nvCxnSpPr>
+        <p:spPr>
+          <a:xfrm>
+            <a:off x="3423222" y="1906936"/>
+            <a:ext cx="292005" cy="5392"/>
+          </a:xfrm>
+          <a:prstGeom prst="line">
+            <a:avLst/>
+          </a:prstGeom>
+        </p:spPr>
+        <p:style>
+          <a:lnRef idx="2">
+            <a:schemeClr val="accent1"/>
+          </a:lnRef>
+          <a:fillRef idx="0">
+            <a:schemeClr val="accent1"/>
+          </a:fillRef>
+          <a:effectRef idx="1">
+            <a:schemeClr val="accent1"/>
+          </a:effectRef>
+          <a:fontRef idx="minor">
+            <a:schemeClr val="tx1"/>
+          </a:fontRef>
+        </p:style>
+      </p:cxnSp>
+      <p:cxnSp>
+        <p:nvCxnSpPr>
+          <p:cNvPr id="41" name="Straight Connector 40">
+            <a:extLst>
+              <a:ext uri="{FF2B5EF4-FFF2-40B4-BE49-F238E27FC236}">
+                <a16:creationId xmlns:a16="http://schemas.microsoft.com/office/drawing/2014/main" id="{DA9AD2EF-E604-4994-A6E4-A82B614E3D99}"/>
+              </a:ext>
+            </a:extLst>
+          </p:cNvPr>
+          <p:cNvCxnSpPr>
+            <a:cxnSpLocks/>
+          </p:cNvCxnSpPr>
+          <p:nvPr/>
+        </p:nvCxnSpPr>
+        <p:spPr>
+          <a:xfrm>
+            <a:off x="4209512" y="1816248"/>
+            <a:ext cx="292005" cy="5392"/>
+          </a:xfrm>
+          <a:prstGeom prst="line">
+            <a:avLst/>
+          </a:prstGeom>
+        </p:spPr>
+        <p:style>
+          <a:lnRef idx="2">
+            <a:schemeClr val="accent1"/>
+          </a:lnRef>
+          <a:fillRef idx="0">
+            <a:schemeClr val="accent1"/>
+          </a:fillRef>
+          <a:effectRef idx="1">
+            <a:schemeClr val="accent1"/>
+          </a:effectRef>
+          <a:fontRef idx="minor">
+            <a:schemeClr val="tx1"/>
+          </a:fontRef>
+        </p:style>
+      </p:cxnSp>
+      <p:sp>
+        <p:nvSpPr>
+          <p:cNvPr id="42" name="Rectangle 41">
+            <a:extLst>
+              <a:ext uri="{FF2B5EF4-FFF2-40B4-BE49-F238E27FC236}">
+                <a16:creationId xmlns:a16="http://schemas.microsoft.com/office/drawing/2014/main" id="{787EED31-52E4-7BC3-A4E6-B2A9C0AEC252}"/>
+              </a:ext>
+            </a:extLst>
+          </p:cNvPr>
+          <p:cNvSpPr/>
+          <p:nvPr/>
+        </p:nvSpPr>
+        <p:spPr>
+          <a:xfrm>
+            <a:off x="4411396" y="1390319"/>
+            <a:ext cx="1161785" cy="851857"/>
+          </a:xfrm>
+          <a:prstGeom prst="rect">
+            <a:avLst/>
+          </a:prstGeom>
+          <a:solidFill>
+            <a:schemeClr val="tx2">
+              <a:lumMod val="75000"/>
+              <a:lumOff val="25000"/>
+            </a:schemeClr>
+          </a:solidFill>
+          <a:ln>
+            <a:solidFill>
+              <a:schemeClr val="tx1"/>
+            </a:solidFill>
+          </a:ln>
+        </p:spPr>
+        <p:style>
+          <a:lnRef idx="2">
+            <a:schemeClr val="accent1">
+              <a:shade val="50000"/>
+            </a:schemeClr>
+          </a:lnRef>
+          <a:fillRef idx="1">
+            <a:schemeClr val="accent1"/>
+          </a:fillRef>
+          <a:effectRef idx="0">
+            <a:schemeClr val="accent1"/>
+          </a:effectRef>
+          <a:fontRef idx="minor">
+            <a:schemeClr val="lt1"/>
+          </a:fontRef>
+        </p:style>
+        <p:txBody>
+          <a:bodyPr rtlCol="0" anchor="ctr"/>
+          <a:lstStyle/>
+          <a:p>
+            <a:r>
+              <a:rPr lang="en-US" sz="1050" b="1" dirty="0"/>
+              <a:t>Condition value generator : </a:t>
+            </a:r>
+          </a:p>
+          <a:p>
+            <a:r>
+              <a:rPr lang="en-US" sz="1050" b="1" dirty="0"/>
+              <a:t>True -&gt; 1.01</a:t>
+            </a:r>
+          </a:p>
+          <a:p>
+            <a:r>
+              <a:rPr lang="en-US" sz="1050" b="1" dirty="0"/>
+              <a:t>False-&gt; 1.02</a:t>
+            </a:r>
+          </a:p>
+        </p:txBody>
+      </p:sp>
+      <p:cxnSp>
+        <p:nvCxnSpPr>
+          <p:cNvPr id="43" name="Straight Connector 42">
+            <a:extLst>
+              <a:ext uri="{FF2B5EF4-FFF2-40B4-BE49-F238E27FC236}">
+                <a16:creationId xmlns:a16="http://schemas.microsoft.com/office/drawing/2014/main" id="{B88B71CC-D6BD-656A-E7FE-FD4AC1F16DFC}"/>
+              </a:ext>
+            </a:extLst>
+          </p:cNvPr>
+          <p:cNvCxnSpPr>
+            <a:cxnSpLocks/>
+          </p:cNvCxnSpPr>
+          <p:nvPr/>
+        </p:nvCxnSpPr>
+        <p:spPr>
+          <a:xfrm>
+            <a:off x="5583755" y="1795262"/>
+            <a:ext cx="292005" cy="5392"/>
+          </a:xfrm>
+          <a:prstGeom prst="line">
+            <a:avLst/>
+          </a:prstGeom>
+        </p:spPr>
+        <p:style>
+          <a:lnRef idx="2">
+            <a:schemeClr val="accent1"/>
+          </a:lnRef>
+          <a:fillRef idx="0">
+            <a:schemeClr val="accent1"/>
+          </a:fillRef>
+          <a:effectRef idx="1">
+            <a:schemeClr val="accent1"/>
+          </a:effectRef>
+          <a:fontRef idx="minor">
+            <a:schemeClr val="tx1"/>
+          </a:fontRef>
+        </p:style>
+      </p:cxnSp>
+      <p:sp>
+        <p:nvSpPr>
+          <p:cNvPr id="44" name="TextBox 43">
+            <a:extLst>
+              <a:ext uri="{FF2B5EF4-FFF2-40B4-BE49-F238E27FC236}">
+                <a16:creationId xmlns:a16="http://schemas.microsoft.com/office/drawing/2014/main" id="{7084E172-827B-4624-6EFD-7B6298491417}"/>
+              </a:ext>
+            </a:extLst>
+          </p:cNvPr>
+          <p:cNvSpPr txBox="1"/>
+          <p:nvPr/>
+        </p:nvSpPr>
+        <p:spPr>
+          <a:xfrm>
+            <a:off x="5828371" y="1689292"/>
+            <a:ext cx="790450" cy="246221"/>
+          </a:xfrm>
+          <a:prstGeom prst="rect">
+            <a:avLst/>
+          </a:prstGeom>
+          <a:noFill/>
+        </p:spPr>
+        <p:txBody>
+          <a:bodyPr wrap="square" rtlCol="0">
+            <a:spAutoFit/>
+          </a:bodyPr>
+          <a:lstStyle/>
+          <a:p>
+            <a:r>
+              <a:rPr lang="en-US" sz="1000" b="1" dirty="0"/>
+              <a:t>Val to PT5</a:t>
+            </a:r>
+            <a:endParaRPr lang="en-SG" sz="1000" b="1" dirty="0"/>
+          </a:p>
+        </p:txBody>
+      </p:sp>
+      <p:pic>
+        <p:nvPicPr>
+          <p:cNvPr id="45" name="Picture 44">
+            <a:extLst>
+              <a:ext uri="{FF2B5EF4-FFF2-40B4-BE49-F238E27FC236}">
+                <a16:creationId xmlns:a16="http://schemas.microsoft.com/office/drawing/2014/main" id="{B26114E2-89DF-FCEB-E353-0820C657F505}"/>
+              </a:ext>
+            </a:extLst>
+          </p:cNvPr>
+          <p:cNvPicPr>
+            <a:picLocks noChangeAspect="1"/>
+          </p:cNvPicPr>
+          <p:nvPr/>
+        </p:nvPicPr>
+        <p:blipFill>
+          <a:blip r:embed="rId4">
+            <a:extLst>
+              <a:ext uri="{28A0092B-C50C-407E-A947-70E740481C1C}">
+                <a14:useLocalDpi xmlns:a14="http://schemas.microsoft.com/office/drawing/2010/main" val="0"/>
+              </a:ext>
+            </a:extLst>
+          </a:blip>
+          <a:stretch>
+            <a:fillRect/>
+          </a:stretch>
+        </p:blipFill>
+        <p:spPr>
+          <a:xfrm>
+            <a:off x="2480856" y="3682809"/>
+            <a:ext cx="506017" cy="400107"/>
+          </a:xfrm>
+          <a:prstGeom prst="rect">
+            <a:avLst/>
+          </a:prstGeom>
+        </p:spPr>
+      </p:pic>
+      <p:pic>
+        <p:nvPicPr>
+          <p:cNvPr id="46" name="Picture 45">
+            <a:extLst>
+              <a:ext uri="{FF2B5EF4-FFF2-40B4-BE49-F238E27FC236}">
+                <a16:creationId xmlns:a16="http://schemas.microsoft.com/office/drawing/2014/main" id="{17595D03-5C88-54AB-DA51-6D667C433F23}"/>
+              </a:ext>
+            </a:extLst>
+          </p:cNvPr>
+          <p:cNvPicPr>
+            <a:picLocks noChangeAspect="1"/>
+          </p:cNvPicPr>
+          <p:nvPr/>
+        </p:nvPicPr>
+        <p:blipFill>
+          <a:blip r:embed="rId4">
+            <a:extLst>
+              <a:ext uri="{28A0092B-C50C-407E-A947-70E740481C1C}">
+                <a14:useLocalDpi xmlns:a14="http://schemas.microsoft.com/office/drawing/2010/main" val="0"/>
+              </a:ext>
+            </a:extLst>
+          </a:blip>
+          <a:stretch>
+            <a:fillRect/>
+          </a:stretch>
+        </p:blipFill>
+        <p:spPr>
+          <a:xfrm>
+            <a:off x="3533244" y="3682809"/>
+            <a:ext cx="506017" cy="400107"/>
+          </a:xfrm>
+          <a:prstGeom prst="rect">
+            <a:avLst/>
+          </a:prstGeom>
+        </p:spPr>
+      </p:pic>
+      <p:cxnSp>
+        <p:nvCxnSpPr>
+          <p:cNvPr id="48" name="Straight Connector 47">
+            <a:extLst>
+              <a:ext uri="{FF2B5EF4-FFF2-40B4-BE49-F238E27FC236}">
+                <a16:creationId xmlns:a16="http://schemas.microsoft.com/office/drawing/2014/main" id="{7EFB06C9-EAF7-44D8-5051-8BFF8181875F}"/>
+              </a:ext>
+            </a:extLst>
+          </p:cNvPr>
+          <p:cNvCxnSpPr>
+            <a:cxnSpLocks/>
+          </p:cNvCxnSpPr>
+          <p:nvPr/>
+        </p:nvCxnSpPr>
+        <p:spPr>
+          <a:xfrm>
+            <a:off x="2986873" y="3873338"/>
+            <a:ext cx="546371" cy="0"/>
+          </a:xfrm>
+          <a:prstGeom prst="line">
+            <a:avLst/>
+          </a:prstGeom>
+        </p:spPr>
+        <p:style>
+          <a:lnRef idx="2">
+            <a:schemeClr val="dk1"/>
+          </a:lnRef>
+          <a:fillRef idx="0">
+            <a:schemeClr val="dk1"/>
+          </a:fillRef>
+          <a:effectRef idx="1">
+            <a:schemeClr val="dk1"/>
+          </a:effectRef>
+          <a:fontRef idx="minor">
+            <a:schemeClr val="tx1"/>
+          </a:fontRef>
+        </p:style>
+      </p:cxnSp>
+      <p:pic>
+        <p:nvPicPr>
+          <p:cNvPr id="49" name="Picture 48">
+            <a:extLst>
+              <a:ext uri="{FF2B5EF4-FFF2-40B4-BE49-F238E27FC236}">
+                <a16:creationId xmlns:a16="http://schemas.microsoft.com/office/drawing/2014/main" id="{EF074984-B882-03C8-DDEB-470BC21E829E}"/>
+              </a:ext>
+            </a:extLst>
+          </p:cNvPr>
+          <p:cNvPicPr>
+            <a:picLocks noChangeAspect="1"/>
+          </p:cNvPicPr>
+          <p:nvPr/>
+        </p:nvPicPr>
+        <p:blipFill>
+          <a:blip r:embed="rId4">
+            <a:extLst>
+              <a:ext uri="{28A0092B-C50C-407E-A947-70E740481C1C}">
+                <a14:useLocalDpi xmlns:a14="http://schemas.microsoft.com/office/drawing/2010/main" val="0"/>
+              </a:ext>
+            </a:extLst>
+          </a:blip>
+          <a:stretch>
+            <a:fillRect/>
+          </a:stretch>
+        </p:blipFill>
+        <p:spPr>
+          <a:xfrm>
+            <a:off x="909832" y="3692335"/>
+            <a:ext cx="506017" cy="400107"/>
+          </a:xfrm>
+          <a:prstGeom prst="rect">
+            <a:avLst/>
+          </a:prstGeom>
+        </p:spPr>
+      </p:pic>
+      <p:cxnSp>
+        <p:nvCxnSpPr>
+          <p:cNvPr id="50" name="Straight Connector 49">
+            <a:extLst>
+              <a:ext uri="{FF2B5EF4-FFF2-40B4-BE49-F238E27FC236}">
+                <a16:creationId xmlns:a16="http://schemas.microsoft.com/office/drawing/2014/main" id="{6318159D-87CC-187C-4997-A4256A4B74BC}"/>
+              </a:ext>
+            </a:extLst>
+          </p:cNvPr>
+          <p:cNvCxnSpPr>
+            <a:cxnSpLocks/>
+          </p:cNvCxnSpPr>
+          <p:nvPr/>
+        </p:nvCxnSpPr>
+        <p:spPr>
+          <a:xfrm>
+            <a:off x="1417102" y="3882863"/>
+            <a:ext cx="1077657" cy="0"/>
+          </a:xfrm>
+          <a:prstGeom prst="line">
+            <a:avLst/>
+          </a:prstGeom>
+        </p:spPr>
+        <p:style>
+          <a:lnRef idx="2">
+            <a:schemeClr val="dk1"/>
+          </a:lnRef>
+          <a:fillRef idx="0">
+            <a:schemeClr val="dk1"/>
+          </a:fillRef>
+          <a:effectRef idx="1">
+            <a:schemeClr val="dk1"/>
+          </a:effectRef>
+          <a:fontRef idx="minor">
+            <a:schemeClr val="tx1"/>
+          </a:fontRef>
+        </p:style>
+      </p:cxnSp>
+      <p:pic>
+        <p:nvPicPr>
+          <p:cNvPr id="52" name="Picture 51">
+            <a:extLst>
+              <a:ext uri="{FF2B5EF4-FFF2-40B4-BE49-F238E27FC236}">
+                <a16:creationId xmlns:a16="http://schemas.microsoft.com/office/drawing/2014/main" id="{F1B4E9CF-8B8D-B3EC-5A7F-124C7CC65B47}"/>
+              </a:ext>
+            </a:extLst>
+          </p:cNvPr>
+          <p:cNvPicPr>
+            <a:picLocks noChangeAspect="1"/>
+          </p:cNvPicPr>
+          <p:nvPr/>
+        </p:nvPicPr>
+        <p:blipFill>
+          <a:blip r:embed="rId4">
+            <a:extLst>
+              <a:ext uri="{28A0092B-C50C-407E-A947-70E740481C1C}">
+                <a14:useLocalDpi xmlns:a14="http://schemas.microsoft.com/office/drawing/2010/main" val="0"/>
+              </a:ext>
+            </a:extLst>
+          </a:blip>
+          <a:stretch>
+            <a:fillRect/>
+          </a:stretch>
+        </p:blipFill>
+        <p:spPr>
+          <a:xfrm>
+            <a:off x="908438" y="4350563"/>
+            <a:ext cx="506017" cy="400107"/>
+          </a:xfrm>
+          <a:prstGeom prst="rect">
+            <a:avLst/>
+          </a:prstGeom>
+        </p:spPr>
+      </p:pic>
+      <p:cxnSp>
+        <p:nvCxnSpPr>
+          <p:cNvPr id="54" name="Connector: Elbow 53">
+            <a:extLst>
+              <a:ext uri="{FF2B5EF4-FFF2-40B4-BE49-F238E27FC236}">
+                <a16:creationId xmlns:a16="http://schemas.microsoft.com/office/drawing/2014/main" id="{7E4E344B-C51D-ADEA-D1B2-57458699E8D7}"/>
+              </a:ext>
+            </a:extLst>
+          </p:cNvPr>
+          <p:cNvCxnSpPr>
+            <a:stCxn id="52" idx="3"/>
+          </p:cNvCxnSpPr>
+          <p:nvPr/>
+        </p:nvCxnSpPr>
+        <p:spPr>
+          <a:xfrm flipV="1">
+            <a:off x="1414455" y="3882863"/>
+            <a:ext cx="574287" cy="667754"/>
+          </a:xfrm>
+          <a:prstGeom prst="bentConnector2">
+            <a:avLst/>
+          </a:prstGeom>
+        </p:spPr>
+        <p:style>
+          <a:lnRef idx="2">
+            <a:schemeClr val="dk1"/>
+          </a:lnRef>
+          <a:fillRef idx="0">
+            <a:schemeClr val="dk1"/>
+          </a:fillRef>
+          <a:effectRef idx="1">
+            <a:schemeClr val="dk1"/>
+          </a:effectRef>
+          <a:fontRef idx="minor">
+            <a:schemeClr val="tx1"/>
+          </a:fontRef>
+        </p:style>
+      </p:cxnSp>
+      <p:cxnSp>
+        <p:nvCxnSpPr>
+          <p:cNvPr id="56" name="Straight Connector 55">
+            <a:extLst>
+              <a:ext uri="{FF2B5EF4-FFF2-40B4-BE49-F238E27FC236}">
+                <a16:creationId xmlns:a16="http://schemas.microsoft.com/office/drawing/2014/main" id="{2EE63ABC-F220-928A-7340-1B32D07A9F22}"/>
+              </a:ext>
+            </a:extLst>
+          </p:cNvPr>
+          <p:cNvCxnSpPr>
+            <a:cxnSpLocks/>
+          </p:cNvCxnSpPr>
+          <p:nvPr/>
+        </p:nvCxnSpPr>
+        <p:spPr>
+          <a:xfrm>
+            <a:off x="4007429" y="3873338"/>
+            <a:ext cx="696169" cy="0"/>
+          </a:xfrm>
+          <a:prstGeom prst="line">
+            <a:avLst/>
+          </a:prstGeom>
+        </p:spPr>
+        <p:style>
+          <a:lnRef idx="2">
+            <a:schemeClr val="accent1"/>
+          </a:lnRef>
+          <a:fillRef idx="0">
+            <a:schemeClr val="accent1"/>
+          </a:fillRef>
+          <a:effectRef idx="1">
+            <a:schemeClr val="accent1"/>
+          </a:effectRef>
+          <a:fontRef idx="minor">
+            <a:schemeClr val="tx1"/>
+          </a:fontRef>
+        </p:style>
+      </p:cxnSp>
+      <p:sp>
+        <p:nvSpPr>
+          <p:cNvPr id="55" name="Rectangle 54">
+            <a:extLst>
+              <a:ext uri="{FF2B5EF4-FFF2-40B4-BE49-F238E27FC236}">
+                <a16:creationId xmlns:a16="http://schemas.microsoft.com/office/drawing/2014/main" id="{43BA59A3-76C5-A00D-1BF4-95B0D886CA07}"/>
+              </a:ext>
+            </a:extLst>
+          </p:cNvPr>
+          <p:cNvSpPr/>
+          <p:nvPr/>
+        </p:nvSpPr>
+        <p:spPr>
+          <a:xfrm>
+            <a:off x="4601099" y="3656987"/>
+            <a:ext cx="1056751" cy="851857"/>
+          </a:xfrm>
+          <a:prstGeom prst="rect">
+            <a:avLst/>
+          </a:prstGeom>
+          <a:solidFill>
+            <a:schemeClr val="bg1"/>
+          </a:solidFill>
+          <a:ln>
+            <a:solidFill>
+              <a:schemeClr val="tx1"/>
+            </a:solidFill>
+          </a:ln>
+        </p:spPr>
+        <p:style>
+          <a:lnRef idx="2">
+            <a:schemeClr val="accent1">
+              <a:shade val="50000"/>
+            </a:schemeClr>
+          </a:lnRef>
+          <a:fillRef idx="1">
+            <a:schemeClr val="accent1"/>
+          </a:fillRef>
+          <a:effectRef idx="0">
+            <a:schemeClr val="accent1"/>
+          </a:effectRef>
+          <a:fontRef idx="minor">
+            <a:schemeClr val="lt1"/>
+          </a:fontRef>
+        </p:style>
+        <p:txBody>
+          <a:bodyPr rtlCol="0" anchor="ctr"/>
+          <a:lstStyle/>
+          <a:p>
+            <a:r>
+              <a:rPr lang="en-US" sz="1050" b="1" dirty="0">
+                <a:solidFill>
+                  <a:schemeClr val="tx1"/>
+                </a:solidFill>
+              </a:rPr>
+              <a:t>IF IN_STATA:</a:t>
+            </a:r>
+          </a:p>
+          <a:p>
+            <a:r>
+              <a:rPr lang="en-US" sz="1050" b="1" dirty="0">
+                <a:solidFill>
+                  <a:schemeClr val="tx1"/>
+                </a:solidFill>
+              </a:rPr>
+              <a:t>  OUT =  1.01</a:t>
+            </a:r>
+          </a:p>
+          <a:p>
+            <a:r>
+              <a:rPr lang="en-US" sz="1050" b="1" dirty="0">
+                <a:solidFill>
+                  <a:schemeClr val="tx1"/>
+                </a:solidFill>
+              </a:rPr>
+              <a:t>ELSE</a:t>
+            </a:r>
+          </a:p>
+          <a:p>
+            <a:r>
+              <a:rPr lang="en-US" sz="1050" b="1" dirty="0">
+                <a:solidFill>
+                  <a:schemeClr val="tx1"/>
+                </a:solidFill>
+              </a:rPr>
+              <a:t>  OUT  = 1.02</a:t>
+            </a:r>
+          </a:p>
+          <a:p>
+            <a:r>
+              <a:rPr lang="en-US" sz="1050" b="1" dirty="0">
+                <a:solidFill>
+                  <a:schemeClr val="tx1"/>
+                </a:solidFill>
+              </a:rPr>
+              <a:t>END IF </a:t>
+            </a:r>
+          </a:p>
+        </p:txBody>
+      </p:sp>
+      <p:cxnSp>
+        <p:nvCxnSpPr>
+          <p:cNvPr id="58" name="Straight Connector 57">
+            <a:extLst>
+              <a:ext uri="{FF2B5EF4-FFF2-40B4-BE49-F238E27FC236}">
+                <a16:creationId xmlns:a16="http://schemas.microsoft.com/office/drawing/2014/main" id="{BD9C6E96-2E1A-83E6-57AE-D8121CDB345F}"/>
+              </a:ext>
+            </a:extLst>
+          </p:cNvPr>
+          <p:cNvCxnSpPr>
+            <a:cxnSpLocks/>
+          </p:cNvCxnSpPr>
+          <p:nvPr/>
+        </p:nvCxnSpPr>
+        <p:spPr>
+          <a:xfrm>
+            <a:off x="5682368" y="3867946"/>
+            <a:ext cx="318382" cy="0"/>
+          </a:xfrm>
+          <a:prstGeom prst="line">
+            <a:avLst/>
+          </a:prstGeom>
+        </p:spPr>
+        <p:style>
+          <a:lnRef idx="2">
+            <a:schemeClr val="accent1"/>
+          </a:lnRef>
+          <a:fillRef idx="0">
+            <a:schemeClr val="accent1"/>
+          </a:fillRef>
+          <a:effectRef idx="1">
+            <a:schemeClr val="accent1"/>
+          </a:effectRef>
+          <a:fontRef idx="minor">
+            <a:schemeClr val="tx1"/>
+          </a:fontRef>
+        </p:style>
+      </p:cxnSp>
+      <p:sp>
+        <p:nvSpPr>
+          <p:cNvPr id="63" name="Rectangle 62">
+            <a:extLst>
+              <a:ext uri="{FF2B5EF4-FFF2-40B4-BE49-F238E27FC236}">
+                <a16:creationId xmlns:a16="http://schemas.microsoft.com/office/drawing/2014/main" id="{9A2D6FA0-C812-BE26-75CD-AB5C167CD4DA}"/>
+              </a:ext>
+            </a:extLst>
+          </p:cNvPr>
+          <p:cNvSpPr/>
+          <p:nvPr/>
+        </p:nvSpPr>
+        <p:spPr>
+          <a:xfrm>
+            <a:off x="6025268" y="3744835"/>
+            <a:ext cx="790451" cy="246221"/>
+          </a:xfrm>
+          <a:prstGeom prst="rect">
+            <a:avLst/>
+          </a:prstGeom>
+          <a:solidFill>
+            <a:schemeClr val="bg1"/>
+          </a:solidFill>
+          <a:ln>
+            <a:solidFill>
+              <a:schemeClr val="tx1"/>
+            </a:solidFill>
+          </a:ln>
+        </p:spPr>
+        <p:style>
+          <a:lnRef idx="2">
+            <a:schemeClr val="accent1">
+              <a:shade val="50000"/>
+            </a:schemeClr>
+          </a:lnRef>
+          <a:fillRef idx="1">
+            <a:schemeClr val="accent1"/>
+          </a:fillRef>
+          <a:effectRef idx="0">
+            <a:schemeClr val="accent1"/>
+          </a:effectRef>
+          <a:fontRef idx="minor">
+            <a:schemeClr val="lt1"/>
+          </a:fontRef>
+        </p:style>
+        <p:txBody>
+          <a:bodyPr rtlCol="0" anchor="ctr"/>
+          <a:lstStyle/>
+          <a:p>
+            <a:r>
+              <a:rPr lang="en-US" sz="1050" b="1" dirty="0">
+                <a:solidFill>
+                  <a:schemeClr val="tx1"/>
+                </a:solidFill>
+              </a:rPr>
+              <a:t>Address</a:t>
+            </a:r>
+          </a:p>
+        </p:txBody>
+      </p:sp>
+      <p:sp>
+        <p:nvSpPr>
+          <p:cNvPr id="64" name="TextBox 63">
+            <a:extLst>
+              <a:ext uri="{FF2B5EF4-FFF2-40B4-BE49-F238E27FC236}">
+                <a16:creationId xmlns:a16="http://schemas.microsoft.com/office/drawing/2014/main" id="{BF344703-DFB7-1E8E-4CF8-D8B5F2FFEDA2}"/>
+              </a:ext>
+            </a:extLst>
+          </p:cNvPr>
+          <p:cNvSpPr txBox="1"/>
+          <p:nvPr/>
+        </p:nvSpPr>
+        <p:spPr>
+          <a:xfrm>
+            <a:off x="731205" y="3455997"/>
+            <a:ext cx="1159879" cy="276999"/>
+          </a:xfrm>
+          <a:prstGeom prst="rect">
+            <a:avLst/>
+          </a:prstGeom>
+          <a:noFill/>
+        </p:spPr>
+        <p:txBody>
+          <a:bodyPr wrap="square" rtlCol="0">
+            <a:spAutoFit/>
+          </a:bodyPr>
+          <a:lstStyle/>
+          <a:p>
+            <a:r>
+              <a:rPr lang="en-US" sz="1200" b="1" dirty="0"/>
+              <a:t>%M = 000002</a:t>
+            </a:r>
+            <a:endParaRPr lang="en-SG" sz="1200" b="1" dirty="0"/>
+          </a:p>
+        </p:txBody>
+      </p:sp>
+      <p:sp>
+        <p:nvSpPr>
+          <p:cNvPr id="65" name="TextBox 64">
+            <a:extLst>
+              <a:ext uri="{FF2B5EF4-FFF2-40B4-BE49-F238E27FC236}">
+                <a16:creationId xmlns:a16="http://schemas.microsoft.com/office/drawing/2014/main" id="{74DD2FD4-603A-8A83-8392-0AECC08189A7}"/>
+              </a:ext>
+            </a:extLst>
+          </p:cNvPr>
+          <p:cNvSpPr txBox="1"/>
+          <p:nvPr/>
+        </p:nvSpPr>
+        <p:spPr>
+          <a:xfrm>
+            <a:off x="764448" y="4140985"/>
+            <a:ext cx="1159879" cy="276999"/>
+          </a:xfrm>
+          <a:prstGeom prst="rect">
+            <a:avLst/>
+          </a:prstGeom>
+          <a:noFill/>
+        </p:spPr>
+        <p:txBody>
+          <a:bodyPr wrap="square" rtlCol="0">
+            <a:spAutoFit/>
+          </a:bodyPr>
+          <a:lstStyle/>
+          <a:p>
+            <a:r>
+              <a:rPr lang="en-US" sz="1200" b="1" dirty="0"/>
+              <a:t>%M = 000004</a:t>
+            </a:r>
+            <a:endParaRPr lang="en-SG" sz="1200" b="1" dirty="0"/>
+          </a:p>
+        </p:txBody>
+      </p:sp>
+      <p:sp>
+        <p:nvSpPr>
+          <p:cNvPr id="66" name="TextBox 65">
+            <a:extLst>
+              <a:ext uri="{FF2B5EF4-FFF2-40B4-BE49-F238E27FC236}">
+                <a16:creationId xmlns:a16="http://schemas.microsoft.com/office/drawing/2014/main" id="{C610D34F-D15E-EC9D-CB40-7F4F81786691}"/>
+              </a:ext>
+            </a:extLst>
+          </p:cNvPr>
+          <p:cNvSpPr txBox="1"/>
+          <p:nvPr/>
+        </p:nvSpPr>
+        <p:spPr>
+          <a:xfrm>
+            <a:off x="2165182" y="3416217"/>
+            <a:ext cx="1159879" cy="276999"/>
+          </a:xfrm>
+          <a:prstGeom prst="rect">
+            <a:avLst/>
+          </a:prstGeom>
+          <a:noFill/>
+        </p:spPr>
+        <p:txBody>
+          <a:bodyPr wrap="square" rtlCol="0">
+            <a:spAutoFit/>
+          </a:bodyPr>
+          <a:lstStyle/>
+          <a:p>
+            <a:r>
+              <a:rPr lang="en-US" sz="1200" b="1" dirty="0"/>
+              <a:t>%M = 000001</a:t>
+            </a:r>
+            <a:endParaRPr lang="en-SG" sz="1200" b="1" dirty="0"/>
+          </a:p>
+        </p:txBody>
+      </p:sp>
+      <p:sp>
+        <p:nvSpPr>
+          <p:cNvPr id="67" name="TextBox 66">
+            <a:extLst>
+              <a:ext uri="{FF2B5EF4-FFF2-40B4-BE49-F238E27FC236}">
+                <a16:creationId xmlns:a16="http://schemas.microsoft.com/office/drawing/2014/main" id="{37C8D56D-2DCE-2A19-3C30-079801C3F768}"/>
+              </a:ext>
+            </a:extLst>
+          </p:cNvPr>
+          <p:cNvSpPr txBox="1"/>
+          <p:nvPr/>
+        </p:nvSpPr>
+        <p:spPr>
+          <a:xfrm>
+            <a:off x="3302547" y="3425169"/>
+            <a:ext cx="1159879" cy="276999"/>
+          </a:xfrm>
+          <a:prstGeom prst="rect">
+            <a:avLst/>
+          </a:prstGeom>
+          <a:noFill/>
+        </p:spPr>
+        <p:txBody>
+          <a:bodyPr wrap="square" rtlCol="0">
+            <a:spAutoFit/>
+          </a:bodyPr>
+          <a:lstStyle/>
+          <a:p>
+            <a:r>
+              <a:rPr lang="en-US" sz="1200" b="1" dirty="0"/>
+              <a:t>%M = 000003</a:t>
+            </a:r>
+            <a:endParaRPr lang="en-SG" sz="1200" b="1" dirty="0"/>
+          </a:p>
+        </p:txBody>
+      </p:sp>
+      <p:sp>
+        <p:nvSpPr>
+          <p:cNvPr id="68" name="TextBox 67">
+            <a:extLst>
+              <a:ext uri="{FF2B5EF4-FFF2-40B4-BE49-F238E27FC236}">
+                <a16:creationId xmlns:a16="http://schemas.microsoft.com/office/drawing/2014/main" id="{94482AE2-44F9-5775-AF9E-D9BFB7637FFF}"/>
+              </a:ext>
+            </a:extLst>
+          </p:cNvPr>
+          <p:cNvSpPr txBox="1"/>
+          <p:nvPr/>
+        </p:nvSpPr>
+        <p:spPr>
+          <a:xfrm>
+            <a:off x="5844793" y="3428740"/>
+            <a:ext cx="1159879" cy="276999"/>
+          </a:xfrm>
+          <a:prstGeom prst="rect">
+            <a:avLst/>
+          </a:prstGeom>
+          <a:noFill/>
+        </p:spPr>
+        <p:txBody>
+          <a:bodyPr wrap="square" rtlCol="0">
+            <a:spAutoFit/>
+          </a:bodyPr>
+          <a:lstStyle/>
+          <a:p>
+            <a:r>
+              <a:rPr lang="en-US" sz="1200" b="1" dirty="0"/>
+              <a:t>%M = 000005</a:t>
+            </a:r>
+            <a:endParaRPr lang="en-SG" sz="1200" b="1" dirty="0"/>
+          </a:p>
+        </p:txBody>
+      </p:sp>
+    </p:spTree>
+    <p:extLst>
+      <p:ext uri="{BB962C8B-B14F-4D97-AF65-F5344CB8AC3E}">
+        <p14:creationId xmlns:p14="http://schemas.microsoft.com/office/powerpoint/2010/main" val="2638083767"/>
       </p:ext>
     </p:extLst>
   </p:cSld>
@@ -27745,7 +29356,7 @@
         </p:nvSpPr>
         <p:spPr>
           <a:xfrm>
-            <a:off x="4465657" y="1197864"/>
+            <a:off x="4599007" y="1502664"/>
             <a:ext cx="3764376" cy="4669465"/>
           </a:xfrm>
           <a:prstGeom prst="rect">
@@ -27799,7 +29410,7 @@
         </p:nvCxnSpPr>
         <p:spPr>
           <a:xfrm>
-            <a:off x="4107287" y="766748"/>
+            <a:off x="4240637" y="1071548"/>
             <a:ext cx="0" cy="5378020"/>
           </a:xfrm>
           <a:prstGeom prst="line">
@@ -27843,7 +29454,7 @@
         </p:nvSpPr>
         <p:spPr>
           <a:xfrm>
-            <a:off x="336697" y="1197864"/>
+            <a:off x="470047" y="1502664"/>
             <a:ext cx="3476351" cy="4669465"/>
           </a:xfrm>
           <a:prstGeom prst="rect">
@@ -27909,7 +29520,7 @@
         </p:blipFill>
         <p:spPr>
           <a:xfrm>
-            <a:off x="466155" y="1505641"/>
+            <a:off x="599505" y="1810441"/>
             <a:ext cx="3290555" cy="1863919"/>
           </a:xfrm>
           <a:prstGeom prst="rect">
@@ -27936,7 +29547,7 @@
         </p:nvSpPr>
         <p:spPr>
           <a:xfrm>
-            <a:off x="275408" y="754486"/>
+            <a:off x="408758" y="1059286"/>
             <a:ext cx="3211175" cy="307777"/>
           </a:xfrm>
           <a:prstGeom prst="rect">
@@ -27972,7 +29583,7 @@
         </p:nvSpPr>
         <p:spPr>
           <a:xfrm>
-            <a:off x="3459417" y="3767331"/>
+            <a:off x="3592767" y="4072131"/>
             <a:ext cx="1478344" cy="429658"/>
           </a:xfrm>
           <a:prstGeom prst="rect">
@@ -28024,7 +29635,7 @@
         </p:nvSpPr>
         <p:spPr>
           <a:xfrm>
-            <a:off x="336697" y="1225291"/>
+            <a:off x="470047" y="1530091"/>
             <a:ext cx="2528203" cy="307777"/>
           </a:xfrm>
           <a:prstGeom prst="rect">
@@ -28074,7 +29685,7 @@
         </p:nvCxnSpPr>
         <p:spPr>
           <a:xfrm>
-            <a:off x="630936" y="3369560"/>
+            <a:off x="764286" y="3674360"/>
             <a:ext cx="0" cy="2208280"/>
           </a:xfrm>
           <a:prstGeom prst="line">
@@ -28110,7 +29721,7 @@
         </p:nvSpPr>
         <p:spPr>
           <a:xfrm>
-            <a:off x="852942" y="3547765"/>
+            <a:off x="986292" y="3852565"/>
             <a:ext cx="1892977" cy="295727"/>
           </a:xfrm>
           <a:prstGeom prst="rect">
@@ -28170,7 +29781,7 @@
         </p:nvSpPr>
         <p:spPr>
           <a:xfrm>
-            <a:off x="852942" y="4021697"/>
+            <a:off x="986292" y="4326497"/>
             <a:ext cx="2076186" cy="301751"/>
           </a:xfrm>
           <a:prstGeom prst="rect">
@@ -28230,7 +29841,7 @@
         </p:nvSpPr>
         <p:spPr>
           <a:xfrm>
-            <a:off x="852942" y="4449909"/>
+            <a:off x="986292" y="4754709"/>
             <a:ext cx="1783578" cy="301751"/>
           </a:xfrm>
           <a:prstGeom prst="rect">
@@ -28290,7 +29901,7 @@
         </p:nvSpPr>
         <p:spPr>
           <a:xfrm>
-            <a:off x="852932" y="4905549"/>
+            <a:off x="986282" y="5210349"/>
             <a:ext cx="2092701" cy="301751"/>
           </a:xfrm>
           <a:prstGeom prst="rect">
@@ -28350,7 +29961,7 @@
         </p:nvSpPr>
         <p:spPr>
           <a:xfrm>
-            <a:off x="3443412" y="5075649"/>
+            <a:off x="3576762" y="5380449"/>
             <a:ext cx="1478340" cy="429658"/>
           </a:xfrm>
           <a:prstGeom prst="rect">
@@ -28402,7 +30013,7 @@
         </p:nvSpPr>
         <p:spPr>
           <a:xfrm>
-            <a:off x="837189" y="5397769"/>
+            <a:off x="970539" y="5702569"/>
             <a:ext cx="2076196" cy="301751"/>
           </a:xfrm>
           <a:prstGeom prst="rect">
@@ -28465,7 +30076,7 @@
         </p:nvCxnSpPr>
         <p:spPr>
           <a:xfrm>
-            <a:off x="630936" y="3695629"/>
+            <a:off x="764286" y="4000429"/>
             <a:ext cx="222006" cy="0"/>
           </a:xfrm>
           <a:prstGeom prst="line">
@@ -28503,7 +30114,7 @@
         </p:nvCxnSpPr>
         <p:spPr>
           <a:xfrm>
-            <a:off x="630936" y="4178807"/>
+            <a:off x="764286" y="4483607"/>
             <a:ext cx="222006" cy="0"/>
           </a:xfrm>
           <a:prstGeom prst="line">
@@ -28541,7 +30152,7 @@
         </p:nvCxnSpPr>
         <p:spPr>
           <a:xfrm>
-            <a:off x="630936" y="4606981"/>
+            <a:off x="764286" y="4911781"/>
             <a:ext cx="222006" cy="0"/>
           </a:xfrm>
           <a:prstGeom prst="line">
@@ -28579,7 +30190,7 @@
         </p:nvCxnSpPr>
         <p:spPr>
           <a:xfrm>
-            <a:off x="630936" y="5024420"/>
+            <a:off x="764286" y="5329220"/>
             <a:ext cx="222006" cy="0"/>
           </a:xfrm>
           <a:prstGeom prst="line">
@@ -28617,7 +30228,7 @@
         </p:nvCxnSpPr>
         <p:spPr>
           <a:xfrm>
-            <a:off x="630936" y="5577840"/>
+            <a:off x="764286" y="5882640"/>
             <a:ext cx="222006" cy="0"/>
           </a:xfrm>
           <a:prstGeom prst="line">
@@ -28657,7 +30268,7 @@
         </p:nvCxnSpPr>
         <p:spPr>
           <a:xfrm flipV="1">
-            <a:off x="2945633" y="3982160"/>
+            <a:off x="3078983" y="4286960"/>
             <a:ext cx="513784" cy="1074265"/>
           </a:xfrm>
           <a:prstGeom prst="bentConnector3">
@@ -28698,7 +30309,7 @@
         </p:nvCxnSpPr>
         <p:spPr>
           <a:xfrm flipV="1">
-            <a:off x="2636520" y="4606981"/>
+            <a:off x="2769870" y="4911781"/>
             <a:ext cx="554736" cy="4501"/>
           </a:xfrm>
           <a:prstGeom prst="line">
@@ -28739,7 +30350,7 @@
         </p:nvCxnSpPr>
         <p:spPr>
           <a:xfrm>
-            <a:off x="2929128" y="4178807"/>
+            <a:off x="3062478" y="4483607"/>
             <a:ext cx="262128" cy="0"/>
           </a:xfrm>
           <a:prstGeom prst="line">
@@ -28780,7 +30391,7 @@
         </p:nvCxnSpPr>
         <p:spPr>
           <a:xfrm>
-            <a:off x="2745919" y="3700130"/>
+            <a:off x="2879269" y="4004930"/>
             <a:ext cx="445337" cy="0"/>
           </a:xfrm>
           <a:prstGeom prst="line">
@@ -28821,7 +30432,7 @@
         </p:nvCxnSpPr>
         <p:spPr>
           <a:xfrm>
-            <a:off x="3200400" y="3695629"/>
+            <a:off x="3333750" y="4000429"/>
             <a:ext cx="0" cy="391739"/>
           </a:xfrm>
           <a:prstGeom prst="line">
@@ -28864,7 +30475,7 @@
         </p:nvCxnSpPr>
         <p:spPr>
           <a:xfrm flipV="1">
-            <a:off x="2913385" y="5290478"/>
+            <a:off x="3046735" y="5595278"/>
             <a:ext cx="530027" cy="258167"/>
           </a:xfrm>
           <a:prstGeom prst="bentConnector3">
@@ -28905,7 +30516,7 @@
         </p:nvSpPr>
         <p:spPr>
           <a:xfrm>
-            <a:off x="4517710" y="1225291"/>
+            <a:off x="4651060" y="1530091"/>
             <a:ext cx="3437569" cy="307777"/>
           </a:xfrm>
           <a:prstGeom prst="rect">
@@ -28953,7 +30564,7 @@
         </p:nvSpPr>
         <p:spPr>
           <a:xfrm>
-            <a:off x="4465657" y="766748"/>
+            <a:off x="4599007" y="1071548"/>
             <a:ext cx="3211175" cy="307777"/>
           </a:xfrm>
           <a:prstGeom prst="rect">
@@ -28989,7 +30600,7 @@
         </p:nvSpPr>
         <p:spPr>
           <a:xfrm>
-            <a:off x="5271133" y="3678899"/>
+            <a:off x="5404483" y="3983699"/>
             <a:ext cx="800111" cy="295727"/>
           </a:xfrm>
           <a:prstGeom prst="rect">
@@ -29048,7 +30659,7 @@
         </p:nvSpPr>
         <p:spPr>
           <a:xfrm>
-            <a:off x="5267442" y="4064456"/>
+            <a:off x="5400792" y="4369256"/>
             <a:ext cx="800111" cy="295727"/>
           </a:xfrm>
           <a:prstGeom prst="rect">
@@ -29107,7 +30718,7 @@
         </p:nvSpPr>
         <p:spPr>
           <a:xfrm>
-            <a:off x="5267441" y="4431725"/>
+            <a:off x="5400791" y="4736525"/>
             <a:ext cx="800111" cy="295727"/>
           </a:xfrm>
           <a:prstGeom prst="rect">
@@ -29170,7 +30781,7 @@
         </p:nvCxnSpPr>
         <p:spPr>
           <a:xfrm rot="10800000">
-            <a:off x="4937761" y="3982161"/>
+            <a:off x="5071111" y="4286961"/>
             <a:ext cx="329680" cy="597429"/>
           </a:xfrm>
           <a:prstGeom prst="bentConnector3">
@@ -29214,7 +30825,7 @@
         </p:nvCxnSpPr>
         <p:spPr>
           <a:xfrm>
-            <a:off x="5102600" y="4212319"/>
+            <a:off x="5235950" y="4517119"/>
             <a:ext cx="164842" cy="1"/>
           </a:xfrm>
           <a:prstGeom prst="line">
@@ -29256,7 +30867,7 @@
         </p:nvCxnSpPr>
         <p:spPr>
           <a:xfrm rot="5400000" flipH="1" flipV="1">
-            <a:off x="5068020" y="3861344"/>
+            <a:off x="5201370" y="4166144"/>
             <a:ext cx="237693" cy="168533"/>
           </a:xfrm>
           <a:prstGeom prst="bentConnector2">
@@ -29295,7 +30906,7 @@
         </p:nvSpPr>
         <p:spPr>
           <a:xfrm>
-            <a:off x="4937760" y="3409265"/>
+            <a:off x="5071110" y="3714065"/>
             <a:ext cx="1478344" cy="276999"/>
           </a:xfrm>
           <a:prstGeom prst="rect">
@@ -29331,7 +30942,7 @@
         </p:nvSpPr>
         <p:spPr>
           <a:xfrm>
-            <a:off x="4876864" y="4801032"/>
+            <a:off x="5010214" y="5105832"/>
             <a:ext cx="1539240" cy="276999"/>
           </a:xfrm>
           <a:prstGeom prst="rect">
@@ -29367,7 +30978,7 @@
         </p:nvSpPr>
         <p:spPr>
           <a:xfrm>
-            <a:off x="5260329" y="5093046"/>
+            <a:off x="5393679" y="5397846"/>
             <a:ext cx="800111" cy="295727"/>
           </a:xfrm>
           <a:prstGeom prst="rect">
@@ -29426,7 +31037,7 @@
         </p:nvSpPr>
         <p:spPr>
           <a:xfrm>
-            <a:off x="5256638" y="5478603"/>
+            <a:off x="5389988" y="5783403"/>
             <a:ext cx="800111" cy="295727"/>
           </a:xfrm>
           <a:prstGeom prst="rect">
@@ -29489,7 +31100,7 @@
         </p:nvCxnSpPr>
         <p:spPr>
           <a:xfrm rot="10800000">
-            <a:off x="4921752" y="5290479"/>
+            <a:off x="5055102" y="5595279"/>
             <a:ext cx="334886" cy="335989"/>
           </a:xfrm>
           <a:prstGeom prst="bentConnector3">
@@ -29533,7 +31144,7 @@
         </p:nvCxnSpPr>
         <p:spPr>
           <a:xfrm rot="10800000" flipV="1">
-            <a:off x="5080743" y="5240909"/>
+            <a:off x="5214093" y="5545709"/>
             <a:ext cx="179586" cy="44863"/>
           </a:xfrm>
           <a:prstGeom prst="bentConnector3">
@@ -29574,7 +31185,7 @@
         </p:nvSpPr>
         <p:spPr>
           <a:xfrm>
-            <a:off x="6847731" y="3962364"/>
+            <a:off x="6981081" y="4267164"/>
             <a:ext cx="713346" cy="736098"/>
           </a:xfrm>
           <a:prstGeom prst="rect">
@@ -29633,7 +31244,7 @@
         </p:nvSpPr>
         <p:spPr>
           <a:xfrm>
-            <a:off x="6862225" y="4963422"/>
+            <a:off x="6995575" y="5268222"/>
             <a:ext cx="713345" cy="736098"/>
           </a:xfrm>
           <a:prstGeom prst="rect">
@@ -29694,7 +31305,7 @@
         </p:nvCxnSpPr>
         <p:spPr>
           <a:xfrm>
-            <a:off x="6423589" y="3190002"/>
+            <a:off x="6556939" y="3494802"/>
             <a:ext cx="0" cy="2502650"/>
           </a:xfrm>
           <a:prstGeom prst="line">
@@ -29732,7 +31343,7 @@
         </p:nvCxnSpPr>
         <p:spPr>
           <a:xfrm flipH="1">
-            <a:off x="6623368" y="3369560"/>
+            <a:off x="6756718" y="3674360"/>
             <a:ext cx="0" cy="2156584"/>
           </a:xfrm>
           <a:prstGeom prst="line">
@@ -29776,7 +31387,7 @@
         </p:nvCxnSpPr>
         <p:spPr>
           <a:xfrm>
-            <a:off x="6067552" y="3869364"/>
+            <a:off x="6200902" y="4174164"/>
             <a:ext cx="347200" cy="0"/>
           </a:xfrm>
           <a:prstGeom prst="line">
@@ -29813,7 +31424,7 @@
         </p:nvCxnSpPr>
         <p:spPr>
           <a:xfrm>
-            <a:off x="6067552" y="4211541"/>
+            <a:off x="6200902" y="4516341"/>
             <a:ext cx="348552" cy="0"/>
           </a:xfrm>
           <a:prstGeom prst="line">
@@ -29850,7 +31461,7 @@
         </p:nvCxnSpPr>
         <p:spPr>
           <a:xfrm>
-            <a:off x="6056749" y="4579588"/>
+            <a:off x="6190099" y="4884388"/>
             <a:ext cx="348552" cy="0"/>
           </a:xfrm>
           <a:prstGeom prst="line">
@@ -29887,7 +31498,7 @@
         </p:nvCxnSpPr>
         <p:spPr>
           <a:xfrm>
-            <a:off x="6056749" y="5240909"/>
+            <a:off x="6190099" y="5545709"/>
             <a:ext cx="348552" cy="0"/>
           </a:xfrm>
           <a:prstGeom prst="line">
@@ -29924,7 +31535,7 @@
         </p:nvCxnSpPr>
         <p:spPr>
           <a:xfrm>
-            <a:off x="6058408" y="5672448"/>
+            <a:off x="6191758" y="5977248"/>
             <a:ext cx="348552" cy="0"/>
           </a:xfrm>
           <a:prstGeom prst="line">
@@ -29963,7 +31574,7 @@
         </p:nvCxnSpPr>
         <p:spPr>
           <a:xfrm flipH="1">
-            <a:off x="6414752" y="5598910"/>
+            <a:off x="6548102" y="5903710"/>
             <a:ext cx="414690" cy="0"/>
           </a:xfrm>
           <a:prstGeom prst="line">
@@ -29999,7 +31610,7 @@
         </p:nvCxnSpPr>
         <p:spPr>
           <a:xfrm>
-            <a:off x="10543032" y="5207300"/>
+            <a:off x="10676382" y="5512100"/>
             <a:ext cx="0" cy="0"/>
           </a:xfrm>
           <a:prstGeom prst="line">
@@ -30037,7 +31648,7 @@
         </p:nvCxnSpPr>
         <p:spPr>
           <a:xfrm>
-            <a:off x="6090849" y="3713483"/>
+            <a:off x="6224199" y="4018283"/>
             <a:ext cx="531248" cy="0"/>
           </a:xfrm>
           <a:prstGeom prst="line">
@@ -30081,7 +31692,7 @@
         </p:nvCxnSpPr>
         <p:spPr>
           <a:xfrm>
-            <a:off x="6090849" y="4087368"/>
+            <a:off x="6224199" y="4392168"/>
             <a:ext cx="531248" cy="0"/>
           </a:xfrm>
           <a:prstGeom prst="line">
@@ -30125,7 +31736,7 @@
         </p:nvCxnSpPr>
         <p:spPr>
           <a:xfrm>
-            <a:off x="6067552" y="4489831"/>
+            <a:off x="6200902" y="4794631"/>
             <a:ext cx="531248" cy="0"/>
           </a:xfrm>
           <a:prstGeom prst="line">
@@ -30169,7 +31780,7 @@
         </p:nvCxnSpPr>
         <p:spPr>
           <a:xfrm>
-            <a:off x="6081705" y="5102190"/>
+            <a:off x="6215055" y="5406990"/>
             <a:ext cx="531248" cy="0"/>
           </a:xfrm>
           <a:prstGeom prst="line">
@@ -30213,7 +31824,7 @@
         </p:nvCxnSpPr>
         <p:spPr>
           <a:xfrm>
-            <a:off x="6067552" y="5505307"/>
+            <a:off x="6200902" y="5810107"/>
             <a:ext cx="554545" cy="0"/>
           </a:xfrm>
           <a:prstGeom prst="line">
@@ -30258,7 +31869,7 @@
         </p:nvCxnSpPr>
         <p:spPr>
           <a:xfrm flipH="1" flipV="1">
-            <a:off x="6622097" y="4315861"/>
+            <a:off x="6755447" y="4620661"/>
             <a:ext cx="225634" cy="0"/>
           </a:xfrm>
           <a:prstGeom prst="line">
@@ -30300,7 +31911,7 @@
         </p:nvSpPr>
         <p:spPr>
           <a:xfrm>
-            <a:off x="4657068" y="1614135"/>
+            <a:off x="4790418" y="1918935"/>
             <a:ext cx="2010494" cy="292817"/>
           </a:xfrm>
           <a:prstGeom prst="rect">
@@ -30368,7 +31979,7 @@
         </p:blipFill>
         <p:spPr>
           <a:xfrm>
-            <a:off x="7067047" y="3065461"/>
+            <a:off x="7200397" y="3370261"/>
             <a:ext cx="713345" cy="620803"/>
           </a:xfrm>
           <a:prstGeom prst="rect">
@@ -30395,7 +32006,7 @@
         </p:nvSpPr>
         <p:spPr>
           <a:xfrm>
-            <a:off x="6698721" y="2610717"/>
+            <a:off x="6832071" y="2915517"/>
             <a:ext cx="1631941" cy="461665"/>
           </a:xfrm>
           <a:prstGeom prst="rect">
@@ -30435,7 +32046,7 @@
         </p:nvCxnSpPr>
         <p:spPr>
           <a:xfrm rot="10800000" flipH="1" flipV="1">
-            <a:off x="7067047" y="3375863"/>
+            <a:off x="7200397" y="3680663"/>
             <a:ext cx="494030" cy="954550"/>
           </a:xfrm>
           <a:prstGeom prst="bentConnector5">
@@ -30479,7 +32090,7 @@
         </p:nvCxnSpPr>
         <p:spPr>
           <a:xfrm flipH="1">
-            <a:off x="7575570" y="3375863"/>
+            <a:off x="7708920" y="3680663"/>
             <a:ext cx="204822" cy="1955608"/>
           </a:xfrm>
           <a:prstGeom prst="bentConnector3">
@@ -30517,7 +32128,7 @@
         </p:nvSpPr>
         <p:spPr>
           <a:xfrm>
-            <a:off x="4673857" y="2893988"/>
+            <a:off x="4807207" y="3198788"/>
             <a:ext cx="2046968" cy="296014"/>
           </a:xfrm>
           <a:prstGeom prst="rect">
@@ -30577,7 +32188,7 @@
         </p:nvCxnSpPr>
         <p:spPr>
           <a:xfrm>
-            <a:off x="6640384" y="3150469"/>
+            <a:off x="6773734" y="3455269"/>
             <a:ext cx="408514" cy="0"/>
           </a:xfrm>
           <a:prstGeom prst="line">
@@ -30616,7 +32227,7 @@
         </p:nvCxnSpPr>
         <p:spPr>
           <a:xfrm rot="10800000">
-            <a:off x="5697341" y="3190002"/>
+            <a:off x="5830691" y="3494802"/>
             <a:ext cx="913756" cy="167140"/>
           </a:xfrm>
           <a:prstGeom prst="bentConnector2">
@@ -30660,7 +32271,7 @@
         </p:nvCxnSpPr>
         <p:spPr>
           <a:xfrm>
-            <a:off x="5079828" y="1906952"/>
+            <a:off x="5213178" y="2211752"/>
             <a:ext cx="0" cy="987036"/>
           </a:xfrm>
           <a:prstGeom prst="line">
@@ -30696,7 +32307,7 @@
         </p:nvSpPr>
         <p:spPr>
           <a:xfrm>
-            <a:off x="7034808" y="1707534"/>
+            <a:off x="7168158" y="2012334"/>
             <a:ext cx="1070290" cy="281016"/>
           </a:xfrm>
           <a:prstGeom prst="rect">
@@ -30748,7 +32359,7 @@
         </p:nvSpPr>
         <p:spPr>
           <a:xfrm>
-            <a:off x="7025932" y="2245573"/>
+            <a:off x="7159282" y="2550373"/>
             <a:ext cx="1070290" cy="281016"/>
           </a:xfrm>
           <a:prstGeom prst="rect">
@@ -30800,7 +32411,7 @@
         </p:nvSpPr>
         <p:spPr>
           <a:xfrm>
-            <a:off x="5431940" y="2160642"/>
+            <a:off x="5565290" y="2465442"/>
             <a:ext cx="1070291" cy="457697"/>
           </a:xfrm>
           <a:prstGeom prst="rect">
@@ -30863,7 +32474,7 @@
         </p:nvCxnSpPr>
         <p:spPr>
           <a:xfrm rot="16200000" flipH="1">
-            <a:off x="5091906" y="2049456"/>
+            <a:off x="5225256" y="2354256"/>
             <a:ext cx="476019" cy="204050"/>
           </a:xfrm>
           <a:prstGeom prst="bentConnector2">
@@ -30903,7 +32514,7 @@
         </p:nvCxnSpPr>
         <p:spPr>
           <a:xfrm flipV="1">
-            <a:off x="6502231" y="1848042"/>
+            <a:off x="6635581" y="2152842"/>
             <a:ext cx="532577" cy="541449"/>
           </a:xfrm>
           <a:prstGeom prst="bentConnector3">
@@ -30945,7 +32556,7 @@
         </p:nvCxnSpPr>
         <p:spPr>
           <a:xfrm flipV="1">
-            <a:off x="6502231" y="2386081"/>
+            <a:off x="6635581" y="2690881"/>
             <a:ext cx="523701" cy="3410"/>
           </a:xfrm>
           <a:prstGeom prst="bentConnector3">
@@ -30985,7 +32596,7 @@
         </p:nvCxnSpPr>
         <p:spPr>
           <a:xfrm>
-            <a:off x="8429351" y="766748"/>
+            <a:off x="8562701" y="1071548"/>
             <a:ext cx="0" cy="5378020"/>
           </a:xfrm>
           <a:prstGeom prst="line">
@@ -31029,7 +32640,7 @@
         </p:nvSpPr>
         <p:spPr>
           <a:xfrm>
-            <a:off x="8641240" y="1197864"/>
+            <a:off x="8774590" y="1502664"/>
             <a:ext cx="3005023" cy="4669465"/>
           </a:xfrm>
           <a:prstGeom prst="rect">
@@ -31081,7 +32692,7 @@
         </p:nvSpPr>
         <p:spPr>
           <a:xfrm>
-            <a:off x="8649948" y="1225291"/>
+            <a:off x="8783298" y="1530091"/>
             <a:ext cx="3048369" cy="307777"/>
           </a:xfrm>
           <a:prstGeom prst="rect">
@@ -31129,7 +32740,7 @@
         </p:nvSpPr>
         <p:spPr>
           <a:xfrm>
-            <a:off x="8949328" y="2245573"/>
+            <a:off x="9082678" y="2550373"/>
             <a:ext cx="1070290" cy="281016"/>
           </a:xfrm>
           <a:prstGeom prst="rect">
@@ -31181,7 +32792,7 @@
         </p:nvSpPr>
         <p:spPr>
           <a:xfrm>
-            <a:off x="6973083" y="1959788"/>
+            <a:off x="7106433" y="2264588"/>
             <a:ext cx="1328590" cy="246221"/>
           </a:xfrm>
           <a:prstGeom prst="rect">
@@ -31229,7 +32840,7 @@
         </p:nvSpPr>
         <p:spPr>
           <a:xfrm>
-            <a:off x="7011029" y="2475256"/>
+            <a:off x="7144379" y="2780056"/>
             <a:ext cx="1247646" cy="246221"/>
           </a:xfrm>
           <a:prstGeom prst="rect">
@@ -31277,7 +32888,7 @@
         </p:nvSpPr>
         <p:spPr>
           <a:xfrm>
-            <a:off x="10169876" y="2245573"/>
+            <a:off x="10303226" y="2550373"/>
             <a:ext cx="1070290" cy="281016"/>
           </a:xfrm>
           <a:prstGeom prst="rect">
@@ -31332,7 +32943,7 @@
         </p:nvCxnSpPr>
         <p:spPr>
           <a:xfrm>
-            <a:off x="8096222" y="2386081"/>
+            <a:off x="8229572" y="2690881"/>
             <a:ext cx="853106" cy="0"/>
           </a:xfrm>
           <a:prstGeom prst="straightConnector1">
@@ -31375,7 +32986,7 @@
         </p:nvSpPr>
         <p:spPr>
           <a:xfrm>
-            <a:off x="8628670" y="766748"/>
+            <a:off x="8762020" y="1071548"/>
             <a:ext cx="3211175" cy="307777"/>
           </a:xfrm>
           <a:prstGeom prst="rect">
@@ -31414,7 +33025,7 @@
         </p:nvCxnSpPr>
         <p:spPr>
           <a:xfrm>
-            <a:off x="8105098" y="1848042"/>
+            <a:off x="8238448" y="2152842"/>
             <a:ext cx="2599923" cy="397531"/>
           </a:xfrm>
           <a:prstGeom prst="bentConnector2">
@@ -31453,7 +33064,7 @@
         </p:nvSpPr>
         <p:spPr>
           <a:xfrm>
-            <a:off x="8590592" y="1988550"/>
+            <a:off x="8723942" y="2293350"/>
             <a:ext cx="1478344" cy="276999"/>
           </a:xfrm>
           <a:prstGeom prst="rect">
@@ -31489,7 +33100,7 @@
         </p:nvSpPr>
         <p:spPr>
           <a:xfrm>
-            <a:off x="10691516" y="1783908"/>
+            <a:off x="10824866" y="2088708"/>
             <a:ext cx="1092334" cy="461665"/>
           </a:xfrm>
           <a:prstGeom prst="rect">
@@ -31525,7 +33136,7 @@
         </p:nvSpPr>
         <p:spPr>
           <a:xfrm>
-            <a:off x="8982552" y="3135983"/>
+            <a:off x="9115902" y="3440783"/>
             <a:ext cx="1544041" cy="296014"/>
           </a:xfrm>
           <a:prstGeom prst="rect">
@@ -31585,7 +33196,7 @@
         </p:nvSpPr>
         <p:spPr>
           <a:xfrm>
-            <a:off x="9484473" y="2718549"/>
+            <a:off x="9617823" y="3023349"/>
             <a:ext cx="1830550" cy="296014"/>
           </a:xfrm>
           <a:prstGeom prst="rect">
@@ -31647,7 +33258,7 @@
         </p:nvCxnSpPr>
         <p:spPr>
           <a:xfrm>
-            <a:off x="9153144" y="2526589"/>
+            <a:off x="9286494" y="2831389"/>
             <a:ext cx="0" cy="623880"/>
           </a:xfrm>
           <a:prstGeom prst="line">
@@ -31690,7 +33301,7 @@
         </p:nvCxnSpPr>
         <p:spPr>
           <a:xfrm>
-            <a:off x="10686288" y="2526589"/>
+            <a:off x="10819638" y="2831389"/>
             <a:ext cx="0" cy="194888"/>
           </a:xfrm>
           <a:prstGeom prst="line">
@@ -31733,7 +33344,7 @@
         </p:nvCxnSpPr>
         <p:spPr>
           <a:xfrm>
-            <a:off x="9707880" y="3446726"/>
+            <a:off x="9841230" y="3751526"/>
             <a:ext cx="0" cy="165154"/>
           </a:xfrm>
           <a:prstGeom prst="line">
@@ -31776,7 +33387,7 @@
         </p:nvCxnSpPr>
         <p:spPr>
           <a:xfrm>
-            <a:off x="10710672" y="3001208"/>
+            <a:off x="10844022" y="3306008"/>
             <a:ext cx="0" cy="636904"/>
           </a:xfrm>
           <a:prstGeom prst="line">
@@ -31819,7 +33430,7 @@
         </p:nvCxnSpPr>
         <p:spPr>
           <a:xfrm>
-            <a:off x="9933439" y="3934128"/>
+            <a:off x="10066789" y="4238928"/>
             <a:ext cx="0" cy="244679"/>
           </a:xfrm>
           <a:prstGeom prst="line">
@@ -31860,7 +33471,7 @@
         </p:nvSpPr>
         <p:spPr>
           <a:xfrm>
-            <a:off x="8982552" y="3623183"/>
+            <a:off x="9115902" y="3927983"/>
             <a:ext cx="2046968" cy="296014"/>
           </a:xfrm>
           <a:prstGeom prst="rect">
@@ -31934,7 +33545,7 @@
         </p:blipFill>
         <p:spPr>
           <a:xfrm>
-            <a:off x="8861023" y="4138551"/>
+            <a:off x="8994373" y="4443351"/>
             <a:ext cx="2677947" cy="1533897"/>
           </a:xfrm>
           <a:prstGeom prst="rect">
@@ -31947,6 +33558,96 @@
           </a:ln>
         </p:spPr>
       </p:pic>
+      <p:sp>
+        <p:nvSpPr>
+          <p:cNvPr id="2" name="TextBox 1">
+            <a:extLst>
+              <a:ext uri="{FF2B5EF4-FFF2-40B4-BE49-F238E27FC236}">
+                <a16:creationId xmlns:a16="http://schemas.microsoft.com/office/drawing/2014/main" id="{2096BB40-06A0-F31E-0148-DA298030457F}"/>
+              </a:ext>
+            </a:extLst>
+          </p:cNvPr>
+          <p:cNvSpPr txBox="1"/>
+          <p:nvPr/>
+        </p:nvSpPr>
+        <p:spPr>
+          <a:xfrm>
+            <a:off x="470047" y="460438"/>
+            <a:ext cx="9813723" cy="400110"/>
+          </a:xfrm>
+          <a:prstGeom prst="rect">
+            <a:avLst/>
+          </a:prstGeom>
+          <a:noFill/>
+          <a:ln w="12700">
+            <a:solidFill>
+              <a:schemeClr val="tx1"/>
+            </a:solidFill>
+            <a:prstDash val="sysDash"/>
+          </a:ln>
+        </p:spPr>
+        <p:txBody>
+          <a:bodyPr wrap="square" rtlCol="0">
+            <a:spAutoFit/>
+          </a:bodyPr>
+          <a:lstStyle/>
+          <a:p>
+            <a:r>
+              <a:rPr lang="en-US" sz="2000" b="1" dirty="0"/>
+              <a:t>Python Virtual PLC/RTU  Simulator with IEC-60870-5-104 Communication Protocol </a:t>
+            </a:r>
+            <a:endParaRPr lang="en-SG" sz="2000" b="1" dirty="0"/>
+          </a:p>
+        </p:txBody>
+      </p:sp>
+      <p:sp>
+        <p:nvSpPr>
+          <p:cNvPr id="3" name="TextBox 2">
+            <a:extLst>
+              <a:ext uri="{FF2B5EF4-FFF2-40B4-BE49-F238E27FC236}">
+                <a16:creationId xmlns:a16="http://schemas.microsoft.com/office/drawing/2014/main" id="{8CD987F9-0801-DEA6-8F29-D80CA2A95758}"/>
+              </a:ext>
+            </a:extLst>
+          </p:cNvPr>
+          <p:cNvSpPr txBox="1"/>
+          <p:nvPr/>
+        </p:nvSpPr>
+        <p:spPr>
+          <a:xfrm>
+            <a:off x="3277079" y="4560425"/>
+            <a:ext cx="1171512" cy="707886"/>
+          </a:xfrm>
+          <a:prstGeom prst="rect">
+            <a:avLst/>
+          </a:prstGeom>
+          <a:noFill/>
+        </p:spPr>
+        <p:txBody>
+          <a:bodyPr wrap="square" rtlCol="0">
+            <a:spAutoFit/>
+          </a:bodyPr>
+          <a:lstStyle/>
+          <a:p>
+            <a:r>
+              <a:rPr lang="en-US" sz="1000" b="1" dirty="0"/>
+              <a:t>Simulated </a:t>
+            </a:r>
+          </a:p>
+          <a:p>
+            <a:r>
+              <a:rPr lang="en-US" sz="1000" b="1" dirty="0"/>
+              <a:t>analog /digital electrical </a:t>
+            </a:r>
+          </a:p>
+          <a:p>
+            <a:r>
+              <a:rPr lang="en-US" sz="1000" b="1" dirty="0"/>
+              <a:t>signals</a:t>
+            </a:r>
+            <a:endParaRPr lang="en-SG" sz="1000" b="1" dirty="0"/>
+          </a:p>
+        </p:txBody>
+      </p:sp>
     </p:spTree>
     <p:extLst>
       <p:ext uri="{BB962C8B-B14F-4D97-AF65-F5344CB8AC3E}">

</xml_diff>

<commit_message>
update the design document and introduction section.
</commit_message>
<xml_diff>
--- a/doc/designDoc.pptx
+++ b/doc/designDoc.pptx
@@ -211,7 +211,7 @@
           <a:p>
             <a:fld id="{CA98FC0A-A656-46B8-8BCE-B9957593F2EC}" type="datetimeFigureOut">
               <a:rPr lang="en-SG" smtClean="0"/>
-              <a:t>13/5/2025</a:t>
+              <a:t>5/12/2025</a:t>
             </a:fld>
             <a:endParaRPr lang="en-SG"/>
           </a:p>
@@ -712,7 +712,7 @@
           <a:p>
             <a:fld id="{F953FF10-B1B6-4147-A9BC-BC236B7E3AD4}" type="datetimeFigureOut">
               <a:rPr lang="en-SG" smtClean="0"/>
-              <a:t>13/5/2025</a:t>
+              <a:t>5/12/2025</a:t>
             </a:fld>
             <a:endParaRPr lang="en-SG"/>
           </a:p>
@@ -912,7 +912,7 @@
           <a:p>
             <a:fld id="{F953FF10-B1B6-4147-A9BC-BC236B7E3AD4}" type="datetimeFigureOut">
               <a:rPr lang="en-SG" smtClean="0"/>
-              <a:t>13/5/2025</a:t>
+              <a:t>5/12/2025</a:t>
             </a:fld>
             <a:endParaRPr lang="en-SG"/>
           </a:p>
@@ -1122,7 +1122,7 @@
           <a:p>
             <a:fld id="{F953FF10-B1B6-4147-A9BC-BC236B7E3AD4}" type="datetimeFigureOut">
               <a:rPr lang="en-SG" smtClean="0"/>
-              <a:t>13/5/2025</a:t>
+              <a:t>5/12/2025</a:t>
             </a:fld>
             <a:endParaRPr lang="en-SG"/>
           </a:p>
@@ -1322,7 +1322,7 @@
           <a:p>
             <a:fld id="{F953FF10-B1B6-4147-A9BC-BC236B7E3AD4}" type="datetimeFigureOut">
               <a:rPr lang="en-SG" smtClean="0"/>
-              <a:t>13/5/2025</a:t>
+              <a:t>5/12/2025</a:t>
             </a:fld>
             <a:endParaRPr lang="en-SG"/>
           </a:p>
@@ -1598,7 +1598,7 @@
           <a:p>
             <a:fld id="{F953FF10-B1B6-4147-A9BC-BC236B7E3AD4}" type="datetimeFigureOut">
               <a:rPr lang="en-SG" smtClean="0"/>
-              <a:t>13/5/2025</a:t>
+              <a:t>5/12/2025</a:t>
             </a:fld>
             <a:endParaRPr lang="en-SG"/>
           </a:p>
@@ -1866,7 +1866,7 @@
           <a:p>
             <a:fld id="{F953FF10-B1B6-4147-A9BC-BC236B7E3AD4}" type="datetimeFigureOut">
               <a:rPr lang="en-SG" smtClean="0"/>
-              <a:t>13/5/2025</a:t>
+              <a:t>5/12/2025</a:t>
             </a:fld>
             <a:endParaRPr lang="en-SG"/>
           </a:p>
@@ -2281,7 +2281,7 @@
           <a:p>
             <a:fld id="{F953FF10-B1B6-4147-A9BC-BC236B7E3AD4}" type="datetimeFigureOut">
               <a:rPr lang="en-SG" smtClean="0"/>
-              <a:t>13/5/2025</a:t>
+              <a:t>5/12/2025</a:t>
             </a:fld>
             <a:endParaRPr lang="en-SG"/>
           </a:p>
@@ -2423,7 +2423,7 @@
           <a:p>
             <a:fld id="{F953FF10-B1B6-4147-A9BC-BC236B7E3AD4}" type="datetimeFigureOut">
               <a:rPr lang="en-SG" smtClean="0"/>
-              <a:t>13/5/2025</a:t>
+              <a:t>5/12/2025</a:t>
             </a:fld>
             <a:endParaRPr lang="en-SG"/>
           </a:p>
@@ -2536,7 +2536,7 @@
           <a:p>
             <a:fld id="{F953FF10-B1B6-4147-A9BC-BC236B7E3AD4}" type="datetimeFigureOut">
               <a:rPr lang="en-SG" smtClean="0"/>
-              <a:t>13/5/2025</a:t>
+              <a:t>5/12/2025</a:t>
             </a:fld>
             <a:endParaRPr lang="en-SG"/>
           </a:p>
@@ -2849,7 +2849,7 @@
           <a:p>
             <a:fld id="{F953FF10-B1B6-4147-A9BC-BC236B7E3AD4}" type="datetimeFigureOut">
               <a:rPr lang="en-SG" smtClean="0"/>
-              <a:t>13/5/2025</a:t>
+              <a:t>5/12/2025</a:t>
             </a:fld>
             <a:endParaRPr lang="en-SG"/>
           </a:p>
@@ -3138,7 +3138,7 @@
           <a:p>
             <a:fld id="{F953FF10-B1B6-4147-A9BC-BC236B7E3AD4}" type="datetimeFigureOut">
               <a:rPr lang="en-SG" smtClean="0"/>
-              <a:t>13/5/2025</a:t>
+              <a:t>5/12/2025</a:t>
             </a:fld>
             <a:endParaRPr lang="en-SG"/>
           </a:p>
@@ -3381,7 +3381,7 @@
           <a:p>
             <a:fld id="{F953FF10-B1B6-4147-A9BC-BC236B7E3AD4}" type="datetimeFigureOut">
               <a:rPr lang="en-SG" smtClean="0"/>
-              <a:t>13/5/2025</a:t>
+              <a:t>5/12/2025</a:t>
             </a:fld>
             <a:endParaRPr lang="en-SG"/>
           </a:p>

</xml_diff>